<commit_message>
Hamza CORE: Added presentation.
</commit_message>
<xml_diff>
--- a/Group_Docs/Team_Presentation_Group2.pptx
+++ b/Group_Docs/Team_Presentation_Group2.pptx
@@ -2,22 +2,21 @@
 <file path=ppt/presentation.xml><?xml version="1.0" encoding="utf-8"?>
 <p:presentation xmlns:a="http://schemas.openxmlformats.org/drawingml/2006/main" xmlns:r="http://schemas.openxmlformats.org/officeDocument/2006/relationships" xmlns:p="http://schemas.openxmlformats.org/presentationml/2006/main" saveSubsetFonts="1">
   <p:sldMasterIdLst>
-    <p:sldMasterId id="2147483749" r:id="rId1"/>
+    <p:sldMasterId id="2147483809" r:id="rId1"/>
   </p:sldMasterIdLst>
   <p:sldIdLst>
     <p:sldId id="256" r:id="rId2"/>
     <p:sldId id="257" r:id="rId3"/>
     <p:sldId id="258" r:id="rId4"/>
     <p:sldId id="259" r:id="rId5"/>
-    <p:sldId id="260" r:id="rId6"/>
-    <p:sldId id="261" r:id="rId7"/>
-    <p:sldId id="262" r:id="rId8"/>
-    <p:sldId id="263" r:id="rId9"/>
-    <p:sldId id="264" r:id="rId10"/>
-    <p:sldId id="265" r:id="rId11"/>
-    <p:sldId id="266" r:id="rId12"/>
-    <p:sldId id="267" r:id="rId13"/>
-    <p:sldId id="268" r:id="rId14"/>
+    <p:sldId id="261" r:id="rId6"/>
+    <p:sldId id="262" r:id="rId7"/>
+    <p:sldId id="263" r:id="rId8"/>
+    <p:sldId id="264" r:id="rId9"/>
+    <p:sldId id="265" r:id="rId10"/>
+    <p:sldId id="266" r:id="rId11"/>
+    <p:sldId id="267" r:id="rId12"/>
+    <p:sldId id="268" r:id="rId13"/>
   </p:sldIdLst>
   <p:sldSz cx="12192000" cy="6858000"/>
   <p:notesSz cx="6858000" cy="9144000"/>
@@ -125,7 +124,7 @@
 </file>
 
 <file path=ppt/slideLayouts/slideLayout1.xml><?xml version="1.0" encoding="utf-8"?>
-<p:sldLayout xmlns:a="http://schemas.openxmlformats.org/drawingml/2006/main" xmlns:r="http://schemas.openxmlformats.org/officeDocument/2006/relationships" xmlns:p="http://schemas.openxmlformats.org/presentationml/2006/main" type="title" preserve="1">
+<p:sldLayout xmlns:a="http://schemas.openxmlformats.org/drawingml/2006/main" xmlns:r="http://schemas.openxmlformats.org/officeDocument/2006/relationships" xmlns:p="http://schemas.openxmlformats.org/presentationml/2006/main" showMasterSp="0" type="title" preserve="1">
   <p:cSld name="Title Slide">
     <p:spTree>
       <p:nvGrpSpPr>
@@ -153,15 +152,17 @@
         </p:nvSpPr>
         <p:spPr>
           <a:xfrm>
-            <a:off x="1524000" y="1122363"/>
-            <a:ext cx="9144000" cy="2387600"/>
+            <a:off x="457200" y="4960137"/>
+            <a:ext cx="7772400" cy="1463040"/>
           </a:xfrm>
         </p:spPr>
         <p:txBody>
-          <a:bodyPr anchor="b"/>
+          <a:bodyPr anchor="ctr">
+            <a:normAutofit/>
+          </a:bodyPr>
           <a:lstStyle>
-            <a:lvl1pPr algn="ctr">
-              <a:defRPr sz="6000"/>
+            <a:lvl1pPr algn="r">
+              <a:defRPr sz="5000" spc="200" baseline="0"/>
             </a:lvl1pPr>
           </a:lstStyle>
           <a:p>
@@ -169,7 +170,7 @@
               <a:rPr lang="en-US" smtClean="0"/>
               <a:t>Click to edit Master title style</a:t>
             </a:r>
-            <a:endParaRPr lang="en-GB"/>
+            <a:endParaRPr lang="en-US" dirty="0"/>
           </a:p>
         </p:txBody>
       </p:sp>
@@ -185,20 +186,35 @@
         </p:nvSpPr>
         <p:spPr>
           <a:xfrm>
-            <a:off x="1524000" y="3602038"/>
-            <a:ext cx="9144000" cy="1655762"/>
+            <a:off x="8610600" y="4960137"/>
+            <a:ext cx="3200400" cy="1463040"/>
           </a:xfrm>
         </p:spPr>
         <p:txBody>
-          <a:bodyPr/>
+          <a:bodyPr lIns="91440" rIns="91440" anchor="ctr">
+            <a:normAutofit/>
+          </a:bodyPr>
           <a:lstStyle>
-            <a:lvl1pPr marL="0" indent="0" algn="ctr">
+            <a:lvl1pPr marL="0" indent="0" algn="l">
+              <a:lnSpc>
+                <a:spcPct val="100000"/>
+              </a:lnSpc>
+              <a:spcBef>
+                <a:spcPts val="0"/>
+              </a:spcBef>
               <a:buNone/>
-              <a:defRPr sz="2400"/>
+              <a:defRPr sz="1800">
+                <a:solidFill>
+                  <a:schemeClr val="tx1">
+                    <a:lumMod val="95000"/>
+                    <a:lumOff val="5000"/>
+                  </a:schemeClr>
+                </a:solidFill>
+              </a:defRPr>
             </a:lvl1pPr>
             <a:lvl2pPr marL="457200" indent="0" algn="ctr">
               <a:buNone/>
-              <a:defRPr sz="2000"/>
+              <a:defRPr sz="1800"/>
             </a:lvl2pPr>
             <a:lvl3pPr marL="914400" indent="0" algn="ctr">
               <a:buNone/>
@@ -206,27 +222,27 @@
             </a:lvl3pPr>
             <a:lvl4pPr marL="1371600" indent="0" algn="ctr">
               <a:buNone/>
-              <a:defRPr sz="1600"/>
+              <a:defRPr sz="1800"/>
             </a:lvl4pPr>
             <a:lvl5pPr marL="1828800" indent="0" algn="ctr">
               <a:buNone/>
-              <a:defRPr sz="1600"/>
+              <a:defRPr sz="1800"/>
             </a:lvl5pPr>
             <a:lvl6pPr marL="2286000" indent="0" algn="ctr">
               <a:buNone/>
-              <a:defRPr sz="1600"/>
+              <a:defRPr sz="1800"/>
             </a:lvl6pPr>
             <a:lvl7pPr marL="2743200" indent="0" algn="ctr">
               <a:buNone/>
-              <a:defRPr sz="1600"/>
+              <a:defRPr sz="1800"/>
             </a:lvl7pPr>
             <a:lvl8pPr marL="3200400" indent="0" algn="ctr">
               <a:buNone/>
-              <a:defRPr sz="1600"/>
+              <a:defRPr sz="1800"/>
             </a:lvl8pPr>
             <a:lvl9pPr marL="3657600" indent="0" algn="ctr">
               <a:buNone/>
-              <a:defRPr sz="1600"/>
+              <a:defRPr sz="1800"/>
             </a:lvl9pPr>
           </a:lstStyle>
           <a:p>
@@ -234,7 +250,7 @@
               <a:rPr lang="en-US" smtClean="0"/>
               <a:t>Click to edit Master subtitle style</a:t>
             </a:r>
-            <a:endParaRPr lang="en-GB"/>
+            <a:endParaRPr lang="en-US" dirty="0"/>
           </a:p>
         </p:txBody>
       </p:sp>
@@ -251,7 +267,11 @@
         <p:spPr/>
         <p:txBody>
           <a:bodyPr/>
-          <a:lstStyle/>
+          <a:lstStyle>
+            <a:lvl1pPr algn="l">
+              <a:defRPr/>
+            </a:lvl1pPr>
+          </a:lstStyle>
           <a:p>
             <a:fld id="{67BDCB85-630C-4FC8-A0A8-B4A448B7EB6C}" type="datetimeFigureOut">
               <a:rPr lang="en-GB" smtClean="0"/>
@@ -303,10 +323,83 @@
           </a:p>
         </p:txBody>
       </p:sp>
+      <p:cxnSp>
+        <p:nvCxnSpPr>
+          <p:cNvPr id="13" name="Straight Connector 12"/>
+          <p:cNvCxnSpPr/>
+          <p:nvPr/>
+        </p:nvCxnSpPr>
+        <p:spPr>
+          <a:xfrm flipV="1">
+            <a:off x="8386842" y="5264106"/>
+            <a:ext cx="0" cy="914400"/>
+          </a:xfrm>
+          <a:prstGeom prst="line">
+            <a:avLst/>
+          </a:prstGeom>
+          <a:ln w="19050">
+            <a:solidFill>
+              <a:schemeClr val="accent2"/>
+            </a:solidFill>
+          </a:ln>
+        </p:spPr>
+        <p:style>
+          <a:lnRef idx="1">
+            <a:schemeClr val="accent1"/>
+          </a:lnRef>
+          <a:fillRef idx="0">
+            <a:schemeClr val="accent1"/>
+          </a:fillRef>
+          <a:effectRef idx="0">
+            <a:schemeClr val="accent1"/>
+          </a:effectRef>
+          <a:fontRef idx="minor">
+            <a:schemeClr val="tx1"/>
+          </a:fontRef>
+        </p:style>
+      </p:cxnSp>
+      <p:sp>
+        <p:nvSpPr>
+          <p:cNvPr id="10" name="Rectangle 9"/>
+          <p:cNvSpPr/>
+          <p:nvPr/>
+        </p:nvSpPr>
+        <p:spPr>
+          <a:xfrm>
+            <a:off x="0" y="-1"/>
+            <a:ext cx="12192000" cy="4572001"/>
+          </a:xfrm>
+          <a:prstGeom prst="rect">
+            <a:avLst/>
+          </a:prstGeom>
+          <a:solidFill>
+            <a:schemeClr val="accent2"/>
+          </a:solidFill>
+          <a:ln>
+            <a:noFill/>
+          </a:ln>
+        </p:spPr>
+        <p:style>
+          <a:lnRef idx="2">
+            <a:schemeClr val="accent1">
+              <a:shade val="50000"/>
+            </a:schemeClr>
+          </a:lnRef>
+          <a:fillRef idx="1">
+            <a:schemeClr val="accent1"/>
+          </a:fillRef>
+          <a:effectRef idx="0">
+            <a:schemeClr val="accent1"/>
+          </a:effectRef>
+          <a:fontRef idx="minor">
+            <a:schemeClr val="lt1"/>
+          </a:fontRef>
+        </p:style>
+      </p:sp>
     </p:spTree>
     <p:extLst>
       <p:ext uri="{BB962C8B-B14F-4D97-AF65-F5344CB8AC3E}">
-        <p14:creationId xmlns:p14="http://schemas.microsoft.com/office/powerpoint/2010/main" val="1907978376"/>
+        <p14:creationId xmlns:p14="http://schemas.microsoft.com/office/powerpoint/2010/main" val="3284512853"/>
       </p:ext>
     </p:extLst>
   </p:cSld>
@@ -352,7 +445,7 @@
               <a:rPr lang="en-US" smtClean="0"/>
               <a:t>Click to edit Master title style</a:t>
             </a:r>
-            <a:endParaRPr lang="en-GB"/>
+            <a:endParaRPr lang="en-US" dirty="0"/>
           </a:p>
         </p:txBody>
       </p:sp>
@@ -404,7 +497,7 @@
               <a:rPr lang="en-US" smtClean="0"/>
               <a:t>Fifth level</a:t>
             </a:r>
-            <a:endParaRPr lang="en-GB"/>
+            <a:endParaRPr lang="en-US" dirty="0"/>
           </a:p>
         </p:txBody>
       </p:sp>
@@ -476,7 +569,7 @@
     </p:spTree>
     <p:extLst>
       <p:ext uri="{BB962C8B-B14F-4D97-AF65-F5344CB8AC3E}">
-        <p14:creationId xmlns:p14="http://schemas.microsoft.com/office/powerpoint/2010/main" val="3454888231"/>
+        <p14:creationId xmlns:p14="http://schemas.microsoft.com/office/powerpoint/2010/main" val="2394682893"/>
       </p:ext>
     </p:extLst>
   </p:cSld>
@@ -487,7 +580,7 @@
 </file>
 
 <file path=ppt/slideLayouts/slideLayout11.xml><?xml version="1.0" encoding="utf-8"?>
-<p:sldLayout xmlns:a="http://schemas.openxmlformats.org/drawingml/2006/main" xmlns:r="http://schemas.openxmlformats.org/officeDocument/2006/relationships" xmlns:p="http://schemas.openxmlformats.org/presentationml/2006/main" type="vertTitleAndTx" preserve="1">
+<p:sldLayout xmlns:a="http://schemas.openxmlformats.org/drawingml/2006/main" xmlns:r="http://schemas.openxmlformats.org/officeDocument/2006/relationships" xmlns:p="http://schemas.openxmlformats.org/presentationml/2006/main" showMasterSp="0" type="vertTitleAndTx" preserve="1">
   <p:cSld name="Vertical Title and Text">
     <p:spTree>
       <p:nvGrpSpPr>
@@ -515,42 +608,42 @@
         </p:nvSpPr>
         <p:spPr>
           <a:xfrm>
-            <a:off x="8724900" y="365125"/>
-            <a:ext cx="2628900" cy="5811838"/>
+            <a:off x="8724901" y="762000"/>
+            <a:ext cx="2628900" cy="5410200"/>
           </a:xfrm>
         </p:spPr>
         <p:txBody>
+          <a:bodyPr vert="eaVert" lIns="45720" tIns="91440" rIns="45720" bIns="91440"/>
+          <a:lstStyle/>
+          <a:p>
+            <a:r>
+              <a:rPr lang="en-US" smtClean="0"/>
+              <a:t>Click to edit Master title style</a:t>
+            </a:r>
+            <a:endParaRPr lang="en-US" dirty="0"/>
+          </a:p>
+        </p:txBody>
+      </p:sp>
+      <p:sp>
+        <p:nvSpPr>
+          <p:cNvPr id="3" name="Vertical Text Placeholder 2"/>
+          <p:cNvSpPr>
+            <a:spLocks noGrp="1"/>
+          </p:cNvSpPr>
+          <p:nvPr>
+            <p:ph type="body" orient="vert" idx="1"/>
+          </p:nvPr>
+        </p:nvSpPr>
+        <p:spPr>
+          <a:xfrm>
+            <a:off x="990601" y="762000"/>
+            <a:ext cx="7581900" cy="5410200"/>
+          </a:xfrm>
+        </p:spPr>
+        <p:txBody>
           <a:bodyPr vert="eaVert"/>
           <a:lstStyle/>
           <a:p>
-            <a:r>
-              <a:rPr lang="en-US" smtClean="0"/>
-              <a:t>Click to edit Master title style</a:t>
-            </a:r>
-            <a:endParaRPr lang="en-GB"/>
-          </a:p>
-        </p:txBody>
-      </p:sp>
-      <p:sp>
-        <p:nvSpPr>
-          <p:cNvPr id="3" name="Vertical Text Placeholder 2"/>
-          <p:cNvSpPr>
-            <a:spLocks noGrp="1"/>
-          </p:cNvSpPr>
-          <p:nvPr>
-            <p:ph type="body" orient="vert" idx="1"/>
-          </p:nvPr>
-        </p:nvSpPr>
-        <p:spPr>
-          <a:xfrm>
-            <a:off x="838200" y="365125"/>
-            <a:ext cx="7734300" cy="5811838"/>
-          </a:xfrm>
-        </p:spPr>
-        <p:txBody>
-          <a:bodyPr vert="eaVert"/>
-          <a:lstStyle/>
-          <a:p>
             <a:pPr lvl="0"/>
             <a:r>
               <a:rPr lang="en-US" smtClean="0"/>
@@ -584,7 +677,7 @@
               <a:rPr lang="en-US" smtClean="0"/>
               <a:t>Fifth level</a:t>
             </a:r>
-            <a:endParaRPr lang="en-GB"/>
+            <a:endParaRPr lang="en-US" dirty="0"/>
           </a:p>
         </p:txBody>
       </p:sp>
@@ -653,10 +746,45 @@
           </a:p>
         </p:txBody>
       </p:sp>
+      <p:cxnSp>
+        <p:nvCxnSpPr>
+          <p:cNvPr id="8" name="Straight Connector 7"/>
+          <p:cNvCxnSpPr/>
+          <p:nvPr/>
+        </p:nvCxnSpPr>
+        <p:spPr>
+          <a:xfrm rot="5400000" flipV="1">
+            <a:off x="10058400" y="59263"/>
+            <a:ext cx="0" cy="914400"/>
+          </a:xfrm>
+          <a:prstGeom prst="line">
+            <a:avLst/>
+          </a:prstGeom>
+          <a:ln w="19050">
+            <a:solidFill>
+              <a:schemeClr val="accent2"/>
+            </a:solidFill>
+          </a:ln>
+        </p:spPr>
+        <p:style>
+          <a:lnRef idx="1">
+            <a:schemeClr val="accent1"/>
+          </a:lnRef>
+          <a:fillRef idx="0">
+            <a:schemeClr val="accent1"/>
+          </a:fillRef>
+          <a:effectRef idx="0">
+            <a:schemeClr val="accent1"/>
+          </a:effectRef>
+          <a:fontRef idx="minor">
+            <a:schemeClr val="tx1"/>
+          </a:fontRef>
+        </p:style>
+      </p:cxnSp>
     </p:spTree>
     <p:extLst>
       <p:ext uri="{BB962C8B-B14F-4D97-AF65-F5344CB8AC3E}">
-        <p14:creationId xmlns:p14="http://schemas.microsoft.com/office/powerpoint/2010/main" val="1106946339"/>
+        <p14:creationId xmlns:p14="http://schemas.microsoft.com/office/powerpoint/2010/main" val="64380625"/>
       </p:ext>
     </p:extLst>
   </p:cSld>
@@ -702,7 +830,7 @@
               <a:rPr lang="en-US" smtClean="0"/>
               <a:t>Click to edit Master title style</a:t>
             </a:r>
-            <a:endParaRPr lang="en-GB"/>
+            <a:endParaRPr lang="en-US" dirty="0"/>
           </a:p>
         </p:txBody>
       </p:sp>
@@ -754,7 +882,7 @@
               <a:rPr lang="en-US" smtClean="0"/>
               <a:t>Fifth level</a:t>
             </a:r>
-            <a:endParaRPr lang="en-GB"/>
+            <a:endParaRPr lang="en-US" dirty="0"/>
           </a:p>
         </p:txBody>
       </p:sp>
@@ -826,7 +954,7 @@
     </p:spTree>
     <p:extLst>
       <p:ext uri="{BB962C8B-B14F-4D97-AF65-F5344CB8AC3E}">
-        <p14:creationId xmlns:p14="http://schemas.microsoft.com/office/powerpoint/2010/main" val="685228910"/>
+        <p14:creationId xmlns:p14="http://schemas.microsoft.com/office/powerpoint/2010/main" val="3494655274"/>
       </p:ext>
     </p:extLst>
   </p:cSld>
@@ -837,7 +965,7 @@
 </file>
 
 <file path=ppt/slideLayouts/slideLayout3.xml><?xml version="1.0" encoding="utf-8"?>
-<p:sldLayout xmlns:a="http://schemas.openxmlformats.org/drawingml/2006/main" xmlns:r="http://schemas.openxmlformats.org/officeDocument/2006/relationships" xmlns:p="http://schemas.openxmlformats.org/presentationml/2006/main" type="secHead" preserve="1">
+<p:sldLayout xmlns:a="http://schemas.openxmlformats.org/drawingml/2006/main" xmlns:r="http://schemas.openxmlformats.org/officeDocument/2006/relationships" xmlns:p="http://schemas.openxmlformats.org/presentationml/2006/main" showMasterSp="0" type="secHead" preserve="1">
   <p:cSld name="Section Header">
     <p:spTree>
       <p:nvGrpSpPr>
@@ -865,15 +993,17 @@
         </p:nvSpPr>
         <p:spPr>
           <a:xfrm>
-            <a:off x="831850" y="1709738"/>
-            <a:ext cx="10515600" cy="2852737"/>
+            <a:off x="457200" y="4960137"/>
+            <a:ext cx="7772400" cy="1463040"/>
           </a:xfrm>
         </p:spPr>
         <p:txBody>
-          <a:bodyPr anchor="b"/>
+          <a:bodyPr anchor="ctr">
+            <a:normAutofit/>
+          </a:bodyPr>
           <a:lstStyle>
-            <a:lvl1pPr>
-              <a:defRPr sz="6000"/>
+            <a:lvl1pPr algn="r">
+              <a:defRPr sz="5000" b="0" spc="200" baseline="0"/>
             </a:lvl1pPr>
           </a:lstStyle>
           <a:p>
@@ -881,7 +1011,7 @@
               <a:rPr lang="en-US" smtClean="0"/>
               <a:t>Click to edit Master title style</a:t>
             </a:r>
-            <a:endParaRPr lang="en-GB"/>
+            <a:endParaRPr lang="en-US" dirty="0"/>
           </a:p>
         </p:txBody>
       </p:sp>
@@ -897,26 +1027,35 @@
         </p:nvSpPr>
         <p:spPr>
           <a:xfrm>
-            <a:off x="831850" y="4589463"/>
-            <a:ext cx="10515600" cy="1500187"/>
+            <a:off x="8610600" y="4960137"/>
+            <a:ext cx="3200400" cy="1463040"/>
           </a:xfrm>
         </p:spPr>
         <p:txBody>
-          <a:bodyPr/>
+          <a:bodyPr lIns="91440" rIns="91440" anchor="ctr">
+            <a:normAutofit/>
+          </a:bodyPr>
           <a:lstStyle>
             <a:lvl1pPr marL="0" indent="0">
+              <a:lnSpc>
+                <a:spcPct val="100000"/>
+              </a:lnSpc>
+              <a:spcBef>
+                <a:spcPts val="0"/>
+              </a:spcBef>
               <a:buNone/>
-              <a:defRPr sz="2400">
+              <a:defRPr sz="1800">
                 <a:solidFill>
                   <a:schemeClr val="tx1">
-                    <a:tint val="75000"/>
+                    <a:lumMod val="95000"/>
+                    <a:lumOff val="5000"/>
                   </a:schemeClr>
                 </a:solidFill>
               </a:defRPr>
             </a:lvl1pPr>
             <a:lvl2pPr marL="457200" indent="0">
               <a:buNone/>
-              <a:defRPr sz="2000">
+              <a:defRPr sz="1800">
                 <a:solidFill>
                   <a:schemeClr val="tx1">
                     <a:tint val="75000"/>
@@ -926,7 +1065,7 @@
             </a:lvl2pPr>
             <a:lvl3pPr marL="914400" indent="0">
               <a:buNone/>
-              <a:defRPr sz="1800">
+              <a:defRPr sz="1600">
                 <a:solidFill>
                   <a:schemeClr val="tx1">
                     <a:tint val="75000"/>
@@ -936,7 +1075,7 @@
             </a:lvl3pPr>
             <a:lvl4pPr marL="1371600" indent="0">
               <a:buNone/>
-              <a:defRPr sz="1600">
+              <a:defRPr sz="1400">
                 <a:solidFill>
                   <a:schemeClr val="tx1">
                     <a:tint val="75000"/>
@@ -946,7 +1085,7 @@
             </a:lvl4pPr>
             <a:lvl5pPr marL="1828800" indent="0">
               <a:buNone/>
-              <a:defRPr sz="1600">
+              <a:defRPr sz="1400">
                 <a:solidFill>
                   <a:schemeClr val="tx1">
                     <a:tint val="75000"/>
@@ -956,7 +1095,7 @@
             </a:lvl5pPr>
             <a:lvl6pPr marL="2286000" indent="0">
               <a:buNone/>
-              <a:defRPr sz="1600">
+              <a:defRPr sz="1400">
                 <a:solidFill>
                   <a:schemeClr val="tx1">
                     <a:tint val="75000"/>
@@ -966,7 +1105,7 @@
             </a:lvl6pPr>
             <a:lvl7pPr marL="2743200" indent="0">
               <a:buNone/>
-              <a:defRPr sz="1600">
+              <a:defRPr sz="1400">
                 <a:solidFill>
                   <a:schemeClr val="tx1">
                     <a:tint val="75000"/>
@@ -976,7 +1115,7 @@
             </a:lvl7pPr>
             <a:lvl8pPr marL="3200400" indent="0">
               <a:buNone/>
-              <a:defRPr sz="1600">
+              <a:defRPr sz="1400">
                 <a:solidFill>
                   <a:schemeClr val="tx1">
                     <a:tint val="75000"/>
@@ -986,7 +1125,7 @@
             </a:lvl8pPr>
             <a:lvl9pPr marL="3657600" indent="0">
               <a:buNone/>
-              <a:defRPr sz="1600">
+              <a:defRPr sz="1400">
                 <a:solidFill>
                   <a:schemeClr val="tx1">
                     <a:tint val="75000"/>
@@ -1069,10 +1208,120 @@
           </a:p>
         </p:txBody>
       </p:sp>
+      <p:cxnSp>
+        <p:nvCxnSpPr>
+          <p:cNvPr id="8" name="Straight Connector 7"/>
+          <p:cNvCxnSpPr/>
+          <p:nvPr/>
+        </p:nvCxnSpPr>
+        <p:spPr>
+          <a:xfrm flipV="1">
+            <a:off x="8386843" y="5264106"/>
+            <a:ext cx="0" cy="914400"/>
+          </a:xfrm>
+          <a:prstGeom prst="line">
+            <a:avLst/>
+          </a:prstGeom>
+          <a:ln w="19050">
+            <a:solidFill>
+              <a:schemeClr val="accent1">
+                <a:lumMod val="75000"/>
+              </a:schemeClr>
+            </a:solidFill>
+          </a:ln>
+        </p:spPr>
+        <p:style>
+          <a:lnRef idx="1">
+            <a:schemeClr val="accent1"/>
+          </a:lnRef>
+          <a:fillRef idx="0">
+            <a:schemeClr val="accent1"/>
+          </a:fillRef>
+          <a:effectRef idx="0">
+            <a:schemeClr val="accent1"/>
+          </a:effectRef>
+          <a:fontRef idx="minor">
+            <a:schemeClr val="tx1"/>
+          </a:fontRef>
+        </p:style>
+      </p:cxnSp>
+      <p:cxnSp>
+        <p:nvCxnSpPr>
+          <p:cNvPr id="12" name="Straight Connector 11"/>
+          <p:cNvCxnSpPr/>
+          <p:nvPr/>
+        </p:nvCxnSpPr>
+        <p:spPr>
+          <a:xfrm flipV="1">
+            <a:off x="8386842" y="5264106"/>
+            <a:ext cx="0" cy="914400"/>
+          </a:xfrm>
+          <a:prstGeom prst="line">
+            <a:avLst/>
+          </a:prstGeom>
+          <a:ln w="19050">
+            <a:solidFill>
+              <a:schemeClr val="accent3"/>
+            </a:solidFill>
+          </a:ln>
+        </p:spPr>
+        <p:style>
+          <a:lnRef idx="1">
+            <a:schemeClr val="accent1"/>
+          </a:lnRef>
+          <a:fillRef idx="0">
+            <a:schemeClr val="accent1"/>
+          </a:fillRef>
+          <a:effectRef idx="0">
+            <a:schemeClr val="accent1"/>
+          </a:effectRef>
+          <a:fontRef idx="minor">
+            <a:schemeClr val="tx1"/>
+          </a:fontRef>
+        </p:style>
+      </p:cxnSp>
+      <p:sp>
+        <p:nvSpPr>
+          <p:cNvPr id="13" name="Rectangle 12"/>
+          <p:cNvSpPr/>
+          <p:nvPr/>
+        </p:nvSpPr>
+        <p:spPr>
+          <a:xfrm>
+            <a:off x="0" y="-1"/>
+            <a:ext cx="12192000" cy="4572000"/>
+          </a:xfrm>
+          <a:prstGeom prst="rect">
+            <a:avLst/>
+          </a:prstGeom>
+          <a:solidFill>
+            <a:schemeClr val="accent3"/>
+          </a:solidFill>
+          <a:ln>
+            <a:noFill/>
+          </a:ln>
+        </p:spPr>
+        <p:style>
+          <a:lnRef idx="2">
+            <a:schemeClr val="accent1">
+              <a:shade val="50000"/>
+            </a:schemeClr>
+          </a:lnRef>
+          <a:fillRef idx="1">
+            <a:schemeClr val="accent1"/>
+          </a:fillRef>
+          <a:effectRef idx="0">
+            <a:schemeClr val="accent1"/>
+          </a:effectRef>
+          <a:fontRef idx="minor">
+            <a:schemeClr val="lt1"/>
+          </a:fontRef>
+        </p:style>
+      </p:sp>
     </p:spTree>
     <p:extLst>
       <p:ext uri="{BB962C8B-B14F-4D97-AF65-F5344CB8AC3E}">
-        <p14:creationId xmlns:p14="http://schemas.microsoft.com/office/powerpoint/2010/main" val="551563142"/>
+        <p14:creationId xmlns:p14="http://schemas.microsoft.com/office/powerpoint/2010/main" val="1947874668"/>
       </p:ext>
     </p:extLst>
   </p:cSld>
@@ -1109,7 +1358,12 @@
             <p:ph type="title"/>
           </p:nvPr>
         </p:nvSpPr>
-        <p:spPr/>
+        <p:spPr>
+          <a:xfrm>
+            <a:off x="1024128" y="585216"/>
+            <a:ext cx="9720072" cy="1499616"/>
+          </a:xfrm>
+        </p:spPr>
         <p:txBody>
           <a:bodyPr/>
           <a:lstStyle/>
@@ -1118,7 +1372,7 @@
               <a:rPr lang="en-US" smtClean="0"/>
               <a:t>Click to edit Master title style</a:t>
             </a:r>
-            <a:endParaRPr lang="en-GB"/>
+            <a:endParaRPr lang="en-US" dirty="0"/>
           </a:p>
         </p:txBody>
       </p:sp>
@@ -1134,8 +1388,8 @@
         </p:nvSpPr>
         <p:spPr>
           <a:xfrm>
-            <a:off x="838200" y="1825625"/>
-            <a:ext cx="5181600" cy="4351338"/>
+            <a:off x="1024127" y="2286000"/>
+            <a:ext cx="4754880" cy="4023360"/>
           </a:xfrm>
         </p:spPr>
         <p:txBody>
@@ -1175,7 +1429,7 @@
               <a:rPr lang="en-US" smtClean="0"/>
               <a:t>Fifth level</a:t>
             </a:r>
-            <a:endParaRPr lang="en-GB"/>
+            <a:endParaRPr lang="en-US" dirty="0"/>
           </a:p>
         </p:txBody>
       </p:sp>
@@ -1191,8 +1445,8 @@
         </p:nvSpPr>
         <p:spPr>
           <a:xfrm>
-            <a:off x="6172200" y="1825625"/>
-            <a:ext cx="5181600" cy="4351338"/>
+            <a:off x="5989320" y="2286000"/>
+            <a:ext cx="4754880" cy="4023360"/>
           </a:xfrm>
         </p:spPr>
         <p:txBody>
@@ -1232,7 +1486,7 @@
               <a:rPr lang="en-US" smtClean="0"/>
               <a:t>Fifth level</a:t>
             </a:r>
-            <a:endParaRPr lang="en-GB"/>
+            <a:endParaRPr lang="en-US" dirty="0"/>
           </a:p>
         </p:txBody>
       </p:sp>
@@ -1304,7 +1558,7 @@
     </p:spTree>
     <p:extLst>
       <p:ext uri="{BB962C8B-B14F-4D97-AF65-F5344CB8AC3E}">
-        <p14:creationId xmlns:p14="http://schemas.microsoft.com/office/powerpoint/2010/main" val="156729165"/>
+        <p14:creationId xmlns:p14="http://schemas.microsoft.com/office/powerpoint/2010/main" val="2290310722"/>
       </p:ext>
     </p:extLst>
   </p:cSld>
@@ -1333,54 +1587,64 @@
       </p:grpSpPr>
       <p:sp>
         <p:nvSpPr>
-          <p:cNvPr id="2" name="Title 1"/>
+          <p:cNvPr id="10" name="Title 9"/>
           <p:cNvSpPr>
             <a:spLocks noGrp="1"/>
           </p:cNvSpPr>
           <p:nvPr>
             <p:ph type="title"/>
+          </p:nvPr>
+        </p:nvSpPr>
+        <p:spPr/>
+        <p:txBody>
+          <a:bodyPr/>
+          <a:lstStyle/>
+          <a:p>
+            <a:r>
+              <a:rPr lang="en-US" smtClean="0"/>
+              <a:t>Click to edit Master title style</a:t>
+            </a:r>
+            <a:endParaRPr lang="en-US" dirty="0"/>
+          </a:p>
+        </p:txBody>
+      </p:sp>
+      <p:sp>
+        <p:nvSpPr>
+          <p:cNvPr id="3" name="Text Placeholder 2"/>
+          <p:cNvSpPr>
+            <a:spLocks noGrp="1"/>
+          </p:cNvSpPr>
+          <p:nvPr>
+            <p:ph type="body" idx="1"/>
           </p:nvPr>
         </p:nvSpPr>
         <p:spPr>
           <a:xfrm>
-            <a:off x="839788" y="365125"/>
-            <a:ext cx="10515600" cy="1325563"/>
+            <a:off x="1024128" y="2179636"/>
+            <a:ext cx="4754880" cy="822960"/>
           </a:xfrm>
         </p:spPr>
         <p:txBody>
-          <a:bodyPr/>
-          <a:lstStyle/>
-          <a:p>
-            <a:r>
-              <a:rPr lang="en-US" smtClean="0"/>
-              <a:t>Click to edit Master title style</a:t>
-            </a:r>
-            <a:endParaRPr lang="en-GB"/>
-          </a:p>
-        </p:txBody>
-      </p:sp>
-      <p:sp>
-        <p:nvSpPr>
-          <p:cNvPr id="3" name="Text Placeholder 2"/>
-          <p:cNvSpPr>
-            <a:spLocks noGrp="1"/>
-          </p:cNvSpPr>
-          <p:nvPr>
-            <p:ph type="body" idx="1"/>
-          </p:nvPr>
-        </p:nvSpPr>
-        <p:spPr>
-          <a:xfrm>
-            <a:off x="839788" y="1681163"/>
-            <a:ext cx="5157787" cy="823912"/>
-          </a:xfrm>
-        </p:spPr>
-        <p:txBody>
-          <a:bodyPr anchor="b"/>
+          <a:bodyPr lIns="137160" rIns="137160" anchor="ctr">
+            <a:normAutofit/>
+          </a:bodyPr>
           <a:lstStyle>
             <a:lvl1pPr marL="0" indent="0">
+              <a:spcBef>
+                <a:spcPts val="0"/>
+              </a:spcBef>
+              <a:spcAft>
+                <a:spcPts val="0"/>
+              </a:spcAft>
               <a:buNone/>
-              <a:defRPr sz="2400" b="1"/>
+              <a:defRPr sz="2300" b="0" cap="none" baseline="0">
+                <a:solidFill>
+                  <a:schemeClr val="accent2">
+                    <a:lumMod val="75000"/>
+                  </a:schemeClr>
+                </a:solidFill>
+                <a:latin typeface="+mn-lt"/>
+              </a:defRPr>
             </a:lvl1pPr>
             <a:lvl2pPr marL="457200" indent="0">
               <a:buNone/>
@@ -1436,8 +1700,8 @@
         </p:nvSpPr>
         <p:spPr>
           <a:xfrm>
-            <a:off x="839788" y="2505075"/>
-            <a:ext cx="5157787" cy="3684588"/>
+            <a:off x="1024128" y="2967788"/>
+            <a:ext cx="4754880" cy="3341572"/>
           </a:xfrm>
         </p:spPr>
         <p:txBody>
@@ -1477,7 +1741,7 @@
               <a:rPr lang="en-US" smtClean="0"/>
               <a:t>Fifth level</a:t>
             </a:r>
-            <a:endParaRPr lang="en-GB"/>
+            <a:endParaRPr lang="en-US" dirty="0"/>
           </a:p>
         </p:txBody>
       </p:sp>
@@ -1493,16 +1757,33 @@
         </p:nvSpPr>
         <p:spPr>
           <a:xfrm>
-            <a:off x="6172200" y="1681163"/>
-            <a:ext cx="5183188" cy="823912"/>
+            <a:off x="5990888" y="2179636"/>
+            <a:ext cx="4754880" cy="822960"/>
           </a:xfrm>
         </p:spPr>
         <p:txBody>
-          <a:bodyPr anchor="b"/>
+          <a:bodyPr lIns="137160" rIns="137160" anchor="ctr">
+            <a:normAutofit/>
+          </a:bodyPr>
           <a:lstStyle>
             <a:lvl1pPr marL="0" indent="0">
+              <a:spcBef>
+                <a:spcPts val="0"/>
+              </a:spcBef>
+              <a:spcAft>
+                <a:spcPts val="0"/>
+              </a:spcAft>
               <a:buNone/>
-              <a:defRPr sz="2400" b="1"/>
+              <a:defRPr lang="en-US" sz="2300" b="0" kern="1200" cap="none" baseline="0" dirty="0">
+                <a:solidFill>
+                  <a:schemeClr val="accent2">
+                    <a:lumMod val="75000"/>
+                  </a:schemeClr>
+                </a:solidFill>
+                <a:latin typeface="+mn-lt"/>
+                <a:ea typeface="+mn-ea"/>
+                <a:cs typeface="+mn-cs"/>
+              </a:defRPr>
             </a:lvl1pPr>
             <a:lvl2pPr marL="457200" indent="0">
               <a:buNone/>
@@ -1538,7 +1819,15 @@
             </a:lvl9pPr>
           </a:lstStyle>
           <a:p>
-            <a:pPr lvl="0"/>
+            <a:pPr marL="0" lvl="0" indent="0" algn="l" defTabSz="914400" rtl="0" eaLnBrk="1" latinLnBrk="0" hangingPunct="1">
+              <a:lnSpc>
+                <a:spcPct val="90000"/>
+              </a:lnSpc>
+              <a:spcBef>
+                <a:spcPts val="1800"/>
+              </a:spcBef>
+              <a:buNone/>
+            </a:pPr>
             <a:r>
               <a:rPr lang="en-US" smtClean="0"/>
               <a:t>Click to edit Master text styles</a:t>
@@ -1558,8 +1847,8 @@
         </p:nvSpPr>
         <p:spPr>
           <a:xfrm>
-            <a:off x="6172200" y="2505075"/>
-            <a:ext cx="5183188" cy="3684588"/>
+            <a:off x="5990888" y="2967788"/>
+            <a:ext cx="4754880" cy="3341572"/>
           </a:xfrm>
         </p:spPr>
         <p:txBody>
@@ -1599,7 +1888,7 @@
               <a:rPr lang="en-US" smtClean="0"/>
               <a:t>Fifth level</a:t>
             </a:r>
-            <a:endParaRPr lang="en-GB"/>
+            <a:endParaRPr lang="en-US" dirty="0"/>
           </a:p>
         </p:txBody>
       </p:sp>
@@ -1671,7 +1960,7 @@
     </p:spTree>
     <p:extLst>
       <p:ext uri="{BB962C8B-B14F-4D97-AF65-F5344CB8AC3E}">
-        <p14:creationId xmlns:p14="http://schemas.microsoft.com/office/powerpoint/2010/main" val="3490314048"/>
+        <p14:creationId xmlns:p14="http://schemas.microsoft.com/office/powerpoint/2010/main" val="466848282"/>
       </p:ext>
     </p:extLst>
   </p:cSld>
@@ -1717,7 +2006,7 @@
               <a:rPr lang="en-US" smtClean="0"/>
               <a:t>Click to edit Master title style</a:t>
             </a:r>
-            <a:endParaRPr lang="en-GB"/>
+            <a:endParaRPr lang="en-US" dirty="0"/>
           </a:p>
         </p:txBody>
       </p:sp>
@@ -1789,7 +2078,7 @@
     </p:spTree>
     <p:extLst>
       <p:ext uri="{BB962C8B-B14F-4D97-AF65-F5344CB8AC3E}">
-        <p14:creationId xmlns:p14="http://schemas.microsoft.com/office/powerpoint/2010/main" val="3733415837"/>
+        <p14:creationId xmlns:p14="http://schemas.microsoft.com/office/powerpoint/2010/main" val="396223085"/>
       </p:ext>
     </p:extLst>
   </p:cSld>
@@ -1800,7 +2089,7 @@
 </file>
 
 <file path=ppt/slideLayouts/slideLayout7.xml><?xml version="1.0" encoding="utf-8"?>
-<p:sldLayout xmlns:a="http://schemas.openxmlformats.org/drawingml/2006/main" xmlns:r="http://schemas.openxmlformats.org/officeDocument/2006/relationships" xmlns:p="http://schemas.openxmlformats.org/presentationml/2006/main" type="blank" preserve="1">
+<p:sldLayout xmlns:a="http://schemas.openxmlformats.org/drawingml/2006/main" xmlns:r="http://schemas.openxmlformats.org/officeDocument/2006/relationships" xmlns:p="http://schemas.openxmlformats.org/presentationml/2006/main" showMasterSp="0" type="blank" preserve="1">
   <p:cSld name="Blank">
     <p:spTree>
       <p:nvGrpSpPr>
@@ -1884,7 +2173,7 @@
     </p:spTree>
     <p:extLst>
       <p:ext uri="{BB962C8B-B14F-4D97-AF65-F5344CB8AC3E}">
-        <p14:creationId xmlns:p14="http://schemas.microsoft.com/office/powerpoint/2010/main" val="648642730"/>
+        <p14:creationId xmlns:p14="http://schemas.microsoft.com/office/powerpoint/2010/main" val="1762885489"/>
       </p:ext>
     </p:extLst>
   </p:cSld>
@@ -1913,7 +2202,7 @@
       </p:grpSpPr>
       <p:sp>
         <p:nvSpPr>
-          <p:cNvPr id="2" name="Title 1"/>
+          <p:cNvPr id="8" name="Title 7"/>
           <p:cNvSpPr>
             <a:spLocks noGrp="1"/>
           </p:cNvSpPr>
@@ -1923,15 +2212,20 @@
         </p:nvSpPr>
         <p:spPr>
           <a:xfrm>
-            <a:off x="839788" y="457200"/>
-            <a:ext cx="3932237" cy="1600200"/>
+            <a:off x="1024128" y="471509"/>
+            <a:ext cx="4389120" cy="1737360"/>
           </a:xfrm>
         </p:spPr>
         <p:txBody>
-          <a:bodyPr anchor="b"/>
+          <a:bodyPr>
+            <a:noAutofit/>
+          </a:bodyPr>
           <a:lstStyle>
             <a:lvl1pPr>
-              <a:defRPr sz="3200"/>
+              <a:lnSpc>
+                <a:spcPct val="80000"/>
+              </a:lnSpc>
+              <a:defRPr sz="4000"/>
             </a:lvl1pPr>
           </a:lstStyle>
           <a:p>
@@ -1939,7 +2233,7 @@
               <a:rPr lang="en-US" smtClean="0"/>
               <a:t>Click to edit Master title style</a:t>
             </a:r>
-            <a:endParaRPr lang="en-GB"/>
+            <a:endParaRPr lang="en-US" dirty="0"/>
           </a:p>
         </p:txBody>
       </p:sp>
@@ -1955,39 +2249,39 @@
         </p:nvSpPr>
         <p:spPr>
           <a:xfrm>
-            <a:off x="5183188" y="987425"/>
-            <a:ext cx="6172200" cy="4873625"/>
+            <a:off x="5715000" y="822960"/>
+            <a:ext cx="5678424" cy="5184648"/>
           </a:xfrm>
         </p:spPr>
         <p:txBody>
           <a:bodyPr/>
           <a:lstStyle>
             <a:lvl1pPr>
-              <a:defRPr sz="3200"/>
+              <a:defRPr sz="2400"/>
             </a:lvl1pPr>
             <a:lvl2pPr>
-              <a:defRPr sz="2800"/>
+              <a:defRPr sz="2000"/>
             </a:lvl2pPr>
             <a:lvl3pPr>
-              <a:defRPr sz="2400"/>
+              <a:defRPr sz="1600"/>
             </a:lvl3pPr>
             <a:lvl4pPr>
-              <a:defRPr sz="2000"/>
+              <a:defRPr sz="1600"/>
             </a:lvl4pPr>
             <a:lvl5pPr>
-              <a:defRPr sz="2000"/>
+              <a:defRPr sz="1600"/>
             </a:lvl5pPr>
             <a:lvl6pPr>
-              <a:defRPr sz="2000"/>
+              <a:defRPr sz="1600"/>
             </a:lvl6pPr>
             <a:lvl7pPr>
-              <a:defRPr sz="2000"/>
+              <a:defRPr sz="1600"/>
             </a:lvl7pPr>
             <a:lvl8pPr>
-              <a:defRPr sz="2000"/>
+              <a:defRPr sz="1600"/>
             </a:lvl8pPr>
             <a:lvl9pPr>
-              <a:defRPr sz="2000"/>
+              <a:defRPr sz="1600"/>
             </a:lvl9pPr>
           </a:lstStyle>
           <a:p>
@@ -2024,7 +2318,7 @@
               <a:rPr lang="en-US" smtClean="0"/>
               <a:t>Fifth level</a:t>
             </a:r>
-            <a:endParaRPr lang="en-GB"/>
+            <a:endParaRPr lang="en-US" dirty="0"/>
           </a:p>
         </p:txBody>
       </p:sp>
@@ -2040,48 +2334,56 @@
         </p:nvSpPr>
         <p:spPr>
           <a:xfrm>
-            <a:off x="839788" y="2057400"/>
-            <a:ext cx="3932237" cy="3811588"/>
+            <a:off x="1024128" y="2257506"/>
+            <a:ext cx="4389120" cy="3762294"/>
           </a:xfrm>
         </p:spPr>
         <p:txBody>
-          <a:bodyPr/>
+          <a:bodyPr lIns="91440" rIns="91440">
+            <a:normAutofit/>
+          </a:bodyPr>
           <a:lstStyle>
             <a:lvl1pPr marL="0" indent="0">
+              <a:lnSpc>
+                <a:spcPct val="108000"/>
+              </a:lnSpc>
+              <a:spcBef>
+                <a:spcPts val="600"/>
+              </a:spcBef>
               <a:buNone/>
               <a:defRPr sz="1600"/>
             </a:lvl1pPr>
             <a:lvl2pPr marL="457200" indent="0">
               <a:buNone/>
-              <a:defRPr sz="1400"/>
+              <a:defRPr sz="1200"/>
             </a:lvl2pPr>
             <a:lvl3pPr marL="914400" indent="0">
               <a:buNone/>
-              <a:defRPr sz="1200"/>
+              <a:defRPr sz="1000"/>
             </a:lvl3pPr>
             <a:lvl4pPr marL="1371600" indent="0">
               <a:buNone/>
-              <a:defRPr sz="1000"/>
+              <a:defRPr sz="900"/>
             </a:lvl4pPr>
             <a:lvl5pPr marL="1828800" indent="0">
               <a:buNone/>
-              <a:defRPr sz="1000"/>
+              <a:defRPr sz="900"/>
             </a:lvl5pPr>
             <a:lvl6pPr marL="2286000" indent="0">
               <a:buNone/>
-              <a:defRPr sz="1000"/>
+              <a:defRPr sz="900"/>
             </a:lvl6pPr>
             <a:lvl7pPr marL="2743200" indent="0">
               <a:buNone/>
-              <a:defRPr sz="1000"/>
+              <a:defRPr sz="900"/>
             </a:lvl7pPr>
             <a:lvl8pPr marL="3200400" indent="0">
               <a:buNone/>
-              <a:defRPr sz="1000"/>
+              <a:defRPr sz="900"/>
             </a:lvl8pPr>
             <a:lvl9pPr marL="3657600" indent="0">
               <a:buNone/>
-              <a:defRPr sz="1000"/>
+              <a:defRPr sz="900"/>
             </a:lvl9pPr>
           </a:lstStyle>
           <a:p>
@@ -2161,7 +2463,7 @@
     </p:spTree>
     <p:extLst>
       <p:ext uri="{BB962C8B-B14F-4D97-AF65-F5344CB8AC3E}">
-        <p14:creationId xmlns:p14="http://schemas.microsoft.com/office/powerpoint/2010/main" val="2300726075"/>
+        <p14:creationId xmlns:p14="http://schemas.microsoft.com/office/powerpoint/2010/main" val="3826044063"/>
       </p:ext>
     </p:extLst>
   </p:cSld>
@@ -2172,7 +2474,7 @@
 </file>
 
 <file path=ppt/slideLayouts/slideLayout9.xml><?xml version="1.0" encoding="utf-8"?>
-<p:sldLayout xmlns:a="http://schemas.openxmlformats.org/drawingml/2006/main" xmlns:r="http://schemas.openxmlformats.org/officeDocument/2006/relationships" xmlns:p="http://schemas.openxmlformats.org/presentationml/2006/main" type="picTx" preserve="1">
+<p:sldLayout xmlns:a="http://schemas.openxmlformats.org/drawingml/2006/main" xmlns:r="http://schemas.openxmlformats.org/officeDocument/2006/relationships" xmlns:p="http://schemas.openxmlformats.org/presentationml/2006/main" showMasterSp="0" type="picTx" preserve="1">
   <p:cSld name="Picture with Caption">
     <p:spTree>
       <p:nvGrpSpPr>
@@ -2200,15 +2502,17 @@
         </p:nvSpPr>
         <p:spPr>
           <a:xfrm>
-            <a:off x="839788" y="457200"/>
-            <a:ext cx="3932237" cy="1600200"/>
+            <a:off x="457200" y="4960138"/>
+            <a:ext cx="7772400" cy="1463040"/>
           </a:xfrm>
         </p:spPr>
         <p:txBody>
-          <a:bodyPr anchor="b"/>
+          <a:bodyPr anchor="ctr">
+            <a:normAutofit/>
+          </a:bodyPr>
           <a:lstStyle>
-            <a:lvl1pPr>
-              <a:defRPr sz="3200"/>
+            <a:lvl1pPr algn="r">
+              <a:defRPr sz="5000" spc="200" baseline="0"/>
             </a:lvl1pPr>
           </a:lstStyle>
           <a:p>
@@ -2216,7 +2520,7 @@
               <a:rPr lang="en-US" smtClean="0"/>
               <a:t>Click to edit Master title style</a:t>
             </a:r>
-            <a:endParaRPr lang="en-GB"/>
+            <a:endParaRPr lang="en-US" dirty="0"/>
           </a:p>
         </p:txBody>
       </p:sp>
@@ -2224,7 +2528,7 @@
         <p:nvSpPr>
           <p:cNvPr id="3" name="Picture Placeholder 2"/>
           <p:cNvSpPr>
-            <a:spLocks noGrp="1"/>
+            <a:spLocks noGrp="1" noChangeAspect="1"/>
           </p:cNvSpPr>
           <p:nvPr>
             <p:ph type="pic" idx="1"/>
@@ -2232,12 +2536,18 @@
         </p:nvSpPr>
         <p:spPr>
           <a:xfrm>
-            <a:off x="5183188" y="987425"/>
-            <a:ext cx="6172200" cy="4873625"/>
+            <a:off x="0" y="-1"/>
+            <a:ext cx="12188952" cy="4572000"/>
           </a:xfrm>
+          <a:solidFill>
+            <a:schemeClr val="accent2">
+              <a:lumMod val="60000"/>
+              <a:lumOff val="40000"/>
+            </a:schemeClr>
+          </a:solidFill>
         </p:spPr>
         <p:txBody>
-          <a:bodyPr/>
+          <a:bodyPr lIns="457200" tIns="365760" rIns="45720" bIns="45720" anchor="t"/>
           <a:lstStyle>
             <a:lvl1pPr marL="0" indent="0">
               <a:buNone/>
@@ -2277,7 +2587,11 @@
             </a:lvl9pPr>
           </a:lstStyle>
           <a:p>
-            <a:endParaRPr lang="en-GB"/>
+            <a:r>
+              <a:rPr lang="en-US" smtClean="0"/>
+              <a:t>Click icon to add picture</a:t>
+            </a:r>
+            <a:endParaRPr lang="en-US" dirty="0"/>
           </a:p>
         </p:txBody>
       </p:sp>
@@ -2293,16 +2607,31 @@
         </p:nvSpPr>
         <p:spPr>
           <a:xfrm>
-            <a:off x="839788" y="2057400"/>
-            <a:ext cx="3932237" cy="3811588"/>
+            <a:off x="8610600" y="4960138"/>
+            <a:ext cx="3200400" cy="1463040"/>
           </a:xfrm>
         </p:spPr>
         <p:txBody>
-          <a:bodyPr/>
+          <a:bodyPr lIns="91440" rIns="91440" anchor="ctr">
+            <a:normAutofit/>
+          </a:bodyPr>
           <a:lstStyle>
             <a:lvl1pPr marL="0" indent="0">
+              <a:lnSpc>
+                <a:spcPct val="100000"/>
+              </a:lnSpc>
+              <a:spcBef>
+                <a:spcPts val="0"/>
+              </a:spcBef>
               <a:buNone/>
-              <a:defRPr sz="1600"/>
+              <a:defRPr sz="1800">
+                <a:solidFill>
+                  <a:schemeClr val="tx1">
+                    <a:lumMod val="95000"/>
+                    <a:lumOff val="5000"/>
+                  </a:schemeClr>
+                </a:solidFill>
+              </a:defRPr>
             </a:lvl1pPr>
             <a:lvl2pPr marL="457200" indent="0">
               <a:buNone/>
@@ -2411,10 +2740,45 @@
           </a:p>
         </p:txBody>
       </p:sp>
+      <p:cxnSp>
+        <p:nvCxnSpPr>
+          <p:cNvPr id="8" name="Straight Connector 7"/>
+          <p:cNvCxnSpPr/>
+          <p:nvPr/>
+        </p:nvCxnSpPr>
+        <p:spPr>
+          <a:xfrm flipV="1">
+            <a:off x="8386843" y="5264106"/>
+            <a:ext cx="0" cy="914400"/>
+          </a:xfrm>
+          <a:prstGeom prst="line">
+            <a:avLst/>
+          </a:prstGeom>
+          <a:ln w="19050">
+            <a:solidFill>
+              <a:schemeClr val="accent1"/>
+            </a:solidFill>
+          </a:ln>
+        </p:spPr>
+        <p:style>
+          <a:lnRef idx="1">
+            <a:schemeClr val="accent1"/>
+          </a:lnRef>
+          <a:fillRef idx="0">
+            <a:schemeClr val="accent1"/>
+          </a:fillRef>
+          <a:effectRef idx="0">
+            <a:schemeClr val="accent1"/>
+          </a:effectRef>
+          <a:fontRef idx="minor">
+            <a:schemeClr val="tx1"/>
+          </a:fontRef>
+        </p:style>
+      </p:cxnSp>
     </p:spTree>
     <p:extLst>
       <p:ext uri="{BB962C8B-B14F-4D97-AF65-F5344CB8AC3E}">
-        <p14:creationId xmlns:p14="http://schemas.microsoft.com/office/powerpoint/2010/main" val="1586914987"/>
+        <p14:creationId xmlns:p14="http://schemas.microsoft.com/office/powerpoint/2010/main" val="568168606"/>
       </p:ext>
     </p:extLst>
   </p:cSld>
@@ -2458,8 +2822,8 @@
         </p:nvSpPr>
         <p:spPr>
           <a:xfrm>
-            <a:off x="838200" y="365125"/>
-            <a:ext cx="10515600" cy="1325563"/>
+            <a:off x="1024128" y="585216"/>
+            <a:ext cx="9720072" cy="1499616"/>
           </a:xfrm>
           <a:prstGeom prst="rect">
             <a:avLst/>
@@ -2475,7 +2839,7 @@
               <a:rPr lang="en-US" smtClean="0"/>
               <a:t>Click to edit Master title style</a:t>
             </a:r>
-            <a:endParaRPr lang="en-GB"/>
+            <a:endParaRPr lang="en-US" dirty="0"/>
           </a:p>
         </p:txBody>
       </p:sp>
@@ -2491,15 +2855,15 @@
         </p:nvSpPr>
         <p:spPr>
           <a:xfrm>
-            <a:off x="838200" y="1825625"/>
-            <a:ext cx="10515600" cy="4351338"/>
+            <a:off x="1024128" y="2286000"/>
+            <a:ext cx="9720073" cy="4023360"/>
           </a:xfrm>
           <a:prstGeom prst="rect">
             <a:avLst/>
           </a:prstGeom>
         </p:spPr>
         <p:txBody>
-          <a:bodyPr vert="horz" lIns="91440" tIns="45720" rIns="91440" bIns="45720" rtlCol="0">
+          <a:bodyPr vert="horz" lIns="45720" tIns="45720" rIns="45720" bIns="45720" rtlCol="0">
             <a:normAutofit/>
           </a:bodyPr>
           <a:lstStyle/>
@@ -2537,7 +2901,7 @@
               <a:rPr lang="en-US" smtClean="0"/>
               <a:t>Fifth level</a:t>
             </a:r>
-            <a:endParaRPr lang="en-GB"/>
+            <a:endParaRPr lang="en-US" dirty="0"/>
           </a:p>
         </p:txBody>
       </p:sp>
@@ -2553,8 +2917,8 @@
         </p:nvSpPr>
         <p:spPr>
           <a:xfrm>
-            <a:off x="838200" y="6356350"/>
-            <a:ext cx="2743200" cy="365125"/>
+            <a:off x="1024129" y="6470704"/>
+            <a:ext cx="2154143" cy="274320"/>
           </a:xfrm>
           <a:prstGeom prst="rect">
             <a:avLst/>
@@ -2564,12 +2928,14 @@
           <a:bodyPr vert="horz" lIns="91440" tIns="45720" rIns="91440" bIns="45720" rtlCol="0" anchor="ctr"/>
           <a:lstStyle>
             <a:lvl1pPr algn="l">
-              <a:defRPr sz="1200">
+              <a:defRPr sz="1000">
                 <a:solidFill>
                   <a:schemeClr val="tx1">
-                    <a:tint val="75000"/>
+                    <a:lumMod val="95000"/>
+                    <a:lumOff val="5000"/>
                   </a:schemeClr>
                 </a:solidFill>
+                <a:latin typeface="+mj-lt"/>
               </a:defRPr>
             </a:lvl1pPr>
           </a:lstStyle>
@@ -2594,8 +2960,8 @@
         </p:nvSpPr>
         <p:spPr>
           <a:xfrm>
-            <a:off x="4038600" y="6356350"/>
-            <a:ext cx="4114800" cy="365125"/>
+            <a:off x="4842932" y="6470704"/>
+            <a:ext cx="5901459" cy="274320"/>
           </a:xfrm>
           <a:prstGeom prst="rect">
             <a:avLst/>
@@ -2604,13 +2970,15 @@
         <p:txBody>
           <a:bodyPr vert="horz" lIns="91440" tIns="45720" rIns="91440" bIns="45720" rtlCol="0" anchor="ctr"/>
           <a:lstStyle>
-            <a:lvl1pPr algn="ctr">
-              <a:defRPr sz="1200">
+            <a:lvl1pPr algn="r">
+              <a:defRPr sz="1000" cap="all" baseline="0">
                 <a:solidFill>
                   <a:schemeClr val="tx1">
-                    <a:tint val="75000"/>
+                    <a:lumMod val="95000"/>
+                    <a:lumOff val="5000"/>
                   </a:schemeClr>
                 </a:solidFill>
+                <a:latin typeface="+mj-lt"/>
               </a:defRPr>
             </a:lvl1pPr>
           </a:lstStyle>
@@ -2631,8 +2999,8 @@
         </p:nvSpPr>
         <p:spPr>
           <a:xfrm>
-            <a:off x="8610600" y="6356350"/>
-            <a:ext cx="2743200" cy="365125"/>
+            <a:off x="10837333" y="6470704"/>
+            <a:ext cx="973667" cy="274320"/>
           </a:xfrm>
           <a:prstGeom prst="rect">
             <a:avLst/>
@@ -2641,13 +3009,15 @@
         <p:txBody>
           <a:bodyPr vert="horz" lIns="91440" tIns="45720" rIns="91440" bIns="45720" rtlCol="0" anchor="ctr"/>
           <a:lstStyle>
-            <a:lvl1pPr algn="r">
-              <a:defRPr sz="1200">
+            <a:lvl1pPr algn="l">
+              <a:defRPr sz="1000">
                 <a:solidFill>
                   <a:schemeClr val="tx1">
-                    <a:tint val="75000"/>
+                    <a:lumMod val="95000"/>
+                    <a:lumOff val="5000"/>
                   </a:schemeClr>
                 </a:solidFill>
+                <a:latin typeface="+mj-lt"/>
               </a:defRPr>
             </a:lvl1pPr>
           </a:lstStyle>
@@ -2660,40 +3030,78 @@
           </a:p>
         </p:txBody>
       </p:sp>
+      <p:cxnSp>
+        <p:nvCxnSpPr>
+          <p:cNvPr id="8" name="Straight Connector 7"/>
+          <p:cNvCxnSpPr/>
+          <p:nvPr/>
+        </p:nvCxnSpPr>
+        <p:spPr>
+          <a:xfrm flipV="1">
+            <a:off x="762000" y="826324"/>
+            <a:ext cx="0" cy="914400"/>
+          </a:xfrm>
+          <a:prstGeom prst="line">
+            <a:avLst/>
+          </a:prstGeom>
+          <a:ln w="19050">
+            <a:solidFill>
+              <a:schemeClr val="accent2"/>
+            </a:solidFill>
+          </a:ln>
+        </p:spPr>
+        <p:style>
+          <a:lnRef idx="1">
+            <a:schemeClr val="accent1"/>
+          </a:lnRef>
+          <a:fillRef idx="0">
+            <a:schemeClr val="accent1"/>
+          </a:fillRef>
+          <a:effectRef idx="0">
+            <a:schemeClr val="accent1"/>
+          </a:effectRef>
+          <a:fontRef idx="minor">
+            <a:schemeClr val="tx1"/>
+          </a:fontRef>
+        </p:style>
+      </p:cxnSp>
     </p:spTree>
     <p:extLst>
       <p:ext uri="{BB962C8B-B14F-4D97-AF65-F5344CB8AC3E}">
-        <p14:creationId xmlns:p14="http://schemas.microsoft.com/office/powerpoint/2010/main" val="325998835"/>
+        <p14:creationId xmlns:p14="http://schemas.microsoft.com/office/powerpoint/2010/main" val="47429125"/>
       </p:ext>
     </p:extLst>
   </p:cSld>
-  <p:clrMap bg1="lt1" tx1="dk1" bg2="lt2" tx2="dk2" accent1="accent1" accent2="accent2" accent3="accent3" accent4="accent4" accent5="accent5" accent6="accent6" hlink="hlink" folHlink="folHlink"/>
+  <p:clrMap bg1="dk1" tx1="lt1" bg2="dk2" tx2="lt2" accent1="accent1" accent2="accent2" accent3="accent3" accent4="accent4" accent5="accent5" accent6="accent6" hlink="hlink" folHlink="folHlink"/>
   <p:sldLayoutIdLst>
-    <p:sldLayoutId id="2147483750" r:id="rId1"/>
-    <p:sldLayoutId id="2147483751" r:id="rId2"/>
-    <p:sldLayoutId id="2147483752" r:id="rId3"/>
-    <p:sldLayoutId id="2147483753" r:id="rId4"/>
-    <p:sldLayoutId id="2147483754" r:id="rId5"/>
-    <p:sldLayoutId id="2147483755" r:id="rId6"/>
-    <p:sldLayoutId id="2147483756" r:id="rId7"/>
-    <p:sldLayoutId id="2147483757" r:id="rId8"/>
-    <p:sldLayoutId id="2147483758" r:id="rId9"/>
-    <p:sldLayoutId id="2147483759" r:id="rId10"/>
-    <p:sldLayoutId id="2147483760" r:id="rId11"/>
+    <p:sldLayoutId id="2147483810" r:id="rId1"/>
+    <p:sldLayoutId id="2147483811" r:id="rId2"/>
+    <p:sldLayoutId id="2147483812" r:id="rId3"/>
+    <p:sldLayoutId id="2147483813" r:id="rId4"/>
+    <p:sldLayoutId id="2147483814" r:id="rId5"/>
+    <p:sldLayoutId id="2147483815" r:id="rId6"/>
+    <p:sldLayoutId id="2147483816" r:id="rId7"/>
+    <p:sldLayoutId id="2147483817" r:id="rId8"/>
+    <p:sldLayoutId id="2147483818" r:id="rId9"/>
+    <p:sldLayoutId id="2147483819" r:id="rId10"/>
+    <p:sldLayoutId id="2147483820" r:id="rId11"/>
   </p:sldLayoutIdLst>
   <p:txStyles>
     <p:titleStyle>
       <a:lvl1pPr algn="l" defTabSz="914400" rtl="0" eaLnBrk="1" latinLnBrk="0" hangingPunct="1">
         <a:lnSpc>
-          <a:spcPct val="90000"/>
+          <a:spcPct val="80000"/>
         </a:lnSpc>
         <a:spcBef>
           <a:spcPct val="0"/>
         </a:spcBef>
         <a:buNone/>
-        <a:defRPr sz="4400" kern="1200">
+        <a:defRPr sz="5000" kern="1200" cap="all" spc="100" baseline="0">
           <a:solidFill>
-            <a:schemeClr val="tx1"/>
+            <a:schemeClr val="tx1">
+              <a:lumMod val="95000"/>
+              <a:lumOff val="5000"/>
+            </a:schemeClr>
           </a:solidFill>
           <a:latin typeface="+mj-lt"/>
           <a:ea typeface="+mj-ea"/>
@@ -2702,16 +3110,23 @@
       </a:lvl1pPr>
     </p:titleStyle>
     <p:bodyStyle>
-      <a:lvl1pPr marL="228600" indent="-228600" algn="l" defTabSz="914400" rtl="0" eaLnBrk="1" latinLnBrk="0" hangingPunct="1">
+      <a:lvl1pPr marL="91440" indent="-91440" algn="l" defTabSz="914400" rtl="0" eaLnBrk="1" latinLnBrk="0" hangingPunct="1">
         <a:lnSpc>
           <a:spcPct val="90000"/>
         </a:lnSpc>
         <a:spcBef>
-          <a:spcPts val="1000"/>
+          <a:spcPts val="1200"/>
         </a:spcBef>
-        <a:buFont typeface="Arial" panose="020B0604020202020204" pitchFamily="34" charset="0"/>
-        <a:buChar char="•"/>
-        <a:defRPr sz="2800" kern="1200">
+        <a:spcAft>
+          <a:spcPts val="200"/>
+        </a:spcAft>
+        <a:buClr>
+          <a:schemeClr val="accent2"/>
+        </a:buClr>
+        <a:buSzPct val="100000"/>
+        <a:buFont typeface="Tw Cen MT" panose="020B0602020104020603" pitchFamily="34" charset="0"/>
+        <a:buChar char=" "/>
+        <a:defRPr sz="2200" kern="1200">
           <a:solidFill>
             <a:schemeClr val="tx1"/>
           </a:solidFill>
@@ -2720,16 +3135,22 @@
           <a:cs typeface="+mn-cs"/>
         </a:defRPr>
       </a:lvl1pPr>
-      <a:lvl2pPr marL="685800" indent="-228600" algn="l" defTabSz="914400" rtl="0" eaLnBrk="1" latinLnBrk="0" hangingPunct="1">
+      <a:lvl2pPr marL="265176" indent="-137160" algn="l" defTabSz="914400" rtl="0" eaLnBrk="1" latinLnBrk="0" hangingPunct="1">
         <a:lnSpc>
           <a:spcPct val="90000"/>
         </a:lnSpc>
         <a:spcBef>
-          <a:spcPts val="500"/>
+          <a:spcPts val="200"/>
         </a:spcBef>
-        <a:buFont typeface="Arial" panose="020B0604020202020204" pitchFamily="34" charset="0"/>
-        <a:buChar char="•"/>
-        <a:defRPr sz="2400" kern="1200">
+        <a:spcAft>
+          <a:spcPts val="400"/>
+        </a:spcAft>
+        <a:buClr>
+          <a:schemeClr val="accent2"/>
+        </a:buClr>
+        <a:buFont typeface="Wingdings 3" pitchFamily="18" charset="2"/>
+        <a:buChar char=""/>
+        <a:defRPr sz="1800" kern="1200">
           <a:solidFill>
             <a:schemeClr val="tx1"/>
           </a:solidFill>
@@ -2738,16 +3159,22 @@
           <a:cs typeface="+mn-cs"/>
         </a:defRPr>
       </a:lvl2pPr>
-      <a:lvl3pPr marL="1143000" indent="-228600" algn="l" defTabSz="914400" rtl="0" eaLnBrk="1" latinLnBrk="0" hangingPunct="1">
+      <a:lvl3pPr marL="448056" indent="-137160" algn="l" defTabSz="914400" rtl="0" eaLnBrk="1" latinLnBrk="0" hangingPunct="1">
         <a:lnSpc>
           <a:spcPct val="90000"/>
         </a:lnSpc>
         <a:spcBef>
-          <a:spcPts val="500"/>
+          <a:spcPts val="200"/>
         </a:spcBef>
-        <a:buFont typeface="Arial" panose="020B0604020202020204" pitchFamily="34" charset="0"/>
-        <a:buChar char="•"/>
-        <a:defRPr sz="2000" kern="1200">
+        <a:spcAft>
+          <a:spcPts val="400"/>
+        </a:spcAft>
+        <a:buClr>
+          <a:schemeClr val="accent2"/>
+        </a:buClr>
+        <a:buFont typeface="Wingdings 3" pitchFamily="18" charset="2"/>
+        <a:buChar char=""/>
+        <a:defRPr sz="1400" kern="1200">
           <a:solidFill>
             <a:schemeClr val="tx1"/>
           </a:solidFill>
@@ -2756,16 +3183,22 @@
           <a:cs typeface="+mn-cs"/>
         </a:defRPr>
       </a:lvl3pPr>
-      <a:lvl4pPr marL="1600200" indent="-228600" algn="l" defTabSz="914400" rtl="0" eaLnBrk="1" latinLnBrk="0" hangingPunct="1">
+      <a:lvl4pPr marL="594360" indent="-137160" algn="l" defTabSz="914400" rtl="0" eaLnBrk="1" latinLnBrk="0" hangingPunct="1">
         <a:lnSpc>
           <a:spcPct val="90000"/>
         </a:lnSpc>
         <a:spcBef>
-          <a:spcPts val="500"/>
+          <a:spcPts val="200"/>
         </a:spcBef>
-        <a:buFont typeface="Arial" panose="020B0604020202020204" pitchFamily="34" charset="0"/>
-        <a:buChar char="•"/>
-        <a:defRPr sz="1800" kern="1200">
+        <a:spcAft>
+          <a:spcPts val="400"/>
+        </a:spcAft>
+        <a:buClr>
+          <a:schemeClr val="accent2"/>
+        </a:buClr>
+        <a:buFont typeface="Wingdings 3" pitchFamily="18" charset="2"/>
+        <a:buChar char=""/>
+        <a:defRPr sz="1400" kern="1200">
           <a:solidFill>
             <a:schemeClr val="tx1"/>
           </a:solidFill>
@@ -2774,16 +3207,22 @@
           <a:cs typeface="+mn-cs"/>
         </a:defRPr>
       </a:lvl4pPr>
-      <a:lvl5pPr marL="2057400" indent="-228600" algn="l" defTabSz="914400" rtl="0" eaLnBrk="1" latinLnBrk="0" hangingPunct="1">
+      <a:lvl5pPr marL="777240" indent="-137160" algn="l" defTabSz="914400" rtl="0" eaLnBrk="1" latinLnBrk="0" hangingPunct="1">
         <a:lnSpc>
           <a:spcPct val="90000"/>
         </a:lnSpc>
         <a:spcBef>
-          <a:spcPts val="500"/>
+          <a:spcPts val="200"/>
         </a:spcBef>
-        <a:buFont typeface="Arial" panose="020B0604020202020204" pitchFamily="34" charset="0"/>
-        <a:buChar char="•"/>
-        <a:defRPr sz="1800" kern="1200">
+        <a:spcAft>
+          <a:spcPts val="400"/>
+        </a:spcAft>
+        <a:buClr>
+          <a:schemeClr val="accent2"/>
+        </a:buClr>
+        <a:buFont typeface="Wingdings 3" pitchFamily="18" charset="2"/>
+        <a:buChar char=""/>
+        <a:defRPr sz="1400" kern="1200">
           <a:solidFill>
             <a:schemeClr val="tx1"/>
           </a:solidFill>
@@ -2792,16 +3231,22 @@
           <a:cs typeface="+mn-cs"/>
         </a:defRPr>
       </a:lvl5pPr>
-      <a:lvl6pPr marL="2514600" indent="-228600" algn="l" defTabSz="914400" rtl="0" eaLnBrk="1" latinLnBrk="0" hangingPunct="1">
+      <a:lvl6pPr marL="914400" indent="-137160" algn="l" defTabSz="914400" rtl="0" eaLnBrk="1" latinLnBrk="0" hangingPunct="1">
         <a:lnSpc>
           <a:spcPct val="90000"/>
         </a:lnSpc>
         <a:spcBef>
-          <a:spcPts val="500"/>
+          <a:spcPts val="200"/>
         </a:spcBef>
-        <a:buFont typeface="Arial" panose="020B0604020202020204" pitchFamily="34" charset="0"/>
-        <a:buChar char="•"/>
-        <a:defRPr sz="1800" kern="1200">
+        <a:spcAft>
+          <a:spcPts val="400"/>
+        </a:spcAft>
+        <a:buClr>
+          <a:schemeClr val="accent2"/>
+        </a:buClr>
+        <a:buFont typeface="Wingdings 3" pitchFamily="18" charset="2"/>
+        <a:buChar char=""/>
+        <a:defRPr sz="1400" kern="1200">
           <a:solidFill>
             <a:schemeClr val="tx1"/>
           </a:solidFill>
@@ -2810,16 +3255,22 @@
           <a:cs typeface="+mn-cs"/>
         </a:defRPr>
       </a:lvl6pPr>
-      <a:lvl7pPr marL="2971800" indent="-228600" algn="l" defTabSz="914400" rtl="0" eaLnBrk="1" latinLnBrk="0" hangingPunct="1">
+      <a:lvl7pPr marL="1060704" indent="-137160" algn="l" defTabSz="914400" rtl="0" eaLnBrk="1" latinLnBrk="0" hangingPunct="1">
         <a:lnSpc>
           <a:spcPct val="90000"/>
         </a:lnSpc>
         <a:spcBef>
-          <a:spcPts val="500"/>
+          <a:spcPts val="200"/>
         </a:spcBef>
-        <a:buFont typeface="Arial" panose="020B0604020202020204" pitchFamily="34" charset="0"/>
-        <a:buChar char="•"/>
-        <a:defRPr sz="1800" kern="1200">
+        <a:spcAft>
+          <a:spcPts val="400"/>
+        </a:spcAft>
+        <a:buClr>
+          <a:schemeClr val="accent2"/>
+        </a:buClr>
+        <a:buFont typeface="Wingdings 3" pitchFamily="18" charset="2"/>
+        <a:buChar char=""/>
+        <a:defRPr sz="1400" kern="1200">
           <a:solidFill>
             <a:schemeClr val="tx1"/>
           </a:solidFill>
@@ -2828,16 +3279,22 @@
           <a:cs typeface="+mn-cs"/>
         </a:defRPr>
       </a:lvl7pPr>
-      <a:lvl8pPr marL="3429000" indent="-228600" algn="l" defTabSz="914400" rtl="0" eaLnBrk="1" latinLnBrk="0" hangingPunct="1">
+      <a:lvl8pPr marL="1216152" indent="-137160" algn="l" defTabSz="914400" rtl="0" eaLnBrk="1" latinLnBrk="0" hangingPunct="1">
         <a:lnSpc>
           <a:spcPct val="90000"/>
         </a:lnSpc>
         <a:spcBef>
-          <a:spcPts val="500"/>
+          <a:spcPts val="200"/>
         </a:spcBef>
-        <a:buFont typeface="Arial" panose="020B0604020202020204" pitchFamily="34" charset="0"/>
-        <a:buChar char="•"/>
-        <a:defRPr sz="1800" kern="1200">
+        <a:spcAft>
+          <a:spcPts val="400"/>
+        </a:spcAft>
+        <a:buClr>
+          <a:schemeClr val="accent2"/>
+        </a:buClr>
+        <a:buFont typeface="Wingdings 3" pitchFamily="18" charset="2"/>
+        <a:buChar char=""/>
+        <a:defRPr sz="1400" kern="1200">
           <a:solidFill>
             <a:schemeClr val="tx1"/>
           </a:solidFill>
@@ -2846,16 +3303,22 @@
           <a:cs typeface="+mn-cs"/>
         </a:defRPr>
       </a:lvl8pPr>
-      <a:lvl9pPr marL="3886200" indent="-228600" algn="l" defTabSz="914400" rtl="0" eaLnBrk="1" latinLnBrk="0" hangingPunct="1">
+      <a:lvl9pPr marL="1362456" indent="-137160" algn="l" defTabSz="914400" rtl="0" eaLnBrk="1" latinLnBrk="0" hangingPunct="1">
         <a:lnSpc>
           <a:spcPct val="90000"/>
         </a:lnSpc>
         <a:spcBef>
-          <a:spcPts val="500"/>
+          <a:spcPts val="200"/>
         </a:spcBef>
-        <a:buFont typeface="Arial" panose="020B0604020202020204" pitchFamily="34" charset="0"/>
-        <a:buChar char="•"/>
-        <a:defRPr sz="1800" kern="1200">
+        <a:spcAft>
+          <a:spcPts val="400"/>
+        </a:spcAft>
+        <a:buClr>
+          <a:schemeClr val="accent2"/>
+        </a:buClr>
+        <a:buFont typeface="Wingdings 3" pitchFamily="18" charset="2"/>
+        <a:buChar char=""/>
+        <a:defRPr sz="1400" kern="1200">
           <a:solidFill>
             <a:schemeClr val="tx1"/>
           </a:solidFill>
@@ -2991,7 +3454,12 @@
             <p:ph type="ctrTitle"/>
           </p:nvPr>
         </p:nvSpPr>
-        <p:spPr/>
+        <p:spPr>
+          <a:xfrm>
+            <a:off x="4881093" y="4974787"/>
+            <a:ext cx="3206839" cy="1463040"/>
+          </a:xfrm>
+        </p:spPr>
         <p:txBody>
           <a:bodyPr/>
           <a:lstStyle/>
@@ -3014,17 +3482,39 @@
             <p:ph type="subTitle" idx="1"/>
           </p:nvPr>
         </p:nvSpPr>
-        <p:spPr/>
+        <p:spPr>
+          <a:xfrm>
+            <a:off x="8559083" y="4974787"/>
+            <a:ext cx="3456905" cy="1463040"/>
+          </a:xfrm>
+        </p:spPr>
         <p:txBody>
           <a:bodyPr>
-            <a:normAutofit/>
+            <a:normAutofit fontScale="92500" lnSpcReduction="10000"/>
           </a:bodyPr>
           <a:lstStyle/>
           <a:p>
             <a:r>
               <a:rPr lang="en-GB" dirty="0" smtClean="0"/>
-              <a:t>Group 2 – Hamza Bhatti (21223241), </a:t>
-            </a:r>
+              <a:t>Group 2 – </a:t>
+            </a:r>
+            <a:endParaRPr lang="en-GB" dirty="0" smtClean="0"/>
+          </a:p>
+          <a:p>
+            <a:r>
+              <a:rPr lang="en-GB" dirty="0" smtClean="0"/>
+              <a:t>Hamza </a:t>
+            </a:r>
+            <a:r>
+              <a:rPr lang="en-GB" dirty="0" smtClean="0"/>
+              <a:t>Bhatti (</a:t>
+            </a:r>
+            <a:r>
+              <a:rPr lang="en-GB" dirty="0" smtClean="0"/>
+              <a:t>21223241)</a:t>
+            </a:r>
+          </a:p>
+          <a:p>
             <a:r>
               <a:rPr lang="en-GB" dirty="0" err="1" smtClean="0"/>
               <a:t>Amrit</a:t>
@@ -3049,7 +3539,21 @@
             </a:r>
             <a:r>
               <a:rPr lang="en-GB" dirty="0" smtClean="0"/>
-              <a:t> Nicholas-Cousins (21234209) and Joe Sykes (21223675)</a:t>
+              <a:t> Nicholas-Cousins (</a:t>
+            </a:r>
+            <a:r>
+              <a:rPr lang="en-GB" dirty="0" smtClean="0"/>
+              <a:t>21234209)</a:t>
+            </a:r>
+          </a:p>
+          <a:p>
+            <a:r>
+              <a:rPr lang="en-GB" dirty="0" smtClean="0"/>
+              <a:t>Joe </a:t>
+            </a:r>
+            <a:r>
+              <a:rPr lang="en-GB" dirty="0" smtClean="0"/>
+              <a:t>Sykes (21223675)</a:t>
             </a:r>
             <a:endParaRPr lang="en-GB" dirty="0"/>
           </a:p>
@@ -3102,7 +3606,15 @@
           <a:p>
             <a:r>
               <a:rPr lang="en-GB" dirty="0" smtClean="0"/>
-              <a:t>Demo</a:t>
+              <a:t>Individual Contribution To Core (</a:t>
+            </a:r>
+            <a:r>
+              <a:rPr lang="en-GB" dirty="0" err="1" smtClean="0"/>
+              <a:t>i</a:t>
+            </a:r>
+            <a:r>
+              <a:rPr lang="en-GB" dirty="0" smtClean="0"/>
+              <a:t>)</a:t>
             </a:r>
             <a:endParaRPr lang="en-GB" dirty="0"/>
           </a:p>
@@ -3125,16 +3637,70 @@
           <a:p>
             <a:r>
               <a:rPr lang="en-GB" dirty="0" smtClean="0"/>
-              <a:t>We will now provide a demo of our website</a:t>
+              <a:t>Group as whole</a:t>
+            </a:r>
+          </a:p>
+          <a:p>
+            <a:pPr lvl="1"/>
+            <a:r>
+              <a:rPr lang="en-GB" dirty="0" smtClean="0"/>
+              <a:t>Helped design the website layout</a:t>
             </a:r>
             <a:endParaRPr lang="en-GB" dirty="0"/>
+          </a:p>
+          <a:p>
+            <a:r>
+              <a:rPr lang="en-GB" dirty="0" smtClean="0"/>
+              <a:t>Hamza </a:t>
+            </a:r>
+          </a:p>
+          <a:p>
+            <a:pPr lvl="1"/>
+            <a:r>
+              <a:rPr lang="en-GB" dirty="0" smtClean="0"/>
+              <a:t>Set up product database</a:t>
+            </a:r>
+          </a:p>
+          <a:p>
+            <a:pPr lvl="1"/>
+            <a:r>
+              <a:rPr lang="en-GB" dirty="0" smtClean="0"/>
+              <a:t>Populated areas of website with database data</a:t>
+            </a:r>
+          </a:p>
+          <a:p>
+            <a:pPr lvl="1"/>
+            <a:r>
+              <a:rPr lang="en-GB" dirty="0" smtClean="0"/>
+              <a:t>Helped implement trolley</a:t>
+            </a:r>
+          </a:p>
+          <a:p>
+            <a:r>
+              <a:rPr lang="en-GB" dirty="0" smtClean="0"/>
+              <a:t>Joe</a:t>
+            </a:r>
+          </a:p>
+          <a:p>
+            <a:pPr lvl="1"/>
+            <a:r>
+              <a:rPr lang="en-GB" dirty="0" smtClean="0"/>
+              <a:t>Developed website</a:t>
+            </a:r>
+          </a:p>
+          <a:p>
+            <a:pPr lvl="1"/>
+            <a:r>
+              <a:rPr lang="en-GB" dirty="0" smtClean="0"/>
+              <a:t>Helped implement trolley</a:t>
+            </a:r>
           </a:p>
         </p:txBody>
       </p:sp>
     </p:spTree>
     <p:extLst>
       <p:ext uri="{BB962C8B-B14F-4D97-AF65-F5344CB8AC3E}">
-        <p14:creationId xmlns:p14="http://schemas.microsoft.com/office/powerpoint/2010/main" val="1344941087"/>
+        <p14:creationId xmlns:p14="http://schemas.microsoft.com/office/powerpoint/2010/main" val="3348547855"/>
       </p:ext>
     </p:extLst>
   </p:cSld>
@@ -3177,144 +3743,6 @@
           <a:lstStyle/>
           <a:p>
             <a:r>
-              <a:rPr lang="en-GB" dirty="0" smtClean="0"/>
-              <a:t>Individual Contribution To Core (</a:t>
-            </a:r>
-            <a:r>
-              <a:rPr lang="en-GB" dirty="0" err="1" smtClean="0"/>
-              <a:t>i</a:t>
-            </a:r>
-            <a:r>
-              <a:rPr lang="en-GB" dirty="0" smtClean="0"/>
-              <a:t>)</a:t>
-            </a:r>
-            <a:endParaRPr lang="en-GB" dirty="0"/>
-          </a:p>
-        </p:txBody>
-      </p:sp>
-      <p:sp>
-        <p:nvSpPr>
-          <p:cNvPr id="3" name="Content Placeholder 2"/>
-          <p:cNvSpPr>
-            <a:spLocks noGrp="1"/>
-          </p:cNvSpPr>
-          <p:nvPr>
-            <p:ph idx="1"/>
-          </p:nvPr>
-        </p:nvSpPr>
-        <p:spPr/>
-        <p:txBody>
-          <a:bodyPr/>
-          <a:lstStyle/>
-          <a:p>
-            <a:r>
-              <a:rPr lang="en-GB" dirty="0" smtClean="0"/>
-              <a:t>Group as whole</a:t>
-            </a:r>
-          </a:p>
-          <a:p>
-            <a:pPr lvl="1"/>
-            <a:r>
-              <a:rPr lang="en-GB" dirty="0" smtClean="0"/>
-              <a:t>Helped design the website layout</a:t>
-            </a:r>
-            <a:endParaRPr lang="en-GB" dirty="0"/>
-          </a:p>
-          <a:p>
-            <a:r>
-              <a:rPr lang="en-GB" dirty="0" smtClean="0"/>
-              <a:t>Hamza </a:t>
-            </a:r>
-          </a:p>
-          <a:p>
-            <a:pPr lvl="1"/>
-            <a:r>
-              <a:rPr lang="en-GB" dirty="0" smtClean="0"/>
-              <a:t>Set up product database</a:t>
-            </a:r>
-          </a:p>
-          <a:p>
-            <a:pPr lvl="1"/>
-            <a:r>
-              <a:rPr lang="en-GB" dirty="0" smtClean="0"/>
-              <a:t>Populated areas of website with database data</a:t>
-            </a:r>
-          </a:p>
-          <a:p>
-            <a:pPr lvl="1"/>
-            <a:r>
-              <a:rPr lang="en-GB" dirty="0" smtClean="0"/>
-              <a:t>Helped implement trolley</a:t>
-            </a:r>
-          </a:p>
-          <a:p>
-            <a:r>
-              <a:rPr lang="en-GB" dirty="0" smtClean="0"/>
-              <a:t>Joe</a:t>
-            </a:r>
-          </a:p>
-          <a:p>
-            <a:pPr lvl="1"/>
-            <a:r>
-              <a:rPr lang="en-GB" dirty="0" smtClean="0"/>
-              <a:t>Developed website</a:t>
-            </a:r>
-          </a:p>
-          <a:p>
-            <a:pPr lvl="1"/>
-            <a:r>
-              <a:rPr lang="en-GB" dirty="0" smtClean="0"/>
-              <a:t>Helped implement trolley</a:t>
-            </a:r>
-          </a:p>
-        </p:txBody>
-      </p:sp>
-    </p:spTree>
-    <p:extLst>
-      <p:ext uri="{BB962C8B-B14F-4D97-AF65-F5344CB8AC3E}">
-        <p14:creationId xmlns:p14="http://schemas.microsoft.com/office/powerpoint/2010/main" val="3348547855"/>
-      </p:ext>
-    </p:extLst>
-  </p:cSld>
-  <p:clrMapOvr>
-    <a:masterClrMapping/>
-  </p:clrMapOvr>
-</p:sld>
-</file>
-
-<file path=ppt/slides/slide12.xml><?xml version="1.0" encoding="utf-8"?>
-<p:sld xmlns:a="http://schemas.openxmlformats.org/drawingml/2006/main" xmlns:r="http://schemas.openxmlformats.org/officeDocument/2006/relationships" xmlns:p="http://schemas.openxmlformats.org/presentationml/2006/main">
-  <p:cSld>
-    <p:spTree>
-      <p:nvGrpSpPr>
-        <p:cNvPr id="1" name=""/>
-        <p:cNvGrpSpPr/>
-        <p:nvPr/>
-      </p:nvGrpSpPr>
-      <p:grpSpPr>
-        <a:xfrm>
-          <a:off x="0" y="0"/>
-          <a:ext cx="0" cy="0"/>
-          <a:chOff x="0" y="0"/>
-          <a:chExt cx="0" cy="0"/>
-        </a:xfrm>
-      </p:grpSpPr>
-      <p:sp>
-        <p:nvSpPr>
-          <p:cNvPr id="2" name="Title 1"/>
-          <p:cNvSpPr>
-            <a:spLocks noGrp="1"/>
-          </p:cNvSpPr>
-          <p:nvPr>
-            <p:ph type="title"/>
-          </p:nvPr>
-        </p:nvSpPr>
-        <p:spPr/>
-        <p:txBody>
-          <a:bodyPr/>
-          <a:lstStyle/>
-          <a:p>
-            <a:r>
               <a:rPr lang="en-GB" dirty="0"/>
               <a:t>Individual Contribution To Core </a:t>
             </a:r>
@@ -3390,7 +3818,7 @@
 </p:sld>
 </file>
 
-<file path=ppt/slides/slide13.xml><?xml version="1.0" encoding="utf-8"?>
+<file path=ppt/slides/slide12.xml><?xml version="1.0" encoding="utf-8"?>
 <p:sld xmlns:a="http://schemas.openxmlformats.org/drawingml/2006/main" xmlns:r="http://schemas.openxmlformats.org/officeDocument/2006/relationships" xmlns:p="http://schemas.openxmlformats.org/presentationml/2006/main">
   <p:cSld>
     <p:spTree>
@@ -3804,50 +4232,55 @@
           </a:p>
           <a:p>
             <a:r>
-              <a:rPr lang="en-GB" dirty="0" smtClean="0"/>
-              <a:t>Core tasks responsibilities</a:t>
+              <a:rPr lang="en-GB" dirty="0"/>
+              <a:t>Other roles:</a:t>
             </a:r>
           </a:p>
           <a:p>
             <a:pPr lvl="1"/>
             <a:r>
-              <a:rPr lang="en-GB" dirty="0" smtClean="0"/>
-              <a:t>Product database: Hamza</a:t>
+              <a:rPr lang="en-GB" dirty="0"/>
+              <a:t>Element integration: Hamza and Joe</a:t>
             </a:r>
           </a:p>
           <a:p>
             <a:pPr lvl="1"/>
             <a:r>
-              <a:rPr lang="en-GB" dirty="0" smtClean="0"/>
-              <a:t>Website Production: Joe</a:t>
-            </a:r>
+              <a:rPr lang="en-GB" dirty="0"/>
+              <a:t>User manual: </a:t>
+            </a:r>
+            <a:r>
+              <a:rPr lang="en-GB" dirty="0" err="1"/>
+              <a:t>Amrit</a:t>
+            </a:r>
+            <a:endParaRPr lang="en-GB" dirty="0"/>
           </a:p>
           <a:p>
             <a:pPr lvl="1"/>
             <a:r>
-              <a:rPr lang="en-GB" dirty="0" smtClean="0"/>
-              <a:t>CSS: </a:t>
-            </a:r>
-            <a:r>
-              <a:rPr lang="en-GB" dirty="0" err="1" smtClean="0"/>
+              <a:rPr lang="en-GB" dirty="0"/>
+              <a:t>User documentation: </a:t>
+            </a:r>
+            <a:r>
+              <a:rPr lang="en-GB" dirty="0" err="1"/>
               <a:t>Tashan</a:t>
             </a:r>
-            <a:r>
-              <a:rPr lang="en-GB" dirty="0" smtClean="0"/>
-              <a:t> and </a:t>
-            </a:r>
-            <a:r>
-              <a:rPr lang="en-GB" dirty="0" err="1" smtClean="0"/>
-              <a:t>Amrit</a:t>
-            </a:r>
+            <a:endParaRPr lang="en-GB" dirty="0"/>
+          </a:p>
+          <a:p>
+            <a:pPr lvl="1"/>
+            <a:r>
+              <a:rPr lang="en-GB" dirty="0"/>
+              <a:t>Technical doc: Hamza and </a:t>
+            </a:r>
+            <a:r>
+              <a:rPr lang="en-GB" dirty="0" err="1"/>
+              <a:t>amrit</a:t>
+            </a:r>
+            <a:endParaRPr lang="en-GB" dirty="0"/>
+          </a:p>
+          <a:p>
             <a:endParaRPr lang="en-GB" dirty="0" smtClean="0"/>
-          </a:p>
-          <a:p>
-            <a:pPr lvl="1"/>
-            <a:r>
-              <a:rPr lang="en-GB" dirty="0" smtClean="0"/>
-              <a:t>Trolley: Hamza and Joe</a:t>
-            </a:r>
           </a:p>
         </p:txBody>
       </p:sp>
@@ -3898,170 +4331,6 @@
           <a:p>
             <a:r>
               <a:rPr lang="en-GB" dirty="0" smtClean="0"/>
-              <a:t>Our Roles (ii)</a:t>
-            </a:r>
-            <a:endParaRPr lang="en-GB" dirty="0"/>
-          </a:p>
-        </p:txBody>
-      </p:sp>
-      <p:sp>
-        <p:nvSpPr>
-          <p:cNvPr id="3" name="Content Placeholder 2"/>
-          <p:cNvSpPr>
-            <a:spLocks noGrp="1"/>
-          </p:cNvSpPr>
-          <p:nvPr>
-            <p:ph idx="1"/>
-          </p:nvPr>
-        </p:nvSpPr>
-        <p:spPr/>
-        <p:txBody>
-          <a:bodyPr>
-            <a:normAutofit/>
-          </a:bodyPr>
-          <a:lstStyle/>
-          <a:p>
-            <a:r>
-              <a:rPr lang="en-GB" dirty="0" smtClean="0"/>
-              <a:t>Individual Tasks</a:t>
-            </a:r>
-          </a:p>
-          <a:p>
-            <a:pPr lvl="1"/>
-            <a:r>
-              <a:rPr lang="en-GB" dirty="0" smtClean="0"/>
-              <a:t>Supply management: Hamza</a:t>
-            </a:r>
-          </a:p>
-          <a:p>
-            <a:pPr lvl="1"/>
-            <a:r>
-              <a:rPr lang="en-GB" dirty="0" smtClean="0"/>
-              <a:t>Loyalty scheme: Joe</a:t>
-            </a:r>
-          </a:p>
-          <a:p>
-            <a:pPr lvl="1"/>
-            <a:r>
-              <a:rPr lang="en-GB" dirty="0" smtClean="0"/>
-              <a:t>Marketing: </a:t>
-            </a:r>
-            <a:r>
-              <a:rPr lang="en-GB" dirty="0" err="1" smtClean="0"/>
-              <a:t>Amrit</a:t>
-            </a:r>
-            <a:endParaRPr lang="en-GB" dirty="0" smtClean="0"/>
-          </a:p>
-          <a:p>
-            <a:pPr lvl="1"/>
-            <a:r>
-              <a:rPr lang="en-GB" dirty="0" smtClean="0"/>
-              <a:t>Payment: </a:t>
-            </a:r>
-            <a:r>
-              <a:rPr lang="en-GB" dirty="0" err="1" smtClean="0"/>
-              <a:t>Tashan</a:t>
-            </a:r>
-            <a:endParaRPr lang="en-GB" dirty="0" smtClean="0"/>
-          </a:p>
-          <a:p>
-            <a:r>
-              <a:rPr lang="en-GB" dirty="0" smtClean="0"/>
-              <a:t>Other roles:</a:t>
-            </a:r>
-          </a:p>
-          <a:p>
-            <a:pPr lvl="1"/>
-            <a:r>
-              <a:rPr lang="en-GB" dirty="0" smtClean="0"/>
-              <a:t>Element integration: Hamza and Joe</a:t>
-            </a:r>
-          </a:p>
-          <a:p>
-            <a:pPr lvl="1"/>
-            <a:r>
-              <a:rPr lang="en-GB" dirty="0" smtClean="0"/>
-              <a:t>User manual: </a:t>
-            </a:r>
-            <a:r>
-              <a:rPr lang="en-GB" dirty="0" err="1" smtClean="0"/>
-              <a:t>Amrit</a:t>
-            </a:r>
-            <a:endParaRPr lang="en-GB" dirty="0" smtClean="0"/>
-          </a:p>
-          <a:p>
-            <a:pPr lvl="1"/>
-            <a:r>
-              <a:rPr lang="en-GB" dirty="0" smtClean="0"/>
-              <a:t>User documentation: </a:t>
-            </a:r>
-            <a:r>
-              <a:rPr lang="en-GB" dirty="0" err="1" smtClean="0"/>
-              <a:t>Tashan</a:t>
-            </a:r>
-            <a:endParaRPr lang="en-GB" dirty="0" smtClean="0"/>
-          </a:p>
-          <a:p>
-            <a:pPr lvl="1"/>
-            <a:r>
-              <a:rPr lang="en-GB" dirty="0" smtClean="0"/>
-              <a:t>Technical doc: Hamza and </a:t>
-            </a:r>
-            <a:r>
-              <a:rPr lang="en-GB" dirty="0" err="1" smtClean="0"/>
-              <a:t>amrit</a:t>
-            </a:r>
-            <a:endParaRPr lang="en-GB" dirty="0" smtClean="0"/>
-          </a:p>
-        </p:txBody>
-      </p:sp>
-    </p:spTree>
-    <p:extLst>
-      <p:ext uri="{BB962C8B-B14F-4D97-AF65-F5344CB8AC3E}">
-        <p14:creationId xmlns:p14="http://schemas.microsoft.com/office/powerpoint/2010/main" val="2447239332"/>
-      </p:ext>
-    </p:extLst>
-  </p:cSld>
-  <p:clrMapOvr>
-    <a:masterClrMapping/>
-  </p:clrMapOvr>
-</p:sld>
-</file>
-
-<file path=ppt/slides/slide6.xml><?xml version="1.0" encoding="utf-8"?>
-<p:sld xmlns:a="http://schemas.openxmlformats.org/drawingml/2006/main" xmlns:r="http://schemas.openxmlformats.org/officeDocument/2006/relationships" xmlns:p="http://schemas.openxmlformats.org/presentationml/2006/main">
-  <p:cSld>
-    <p:spTree>
-      <p:nvGrpSpPr>
-        <p:cNvPr id="1" name=""/>
-        <p:cNvGrpSpPr/>
-        <p:nvPr/>
-      </p:nvGrpSpPr>
-      <p:grpSpPr>
-        <a:xfrm>
-          <a:off x="0" y="0"/>
-          <a:ext cx="0" cy="0"/>
-          <a:chOff x="0" y="0"/>
-          <a:chExt cx="0" cy="0"/>
-        </a:xfrm>
-      </p:grpSpPr>
-      <p:sp>
-        <p:nvSpPr>
-          <p:cNvPr id="2" name="Title 1"/>
-          <p:cNvSpPr>
-            <a:spLocks noGrp="1"/>
-          </p:cNvSpPr>
-          <p:nvPr>
-            <p:ph type="title"/>
-          </p:nvPr>
-        </p:nvSpPr>
-        <p:spPr/>
-        <p:txBody>
-          <a:bodyPr/>
-          <a:lstStyle/>
-          <a:p>
-            <a:r>
-              <a:rPr lang="en-GB" dirty="0" smtClean="0"/>
               <a:t>Project Plan – WBS </a:t>
             </a:r>
             <a:r>
@@ -4086,13 +4355,13 @@
             <p:ph idx="1"/>
             <p:extLst>
               <p:ext uri="{D42A27DB-BD31-4B8C-83A1-F6EECF244321}">
-                <p14:modId xmlns:p14="http://schemas.microsoft.com/office/powerpoint/2010/main" val="1368795584"/>
+                <p14:modId xmlns:p14="http://schemas.microsoft.com/office/powerpoint/2010/main" val="3905053102"/>
               </p:ext>
             </p:extLst>
           </p:nvPr>
         </p:nvGraphicFramePr>
         <p:xfrm>
-          <a:off x="838200" y="1690688"/>
+          <a:off x="838200" y="1793719"/>
           <a:ext cx="7661856" cy="4572000"/>
         </p:xfrm>
         <a:graphic>
@@ -5230,7 +5499,7 @@
 </p:sld>
 </file>
 
-<file path=ppt/slides/slide7.xml><?xml version="1.0" encoding="utf-8"?>
+<file path=ppt/slides/slide6.xml><?xml version="1.0" encoding="utf-8"?>
 <p:sld xmlns:a="http://schemas.openxmlformats.org/drawingml/2006/main" xmlns:r="http://schemas.openxmlformats.org/officeDocument/2006/relationships" xmlns:p="http://schemas.openxmlformats.org/presentationml/2006/main">
   <p:cSld>
     <p:spTree>
@@ -5280,14 +5549,14 @@
             <p:ph idx="1"/>
             <p:extLst>
               <p:ext uri="{D42A27DB-BD31-4B8C-83A1-F6EECF244321}">
-                <p14:modId xmlns:p14="http://schemas.microsoft.com/office/powerpoint/2010/main" val="2581949295"/>
+                <p14:modId xmlns:p14="http://schemas.microsoft.com/office/powerpoint/2010/main" val="623184684"/>
               </p:ext>
             </p:extLst>
           </p:nvPr>
         </p:nvGraphicFramePr>
         <p:xfrm>
-          <a:off x="838200" y="1782762"/>
-          <a:ext cx="3073400" cy="2511109"/>
+          <a:off x="786684" y="1924429"/>
+          <a:ext cx="3073400" cy="2454276"/>
         </p:xfrm>
         <a:graphic>
           <a:graphicData uri="http://schemas.openxmlformats.org/drawingml/2006/table">
@@ -5736,14 +6005,14 @@
           <p:nvPr>
             <p:extLst>
               <p:ext uri="{D42A27DB-BD31-4B8C-83A1-F6EECF244321}">
-                <p14:modId xmlns:p14="http://schemas.microsoft.com/office/powerpoint/2010/main" val="4169077396"/>
+                <p14:modId xmlns:p14="http://schemas.microsoft.com/office/powerpoint/2010/main" val="1836659199"/>
               </p:ext>
             </p:extLst>
           </p:nvPr>
         </p:nvGraphicFramePr>
         <p:xfrm>
-          <a:off x="7391400" y="1787524"/>
-          <a:ext cx="2697480" cy="1141413"/>
+          <a:off x="7420864" y="1937507"/>
+          <a:ext cx="2697480" cy="1130046"/>
         </p:xfrm>
         <a:graphic>
           <a:graphicData uri="http://schemas.openxmlformats.org/drawingml/2006/table">
@@ -5882,14 +6151,14 @@
           <p:nvPr>
             <p:extLst>
               <p:ext uri="{D42A27DB-BD31-4B8C-83A1-F6EECF244321}">
-                <p14:modId xmlns:p14="http://schemas.microsoft.com/office/powerpoint/2010/main" val="3664098326"/>
+                <p14:modId xmlns:p14="http://schemas.microsoft.com/office/powerpoint/2010/main" val="679597678"/>
               </p:ext>
             </p:extLst>
           </p:nvPr>
         </p:nvGraphicFramePr>
         <p:xfrm>
-          <a:off x="4203700" y="1782762"/>
-          <a:ext cx="2697480" cy="3652521"/>
+          <a:off x="4291734" y="1937507"/>
+          <a:ext cx="2697480" cy="3858070"/>
         </p:xfrm>
         <a:graphic>
           <a:graphicData uri="http://schemas.openxmlformats.org/drawingml/2006/table">
@@ -6292,6 +6561,82 @@
 </p:sld>
 </file>
 
+<file path=ppt/slides/slide7.xml><?xml version="1.0" encoding="utf-8"?>
+<p:sld xmlns:a="http://schemas.openxmlformats.org/drawingml/2006/main" xmlns:r="http://schemas.openxmlformats.org/officeDocument/2006/relationships" xmlns:p="http://schemas.openxmlformats.org/presentationml/2006/main">
+  <p:cSld>
+    <p:spTree>
+      <p:nvGrpSpPr>
+        <p:cNvPr id="1" name=""/>
+        <p:cNvGrpSpPr/>
+        <p:nvPr/>
+      </p:nvGrpSpPr>
+      <p:grpSpPr>
+        <a:xfrm>
+          <a:off x="0" y="0"/>
+          <a:ext cx="0" cy="0"/>
+          <a:chOff x="0" y="0"/>
+          <a:chExt cx="0" cy="0"/>
+        </a:xfrm>
+      </p:grpSpPr>
+      <p:sp>
+        <p:nvSpPr>
+          <p:cNvPr id="2" name="Title 1"/>
+          <p:cNvSpPr>
+            <a:spLocks noGrp="1"/>
+          </p:cNvSpPr>
+          <p:nvPr>
+            <p:ph type="title"/>
+          </p:nvPr>
+        </p:nvSpPr>
+        <p:spPr/>
+        <p:txBody>
+          <a:bodyPr/>
+          <a:lstStyle/>
+          <a:p>
+            <a:r>
+              <a:rPr lang="en-GB" dirty="0" smtClean="0"/>
+              <a:t>Project Plan - Gantt</a:t>
+            </a:r>
+            <a:endParaRPr lang="en-GB" dirty="0"/>
+          </a:p>
+        </p:txBody>
+      </p:sp>
+      <p:sp>
+        <p:nvSpPr>
+          <p:cNvPr id="3" name="Content Placeholder 2"/>
+          <p:cNvSpPr>
+            <a:spLocks noGrp="1"/>
+          </p:cNvSpPr>
+          <p:nvPr>
+            <p:ph idx="1"/>
+          </p:nvPr>
+        </p:nvSpPr>
+        <p:spPr/>
+        <p:txBody>
+          <a:bodyPr/>
+          <a:lstStyle/>
+          <a:p>
+            <a:r>
+              <a:rPr lang="en-GB" dirty="0" smtClean="0"/>
+              <a:t>PUT HERE</a:t>
+            </a:r>
+            <a:endParaRPr lang="en-GB" dirty="0"/>
+          </a:p>
+        </p:txBody>
+      </p:sp>
+    </p:spTree>
+    <p:extLst>
+      <p:ext uri="{BB962C8B-B14F-4D97-AF65-F5344CB8AC3E}">
+        <p14:creationId xmlns:p14="http://schemas.microsoft.com/office/powerpoint/2010/main" val="3322244696"/>
+      </p:ext>
+    </p:extLst>
+  </p:cSld>
+  <p:clrMapOvr>
+    <a:masterClrMapping/>
+  </p:clrMapOvr>
+</p:sld>
+</file>
+
 <file path=ppt/slides/slide8.xml><?xml version="1.0" encoding="utf-8"?>
 <p:sld xmlns:a="http://schemas.openxmlformats.org/drawingml/2006/main" xmlns:r="http://schemas.openxmlformats.org/officeDocument/2006/relationships" xmlns:p="http://schemas.openxmlformats.org/presentationml/2006/main">
   <p:cSld>
@@ -6326,7 +6671,7 @@
           <a:p>
             <a:r>
               <a:rPr lang="en-GB" dirty="0" smtClean="0"/>
-              <a:t>Project Plan - Gantt</a:t>
+              <a:t>Current Progress On Development</a:t>
             </a:r>
             <a:endParaRPr lang="en-GB" dirty="0"/>
           </a:p>
@@ -6349,7 +6694,40 @@
           <a:p>
             <a:r>
               <a:rPr lang="en-GB" dirty="0" smtClean="0"/>
-              <a:t>PUT HERE</a:t>
+              <a:t>The core</a:t>
+            </a:r>
+          </a:p>
+          <a:p>
+            <a:pPr lvl="1"/>
+            <a:r>
+              <a:rPr lang="en-GB" dirty="0" smtClean="0"/>
+              <a:t>A simple database has been set up</a:t>
+            </a:r>
+          </a:p>
+          <a:p>
+            <a:pPr lvl="1"/>
+            <a:r>
+              <a:rPr lang="en-GB" dirty="0" smtClean="0"/>
+              <a:t>A webpage has been </a:t>
+            </a:r>
+            <a:r>
+              <a:rPr lang="en-GB" dirty="0" smtClean="0"/>
+              <a:t>created</a:t>
+            </a:r>
+            <a:endParaRPr lang="en-GB" dirty="0" smtClean="0"/>
+          </a:p>
+          <a:p>
+            <a:pPr lvl="1"/>
+            <a:r>
+              <a:rPr lang="en-GB" dirty="0" smtClean="0"/>
+              <a:t>Home page occupied using PHP</a:t>
+            </a:r>
+          </a:p>
+          <a:p>
+            <a:pPr lvl="1"/>
+            <a:r>
+              <a:rPr lang="en-GB" dirty="0" smtClean="0"/>
+              <a:t>A simple trolley</a:t>
             </a:r>
             <a:endParaRPr lang="en-GB" dirty="0"/>
           </a:p>
@@ -6358,7 +6736,7 @@
     </p:spTree>
     <p:extLst>
       <p:ext uri="{BB962C8B-B14F-4D97-AF65-F5344CB8AC3E}">
-        <p14:creationId xmlns:p14="http://schemas.microsoft.com/office/powerpoint/2010/main" val="3322244696"/>
+        <p14:creationId xmlns:p14="http://schemas.microsoft.com/office/powerpoint/2010/main" val="2056144069"/>
       </p:ext>
     </p:extLst>
   </p:cSld>
@@ -6402,7 +6780,7 @@
           <a:p>
             <a:r>
               <a:rPr lang="en-GB" dirty="0" smtClean="0"/>
-              <a:t>Current Progress On Development</a:t>
+              <a:t>Demo</a:t>
             </a:r>
             <a:endParaRPr lang="en-GB" dirty="0"/>
           </a:p>
@@ -6425,35 +6803,7 @@
           <a:p>
             <a:r>
               <a:rPr lang="en-GB" dirty="0" smtClean="0"/>
-              <a:t>The core</a:t>
-            </a:r>
-          </a:p>
-          <a:p>
-            <a:pPr lvl="1"/>
-            <a:r>
-              <a:rPr lang="en-GB" dirty="0" smtClean="0"/>
-              <a:t>A simple database has been set up</a:t>
-            </a:r>
-          </a:p>
-          <a:p>
-            <a:pPr lvl="1"/>
-            <a:r>
-              <a:rPr lang="en-GB" dirty="0" smtClean="0"/>
-              <a:t>A webpage has been created (is subject to change)</a:t>
-            </a:r>
-          </a:p>
-          <a:p>
-            <a:pPr lvl="1"/>
-            <a:r>
-              <a:rPr lang="en-GB" dirty="0" smtClean="0"/>
-              <a:t>Home page occupied using PHP</a:t>
-            </a:r>
-          </a:p>
-          <a:p>
-            <a:pPr lvl="1"/>
-            <a:r>
-              <a:rPr lang="en-GB" dirty="0" smtClean="0"/>
-              <a:t>A simple trolley</a:t>
+              <a:t>We will now provide a demo of our website</a:t>
             </a:r>
             <a:endParaRPr lang="en-GB" dirty="0"/>
           </a:p>
@@ -6462,7 +6812,7 @@
     </p:spTree>
     <p:extLst>
       <p:ext uri="{BB962C8B-B14F-4D97-AF65-F5344CB8AC3E}">
-        <p14:creationId xmlns:p14="http://schemas.microsoft.com/office/powerpoint/2010/main" val="2056144069"/>
+        <p14:creationId xmlns:p14="http://schemas.microsoft.com/office/powerpoint/2010/main" val="1344941087"/>
       </p:ext>
     </p:extLst>
   </p:cSld>
@@ -6473,93 +6823,60 @@
 </file>
 
 <file path=ppt/theme/theme1.xml><?xml version="1.0" encoding="utf-8"?>
-<a:theme xmlns:a="http://schemas.openxmlformats.org/drawingml/2006/main" name="Office Theme">
+<a:theme xmlns:a="http://schemas.openxmlformats.org/drawingml/2006/main" name="Integral">
   <a:themeElements>
-    <a:clrScheme name="Office">
+    <a:clrScheme name="Integral">
       <a:dk1>
-        <a:sysClr val="windowText" lastClr="000000"/>
+        <a:srgbClr val="2E2B21"/>
       </a:dk1>
       <a:lt1>
-        <a:sysClr val="window" lastClr="FFFFFF"/>
+        <a:srgbClr val="FFFFFF"/>
       </a:lt1>
       <a:dk2>
-        <a:srgbClr val="44546A"/>
+        <a:srgbClr val="605B4F"/>
       </a:dk2>
       <a:lt2>
-        <a:srgbClr val="E7E6E6"/>
+        <a:srgbClr val="D8D6BE"/>
       </a:lt2>
       <a:accent1>
-        <a:srgbClr val="5B9BD5"/>
+        <a:srgbClr val="A9A57C"/>
       </a:accent1>
       <a:accent2>
-        <a:srgbClr val="ED7D31"/>
+        <a:srgbClr val="9CBEBD"/>
       </a:accent2>
       <a:accent3>
-        <a:srgbClr val="A5A5A5"/>
+        <a:srgbClr val="D2CB6C"/>
       </a:accent3>
       <a:accent4>
-        <a:srgbClr val="FFC000"/>
+        <a:srgbClr val="95A39D"/>
       </a:accent4>
       <a:accent5>
-        <a:srgbClr val="4472C4"/>
+        <a:srgbClr val="C89F5D"/>
       </a:accent5>
       <a:accent6>
-        <a:srgbClr val="70AD47"/>
+        <a:srgbClr val="B1A089"/>
       </a:accent6>
       <a:hlink>
-        <a:srgbClr val="0563C1"/>
+        <a:srgbClr val="D25814"/>
       </a:hlink>
       <a:folHlink>
-        <a:srgbClr val="954F72"/>
+        <a:srgbClr val="849A0A"/>
       </a:folHlink>
     </a:clrScheme>
-    <a:fontScheme name="Office">
+    <a:fontScheme name="Integral">
       <a:majorFont>
-        <a:latin typeface="Calibri Light" panose="020F0302020204030204"/>
+        <a:latin typeface="Tw Cen MT Condensed" panose="020B0606020104020203"/>
         <a:ea typeface=""/>
         <a:cs typeface=""/>
-        <a:font script="Jpan" typeface="ＭＳ Ｐゴシック"/>
-        <a:font script="Hang" typeface="맑은 고딕"/>
-        <a:font script="Hans" typeface="宋体"/>
-        <a:font script="Hant" typeface="新細明體"/>
-        <a:font script="Arab" typeface="Times New Roman"/>
-        <a:font script="Hebr" typeface="Times New Roman"/>
-        <a:font script="Thai" typeface="Angsana New"/>
-        <a:font script="Ethi" typeface="Nyala"/>
-        <a:font script="Beng" typeface="Vrinda"/>
-        <a:font script="Gujr" typeface="Shruti"/>
-        <a:font script="Khmr" typeface="MoolBoran"/>
-        <a:font script="Knda" typeface="Tunga"/>
-        <a:font script="Guru" typeface="Raavi"/>
-        <a:font script="Cans" typeface="Euphemia"/>
-        <a:font script="Cher" typeface="Plantagenet Cherokee"/>
-        <a:font script="Yiii" typeface="Microsoft Yi Baiti"/>
-        <a:font script="Tibt" typeface="Microsoft Himalaya"/>
-        <a:font script="Thaa" typeface="MV Boli"/>
-        <a:font script="Deva" typeface="Mangal"/>
-        <a:font script="Telu" typeface="Gautami"/>
-        <a:font script="Taml" typeface="Latha"/>
-        <a:font script="Syrc" typeface="Estrangelo Edessa"/>
-        <a:font script="Orya" typeface="Kalinga"/>
-        <a:font script="Mlym" typeface="Kartika"/>
-        <a:font script="Laoo" typeface="DokChampa"/>
-        <a:font script="Sinh" typeface="Iskoola Pota"/>
-        <a:font script="Mong" typeface="Mongolian Baiti"/>
-        <a:font script="Viet" typeface="Times New Roman"/>
-        <a:font script="Uigh" typeface="Microsoft Uighur"/>
-        <a:font script="Geor" typeface="Sylfaen"/>
-      </a:majorFont>
-      <a:minorFont>
-        <a:latin typeface="Calibri" panose="020F0502020204030204"/>
-        <a:ea typeface=""/>
-        <a:cs typeface=""/>
-        <a:font script="Jpan" typeface="ＭＳ Ｐゴシック"/>
-        <a:font script="Hang" typeface="맑은 고딕"/>
-        <a:font script="Hans" typeface="宋体"/>
-        <a:font script="Hant" typeface="新細明體"/>
+        <a:font script="Grek" typeface="Calibri"/>
+        <a:font script="Cyrl" typeface="Calibri"/>
+        <a:font script="Jpan" typeface="メイリオ"/>
+        <a:font script="Hang" typeface="HY얕은샘물M"/>
+        <a:font script="Hans" typeface="华文仿宋"/>
+        <a:font script="Hant" typeface="微軟正黑體"/>
         <a:font script="Arab" typeface="Arial"/>
-        <a:font script="Hebr" typeface="Arial"/>
-        <a:font script="Thai" typeface="Cordia New"/>
+        <a:font script="Hebr" typeface="Levenim MT"/>
+        <a:font script="Thai" typeface="FreesiaUPC"/>
         <a:font script="Ethi" typeface="Nyala"/>
         <a:font script="Beng" typeface="Vrinda"/>
         <a:font script="Gujr" typeface="Shruti"/>
@@ -6580,12 +6897,49 @@
         <a:font script="Laoo" typeface="DokChampa"/>
         <a:font script="Sinh" typeface="Iskoola Pota"/>
         <a:font script="Mong" typeface="Mongolian Baiti"/>
-        <a:font script="Viet" typeface="Arial"/>
+        <a:font script="Viet" typeface="Tahoma"/>
+        <a:font script="Uigh" typeface="Microsoft Uighur"/>
+        <a:font script="Geor" typeface="Sylfaen"/>
+      </a:majorFont>
+      <a:minorFont>
+        <a:latin typeface="Tw Cen MT" panose="020B0602020104020603"/>
+        <a:ea typeface=""/>
+        <a:cs typeface=""/>
+        <a:font script="Grek" typeface="Calibri"/>
+        <a:font script="Cyrl" typeface="Calibri"/>
+        <a:font script="Jpan" typeface="メイリオ"/>
+        <a:font script="Hang" typeface="HY얕은샘물M"/>
+        <a:font script="Hans" typeface="华文仿宋"/>
+        <a:font script="Hant" typeface="微軟正黑體"/>
+        <a:font script="Arab" typeface="Arial"/>
+        <a:font script="Hebr" typeface="Levenim MT"/>
+        <a:font script="Thai" typeface="FreesiaUPC"/>
+        <a:font script="Ethi" typeface="Nyala"/>
+        <a:font script="Beng" typeface="Vrinda"/>
+        <a:font script="Gujr" typeface="Shruti"/>
+        <a:font script="Khmr" typeface="DaunPenh"/>
+        <a:font script="Knda" typeface="Tunga"/>
+        <a:font script="Guru" typeface="Raavi"/>
+        <a:font script="Cans" typeface="Euphemia"/>
+        <a:font script="Cher" typeface="Plantagenet Cherokee"/>
+        <a:font script="Yiii" typeface="Microsoft Yi Baiti"/>
+        <a:font script="Tibt" typeface="Microsoft Himalaya"/>
+        <a:font script="Thaa" typeface="MV Boli"/>
+        <a:font script="Deva" typeface="Mangal"/>
+        <a:font script="Telu" typeface="Gautami"/>
+        <a:font script="Taml" typeface="Latha"/>
+        <a:font script="Syrc" typeface="Estrangelo Edessa"/>
+        <a:font script="Orya" typeface="Kalinga"/>
+        <a:font script="Mlym" typeface="Kartika"/>
+        <a:font script="Laoo" typeface="DokChampa"/>
+        <a:font script="Sinh" typeface="Iskoola Pota"/>
+        <a:font script="Mong" typeface="Mongolian Baiti"/>
+        <a:font script="Viet" typeface="Tahoma"/>
         <a:font script="Uigh" typeface="Microsoft Uighur"/>
         <a:font script="Geor" typeface="Sylfaen"/>
       </a:minorFont>
     </a:fontScheme>
-    <a:fmtScheme name="Office">
+    <a:fmtScheme name="Integral">
       <a:fillStyleLst>
         <a:solidFill>
           <a:schemeClr val="phClr"/>
@@ -6594,76 +6948,65 @@
           <a:gsLst>
             <a:gs pos="0">
               <a:schemeClr val="phClr">
-                <a:lumMod val="110000"/>
-                <a:satMod val="105000"/>
-                <a:tint val="67000"/>
-              </a:schemeClr>
-            </a:gs>
-            <a:gs pos="50000">
-              <a:schemeClr val="phClr">
-                <a:lumMod val="105000"/>
-                <a:satMod val="103000"/>
-                <a:tint val="73000"/>
+                <a:tint val="83000"/>
+                <a:satMod val="100000"/>
+                <a:lumMod val="100000"/>
               </a:schemeClr>
             </a:gs>
             <a:gs pos="100000">
               <a:schemeClr val="phClr">
-                <a:lumMod val="105000"/>
-                <a:satMod val="109000"/>
-                <a:tint val="81000"/>
+                <a:tint val="61000"/>
+                <a:satMod val="150000"/>
+                <a:lumMod val="100000"/>
               </a:schemeClr>
             </a:gs>
           </a:gsLst>
-          <a:lin ang="5400000" scaled="0"/>
+          <a:path path="circle">
+            <a:fillToRect l="100000" t="100000" r="100000" b="100000"/>
+          </a:path>
         </a:gradFill>
         <a:gradFill rotWithShape="1">
           <a:gsLst>
             <a:gs pos="0">
               <a:schemeClr val="phClr">
-                <a:satMod val="103000"/>
-                <a:lumMod val="102000"/>
-                <a:tint val="94000"/>
-              </a:schemeClr>
-            </a:gs>
-            <a:gs pos="50000">
-              <a:schemeClr val="phClr">
-                <a:satMod val="110000"/>
+                <a:tint val="100000"/>
+                <a:shade val="85000"/>
+                <a:satMod val="100000"/>
                 <a:lumMod val="100000"/>
-                <a:shade val="100000"/>
               </a:schemeClr>
             </a:gs>
             <a:gs pos="100000">
               <a:schemeClr val="phClr">
-                <a:lumMod val="99000"/>
-                <a:satMod val="120000"/>
-                <a:shade val="78000"/>
+                <a:tint val="90000"/>
+                <a:shade val="100000"/>
+                <a:satMod val="150000"/>
+                <a:lumMod val="100000"/>
               </a:schemeClr>
             </a:gs>
           </a:gsLst>
-          <a:lin ang="5400000" scaled="0"/>
+          <a:path path="circle">
+            <a:fillToRect l="100000" t="100000" r="100000" b="100000"/>
+          </a:path>
         </a:gradFill>
       </a:fillStyleLst>
       <a:lnStyleLst>
-        <a:ln w="6350" cap="flat" cmpd="sng" algn="ctr">
+        <a:ln w="9525" cap="flat" cmpd="sng" algn="ctr">
           <a:solidFill>
             <a:schemeClr val="phClr"/>
           </a:solidFill>
           <a:prstDash val="solid"/>
-          <a:miter lim="800000"/>
         </a:ln>
-        <a:ln w="12700" cap="flat" cmpd="sng" algn="ctr">
+        <a:ln w="15875" cap="flat" cmpd="sng" algn="ctr">
           <a:solidFill>
             <a:schemeClr val="phClr"/>
           </a:solidFill>
           <a:prstDash val="solid"/>
-          <a:miter lim="800000"/>
         </a:ln>
         <a:ln w="19050" cap="flat" cmpd="sng" algn="ctr">
           <a:solidFill>
             <a:schemeClr val="phClr"/>
           </a:solidFill>
           <a:prstDash val="solid"/>
-          <a:miter lim="800000"/>
         </a:ln>
       </a:lnStyleLst>
       <a:effectStyleLst>
@@ -6671,16 +7014,39 @@
           <a:effectLst/>
         </a:effectStyle>
         <a:effectStyle>
-          <a:effectLst/>
+          <a:effectLst>
+            <a:outerShdw blurRad="50800" dist="12700" dir="5400000" algn="ctr" rotWithShape="0">
+              <a:srgbClr val="000000">
+                <a:alpha val="50000"/>
+              </a:srgbClr>
+            </a:outerShdw>
+          </a:effectLst>
         </a:effectStyle>
         <a:effectStyle>
           <a:effectLst>
-            <a:outerShdw blurRad="57150" dist="19050" dir="5400000" algn="ctr" rotWithShape="0">
+            <a:outerShdw blurRad="76200" dist="25400" dir="5400000" algn="ctr" rotWithShape="0">
               <a:srgbClr val="000000">
-                <a:alpha val="63000"/>
+                <a:alpha val="60000"/>
               </a:srgbClr>
             </a:outerShdw>
           </a:effectLst>
+          <a:scene3d>
+            <a:camera prst="orthographicFront">
+              <a:rot lat="0" lon="0" rev="0"/>
+            </a:camera>
+            <a:lightRig rig="flat" dir="t">
+              <a:rot lat="0" lon="0" rev="3600000"/>
+            </a:lightRig>
+          </a:scene3d>
+          <a:sp3d contourW="12700" prstMaterial="flat">
+            <a:bevelT w="38100" h="44450" prst="angle"/>
+            <a:contourClr>
+              <a:schemeClr val="phClr">
+                <a:shade val="35000"/>
+                <a:satMod val="160000"/>
+              </a:schemeClr>
+            </a:contourClr>
+          </a:sp3d>
         </a:effectStyle>
       </a:effectStyleLst>
       <a:bgFillStyleLst>
@@ -6690,36 +7056,27 @@
         <a:solidFill>
           <a:schemeClr val="phClr">
             <a:tint val="95000"/>
-            <a:satMod val="170000"/>
+            <a:shade val="85000"/>
+            <a:satMod val="125000"/>
           </a:schemeClr>
         </a:solidFill>
-        <a:gradFill rotWithShape="1">
-          <a:gsLst>
-            <a:gs pos="0">
+        <a:blipFill rotWithShape="1">
+          <a:blip xmlns:r="http://schemas.openxmlformats.org/officeDocument/2006/relationships" r:embed="rId1">
+            <a:duotone>
               <a:schemeClr val="phClr">
-                <a:tint val="93000"/>
-                <a:satMod val="150000"/>
-                <a:shade val="98000"/>
-                <a:lumMod val="102000"/>
+                <a:tint val="95000"/>
+                <a:shade val="74000"/>
+                <a:satMod val="230000"/>
               </a:schemeClr>
-            </a:gs>
-            <a:gs pos="50000">
               <a:schemeClr val="phClr">
-                <a:tint val="98000"/>
-                <a:satMod val="130000"/>
-                <a:shade val="90000"/>
-                <a:lumMod val="103000"/>
+                <a:tint val="92000"/>
+                <a:shade val="69000"/>
+                <a:satMod val="250000"/>
               </a:schemeClr>
-            </a:gs>
-            <a:gs pos="100000">
-              <a:schemeClr val="phClr">
-                <a:shade val="63000"/>
-                <a:satMod val="120000"/>
-              </a:schemeClr>
-            </a:gs>
-          </a:gsLst>
-          <a:lin ang="5400000" scaled="0"/>
-        </a:gradFill>
+            </a:duotone>
+          </a:blip>
+          <a:tile tx="0" ty="0" sx="40000" sy="40000" flip="none" algn="tl"/>
+        </a:blipFill>
       </a:bgFillStyleLst>
     </a:fmtScheme>
   </a:themeElements>
@@ -6727,7 +7084,7 @@
   <a:extraClrSchemeLst/>
   <a:extLst>
     <a:ext uri="{05A4C25C-085E-4340-85A3-A5531E510DB2}">
-      <thm15:themeFamily xmlns:thm15="http://schemas.microsoft.com/office/thememl/2012/main" name="Office Theme" id="{62F939B6-93AF-4DB8-9C6B-D6C7DFDC589F}" vid="{4A3C46E8-61CC-4603-A589-7422A47A8E4A}"/>
+      <thm15:themeFamily xmlns:thm15="http://schemas.microsoft.com/office/thememl/2012/main" name="Integral" id="{3577F8C9-A904-41D8-97D2-FD898F53F20E}" vid="{4825F1AF-8DBC-4E3D-9F3D-688338DA83FC}"/>
     </a:ext>
   </a:extLst>
 </a:theme>

</xml_diff>

<commit_message>
Hamza: Presentation has been updated.
</commit_message>
<xml_diff>
--- a/Group_Docs/Team_Presentation_Group2.pptx
+++ b/Group_Docs/Team_Presentation_Group2.pptx
@@ -275,7 +275,7 @@
           <a:p>
             <a:fld id="{67BDCB85-630C-4FC8-A0A8-B4A448B7EB6C}" type="datetimeFigureOut">
               <a:rPr lang="en-GB" smtClean="0"/>
-              <a:t>27/02/2016</a:t>
+              <a:t>28/02/2016</a:t>
             </a:fld>
             <a:endParaRPr lang="en-GB"/>
           </a:p>
@@ -518,7 +518,7 @@
           <a:p>
             <a:fld id="{67BDCB85-630C-4FC8-A0A8-B4A448B7EB6C}" type="datetimeFigureOut">
               <a:rPr lang="en-GB" smtClean="0"/>
-              <a:t>27/02/2016</a:t>
+              <a:t>28/02/2016</a:t>
             </a:fld>
             <a:endParaRPr lang="en-GB"/>
           </a:p>
@@ -698,7 +698,7 @@
           <a:p>
             <a:fld id="{67BDCB85-630C-4FC8-A0A8-B4A448B7EB6C}" type="datetimeFigureOut">
               <a:rPr lang="en-GB" smtClean="0"/>
-              <a:t>27/02/2016</a:t>
+              <a:t>28/02/2016</a:t>
             </a:fld>
             <a:endParaRPr lang="en-GB"/>
           </a:p>
@@ -903,7 +903,7 @@
           <a:p>
             <a:fld id="{67BDCB85-630C-4FC8-A0A8-B4A448B7EB6C}" type="datetimeFigureOut">
               <a:rPr lang="en-GB" smtClean="0"/>
-              <a:t>27/02/2016</a:t>
+              <a:t>28/02/2016</a:t>
             </a:fld>
             <a:endParaRPr lang="en-GB"/>
           </a:p>
@@ -1160,7 +1160,7 @@
           <a:p>
             <a:fld id="{67BDCB85-630C-4FC8-A0A8-B4A448B7EB6C}" type="datetimeFigureOut">
               <a:rPr lang="en-GB" smtClean="0"/>
-              <a:t>27/02/2016</a:t>
+              <a:t>28/02/2016</a:t>
             </a:fld>
             <a:endParaRPr lang="en-GB"/>
           </a:p>
@@ -1507,7 +1507,7 @@
           <a:p>
             <a:fld id="{67BDCB85-630C-4FC8-A0A8-B4A448B7EB6C}" type="datetimeFigureOut">
               <a:rPr lang="en-GB" smtClean="0"/>
-              <a:t>27/02/2016</a:t>
+              <a:t>28/02/2016</a:t>
             </a:fld>
             <a:endParaRPr lang="en-GB"/>
           </a:p>
@@ -1909,7 +1909,7 @@
           <a:p>
             <a:fld id="{67BDCB85-630C-4FC8-A0A8-B4A448B7EB6C}" type="datetimeFigureOut">
               <a:rPr lang="en-GB" smtClean="0"/>
-              <a:t>27/02/2016</a:t>
+              <a:t>28/02/2016</a:t>
             </a:fld>
             <a:endParaRPr lang="en-GB"/>
           </a:p>
@@ -2027,7 +2027,7 @@
           <a:p>
             <a:fld id="{67BDCB85-630C-4FC8-A0A8-B4A448B7EB6C}" type="datetimeFigureOut">
               <a:rPr lang="en-GB" smtClean="0"/>
-              <a:t>27/02/2016</a:t>
+              <a:t>28/02/2016</a:t>
             </a:fld>
             <a:endParaRPr lang="en-GB"/>
           </a:p>
@@ -2122,7 +2122,7 @@
           <a:p>
             <a:fld id="{67BDCB85-630C-4FC8-A0A8-B4A448B7EB6C}" type="datetimeFigureOut">
               <a:rPr lang="en-GB" smtClean="0"/>
-              <a:t>27/02/2016</a:t>
+              <a:t>28/02/2016</a:t>
             </a:fld>
             <a:endParaRPr lang="en-GB"/>
           </a:p>
@@ -2412,7 +2412,7 @@
           <a:p>
             <a:fld id="{67BDCB85-630C-4FC8-A0A8-B4A448B7EB6C}" type="datetimeFigureOut">
               <a:rPr lang="en-GB" smtClean="0"/>
-              <a:t>27/02/2016</a:t>
+              <a:t>28/02/2016</a:t>
             </a:fld>
             <a:endParaRPr lang="en-GB"/>
           </a:p>
@@ -2692,7 +2692,7 @@
           <a:p>
             <a:fld id="{67BDCB85-630C-4FC8-A0A8-B4A448B7EB6C}" type="datetimeFigureOut">
               <a:rPr lang="en-GB" smtClean="0"/>
-              <a:t>27/02/2016</a:t>
+              <a:t>28/02/2016</a:t>
             </a:fld>
             <a:endParaRPr lang="en-GB"/>
           </a:p>
@@ -2942,7 +2942,7 @@
           <a:p>
             <a:fld id="{67BDCB85-630C-4FC8-A0A8-B4A448B7EB6C}" type="datetimeFigureOut">
               <a:rPr lang="en-GB" smtClean="0"/>
-              <a:t>27/02/2016</a:t>
+              <a:t>28/02/2016</a:t>
             </a:fld>
             <a:endParaRPr lang="en-GB"/>
           </a:p>
@@ -3498,20 +3498,11 @@
               <a:rPr lang="en-GB" dirty="0" smtClean="0"/>
               <a:t>Group 2 – </a:t>
             </a:r>
-            <a:endParaRPr lang="en-GB" dirty="0" smtClean="0"/>
           </a:p>
           <a:p>
             <a:r>
               <a:rPr lang="en-GB" dirty="0" smtClean="0"/>
-              <a:t>Hamza </a:t>
-            </a:r>
-            <a:r>
-              <a:rPr lang="en-GB" dirty="0" smtClean="0"/>
-              <a:t>Bhatti (</a:t>
-            </a:r>
-            <a:r>
-              <a:rPr lang="en-GB" dirty="0" smtClean="0"/>
-              <a:t>21223241)</a:t>
+              <a:t>Hamza Bhatti (21223241)</a:t>
             </a:r>
           </a:p>
           <a:p>
@@ -3539,21 +3530,13 @@
             </a:r>
             <a:r>
               <a:rPr lang="en-GB" dirty="0" smtClean="0"/>
-              <a:t> Nicholas-Cousins (</a:t>
-            </a:r>
+              <a:t> Nicholas-Cousins (21234209)</a:t>
+            </a:r>
+          </a:p>
+          <a:p>
             <a:r>
               <a:rPr lang="en-GB" dirty="0" smtClean="0"/>
-              <a:t>21234209)</a:t>
-            </a:r>
-          </a:p>
-          <a:p>
-            <a:r>
-              <a:rPr lang="en-GB" dirty="0" smtClean="0"/>
-              <a:t>Joe </a:t>
-            </a:r>
-            <a:r>
-              <a:rPr lang="en-GB" dirty="0" smtClean="0"/>
-              <a:t>Sykes (21223675)</a:t>
+              <a:t>Joe Sykes (21223675)</a:t>
             </a:r>
             <a:endParaRPr lang="en-GB" dirty="0"/>
           </a:p>
@@ -5549,14 +5532,14 @@
             <p:ph idx="1"/>
             <p:extLst>
               <p:ext uri="{D42A27DB-BD31-4B8C-83A1-F6EECF244321}">
-                <p14:modId xmlns:p14="http://schemas.microsoft.com/office/powerpoint/2010/main" val="623184684"/>
+                <p14:modId xmlns:p14="http://schemas.microsoft.com/office/powerpoint/2010/main" val="708975578"/>
               </p:ext>
             </p:extLst>
           </p:nvPr>
         </p:nvGraphicFramePr>
         <p:xfrm>
           <a:off x="786684" y="1924429"/>
-          <a:ext cx="3073400" cy="2454276"/>
+          <a:ext cx="3073400" cy="2967675"/>
         </p:xfrm>
         <a:graphic>
           <a:graphicData uri="http://schemas.openxmlformats.org/drawingml/2006/table">
@@ -5701,15 +5684,12 @@
                           <a:spcPts val="0"/>
                         </a:spcAft>
                       </a:pPr>
-                      <a:r>
-                        <a:rPr lang="en-GB" sz="1400">
-                          <a:effectLst/>
-                          <a:latin typeface="+mn-lt"/>
-                          <a:ea typeface="Calibri" panose="020F0502020204030204" pitchFamily="34" charset="0"/>
-                          <a:cs typeface="Times New Roman" panose="02020603050405020304" pitchFamily="18" charset="0"/>
-                        </a:rPr>
-                        <a:t>2.Quality Assurance</a:t>
-                      </a:r>
+                      <a:endParaRPr lang="en-GB" sz="1400" dirty="0">
+                        <a:effectLst/>
+                        <a:latin typeface="+mn-lt"/>
+                        <a:ea typeface="Calibri" panose="020F0502020204030204" pitchFamily="34" charset="0"/>
+                        <a:cs typeface="Times New Roman" panose="02020603050405020304" pitchFamily="18" charset="0"/>
+                      </a:endParaRPr>
                     </a:p>
                   </a:txBody>
                   <a:tcPr marL="68580" marR="68580" marT="0" marB="0">
@@ -5773,8 +5753,23 @@
                           <a:ea typeface="Calibri" panose="020F0502020204030204" pitchFamily="34" charset="0"/>
                           <a:cs typeface="Times New Roman" panose="02020603050405020304" pitchFamily="18" charset="0"/>
                         </a:rPr>
-                        <a:t>3.Analysis</a:t>
-                      </a:r>
+                        <a:t>2</a:t>
+                      </a:r>
+                      <a:r>
+                        <a:rPr lang="en-GB" sz="1400" dirty="0" smtClean="0">
+                          <a:effectLst/>
+                          <a:latin typeface="+mn-lt"/>
+                          <a:ea typeface="Calibri" panose="020F0502020204030204" pitchFamily="34" charset="0"/>
+                          <a:cs typeface="Times New Roman" panose="02020603050405020304" pitchFamily="18" charset="0"/>
+                        </a:rPr>
+                        <a:t>.Analysis</a:t>
+                      </a:r>
+                      <a:endParaRPr lang="en-GB" sz="1400" dirty="0">
+                        <a:effectLst/>
+                        <a:latin typeface="+mn-lt"/>
+                        <a:ea typeface="Calibri" panose="020F0502020204030204" pitchFamily="34" charset="0"/>
+                        <a:cs typeface="Times New Roman" panose="02020603050405020304" pitchFamily="18" charset="0"/>
+                      </a:endParaRPr>
                     </a:p>
                     <a:p>
                       <a:pPr>
@@ -5850,15 +5845,12 @@
                           <a:spcPts val="0"/>
                         </a:spcAft>
                       </a:pPr>
-                      <a:r>
-                        <a:rPr lang="en-GB" sz="1400">
-                          <a:effectLst/>
-                          <a:latin typeface="+mn-lt"/>
-                          <a:ea typeface="Calibri" panose="020F0502020204030204" pitchFamily="34" charset="0"/>
-                          <a:cs typeface="Times New Roman" panose="02020603050405020304" pitchFamily="18" charset="0"/>
-                        </a:rPr>
-                        <a:t>4.Risk Assessment</a:t>
-                      </a:r>
+                      <a:endParaRPr lang="en-GB" sz="1400" dirty="0">
+                        <a:effectLst/>
+                        <a:latin typeface="+mn-lt"/>
+                        <a:ea typeface="Calibri" panose="020F0502020204030204" pitchFamily="34" charset="0"/>
+                        <a:cs typeface="Times New Roman" panose="02020603050405020304" pitchFamily="18" charset="0"/>
+                      </a:endParaRPr>
                     </a:p>
                   </a:txBody>
                   <a:tcPr marL="68580" marR="68580" marT="0" marB="0">
@@ -5922,8 +5914,168 @@
                           <a:ea typeface="Calibri" panose="020F0502020204030204" pitchFamily="34" charset="0"/>
                           <a:cs typeface="Times New Roman" panose="02020603050405020304" pitchFamily="18" charset="0"/>
                         </a:rPr>
-                        <a:t>5.Design</a:t>
-                      </a:r>
+                        <a:t>3</a:t>
+                      </a:r>
+                      <a:r>
+                        <a:rPr lang="en-GB" sz="1400" dirty="0" smtClean="0">
+                          <a:effectLst/>
+                          <a:latin typeface="+mn-lt"/>
+                          <a:ea typeface="Calibri" panose="020F0502020204030204" pitchFamily="34" charset="0"/>
+                          <a:cs typeface="Times New Roman" panose="02020603050405020304" pitchFamily="18" charset="0"/>
+                        </a:rPr>
+                        <a:t>.Risk </a:t>
+                      </a:r>
+                      <a:r>
+                        <a:rPr lang="en-GB" sz="1400" dirty="0">
+                          <a:effectLst/>
+                          <a:latin typeface="+mn-lt"/>
+                          <a:ea typeface="Calibri" panose="020F0502020204030204" pitchFamily="34" charset="0"/>
+                          <a:cs typeface="Times New Roman" panose="02020603050405020304" pitchFamily="18" charset="0"/>
+                        </a:rPr>
+                        <a:t>Assessment</a:t>
+                      </a:r>
+                    </a:p>
+                  </a:txBody>
+                  <a:tcPr marL="68580" marR="68580" marT="0" marB="0">
+                    <a:lnL w="12700" cap="flat" cmpd="sng" algn="ctr">
+                      <a:noFill/>
+                      <a:prstDash val="solid"/>
+                      <a:round/>
+                      <a:headEnd type="none" w="med" len="med"/>
+                      <a:tailEnd type="none" w="med" len="med"/>
+                    </a:lnL>
+                    <a:lnR w="12700" cap="flat" cmpd="sng" algn="ctr">
+                      <a:noFill/>
+                      <a:prstDash val="solid"/>
+                      <a:round/>
+                      <a:headEnd type="none" w="med" len="med"/>
+                      <a:tailEnd type="none" w="med" len="med"/>
+                    </a:lnR>
+                    <a:lnT w="12700" cap="flat" cmpd="sng" algn="ctr">
+                      <a:noFill/>
+                      <a:prstDash val="solid"/>
+                      <a:round/>
+                      <a:headEnd type="none" w="med" len="med"/>
+                      <a:tailEnd type="none" w="med" len="med"/>
+                    </a:lnT>
+                    <a:lnB w="12700" cap="flat" cmpd="sng" algn="ctr">
+                      <a:noFill/>
+                      <a:prstDash val="solid"/>
+                      <a:round/>
+                      <a:headEnd type="none" w="med" len="med"/>
+                      <a:tailEnd type="none" w="med" len="med"/>
+                    </a:lnB>
+                    <a:lnTlToBr w="12700" cmpd="sng">
+                      <a:noFill/>
+                      <a:prstDash val="solid"/>
+                    </a:lnTlToBr>
+                    <a:lnBlToTr w="12700" cmpd="sng">
+                      <a:noFill/>
+                      <a:prstDash val="solid"/>
+                    </a:lnBlToTr>
+                  </a:tcPr>
+                </a:tc>
+              </a:tr>
+              <a:tr h="0">
+                <a:tc>
+                  <a:txBody>
+                    <a:bodyPr/>
+                    <a:lstStyle/>
+                    <a:p>
+                      <a:pPr>
+                        <a:lnSpc>
+                          <a:spcPct val="107000"/>
+                        </a:lnSpc>
+                        <a:spcAft>
+                          <a:spcPts val="0"/>
+                        </a:spcAft>
+                      </a:pPr>
+                      <a:endParaRPr lang="en-GB" sz="1400" dirty="0">
+                        <a:effectLst/>
+                        <a:latin typeface="+mn-lt"/>
+                        <a:ea typeface="Calibri" panose="020F0502020204030204" pitchFamily="34" charset="0"/>
+                        <a:cs typeface="Times New Roman" panose="02020603050405020304" pitchFamily="18" charset="0"/>
+                      </a:endParaRPr>
+                    </a:p>
+                  </a:txBody>
+                  <a:tcPr marL="68580" marR="68580" marT="0" marB="0">
+                    <a:lnL w="12700" cap="flat" cmpd="sng" algn="ctr">
+                      <a:noFill/>
+                      <a:prstDash val="solid"/>
+                      <a:round/>
+                      <a:headEnd type="none" w="med" len="med"/>
+                      <a:tailEnd type="none" w="med" len="med"/>
+                    </a:lnL>
+                    <a:lnR w="12700" cap="flat" cmpd="sng" algn="ctr">
+                      <a:noFill/>
+                      <a:prstDash val="solid"/>
+                      <a:round/>
+                      <a:headEnd type="none" w="med" len="med"/>
+                      <a:tailEnd type="none" w="med" len="med"/>
+                    </a:lnR>
+                    <a:lnT w="12700" cap="flat" cmpd="sng" algn="ctr">
+                      <a:noFill/>
+                      <a:prstDash val="solid"/>
+                      <a:round/>
+                      <a:headEnd type="none" w="med" len="med"/>
+                      <a:tailEnd type="none" w="med" len="med"/>
+                    </a:lnT>
+                    <a:lnB w="12700" cap="flat" cmpd="sng" algn="ctr">
+                      <a:noFill/>
+                      <a:prstDash val="solid"/>
+                      <a:round/>
+                      <a:headEnd type="none" w="med" len="med"/>
+                      <a:tailEnd type="none" w="med" len="med"/>
+                    </a:lnB>
+                    <a:lnTlToBr w="12700" cmpd="sng">
+                      <a:noFill/>
+                      <a:prstDash val="solid"/>
+                    </a:lnTlToBr>
+                    <a:lnBlToTr w="12700" cmpd="sng">
+                      <a:noFill/>
+                      <a:prstDash val="solid"/>
+                    </a:lnBlToTr>
+                  </a:tcPr>
+                </a:tc>
+              </a:tr>
+              <a:tr h="0">
+                <a:tc>
+                  <a:txBody>
+                    <a:bodyPr/>
+                    <a:lstStyle/>
+                    <a:p>
+                      <a:pPr>
+                        <a:lnSpc>
+                          <a:spcPct val="107000"/>
+                        </a:lnSpc>
+                        <a:spcAft>
+                          <a:spcPts val="0"/>
+                        </a:spcAft>
+                      </a:pPr>
+                      <a:r>
+                        <a:rPr lang="en-GB" sz="1400" dirty="0">
+                          <a:effectLst/>
+                          <a:latin typeface="+mn-lt"/>
+                          <a:ea typeface="Calibri" panose="020F0502020204030204" pitchFamily="34" charset="0"/>
+                          <a:cs typeface="Times New Roman" panose="02020603050405020304" pitchFamily="18" charset="0"/>
+                        </a:rPr>
+                        <a:t>4</a:t>
+                      </a:r>
+                      <a:r>
+                        <a:rPr lang="en-GB" sz="1400" dirty="0" smtClean="0">
+                          <a:effectLst/>
+                          <a:latin typeface="+mn-lt"/>
+                          <a:ea typeface="Calibri" panose="020F0502020204030204" pitchFamily="34" charset="0"/>
+                          <a:cs typeface="Times New Roman" panose="02020603050405020304" pitchFamily="18" charset="0"/>
+                        </a:rPr>
+                        <a:t>.Design</a:t>
+                      </a:r>
+                      <a:endParaRPr lang="en-GB" sz="1400" dirty="0">
+                        <a:effectLst/>
+                        <a:latin typeface="+mn-lt"/>
+                        <a:ea typeface="Calibri" panose="020F0502020204030204" pitchFamily="34" charset="0"/>
+                        <a:cs typeface="Times New Roman" panose="02020603050405020304" pitchFamily="18" charset="0"/>
+                      </a:endParaRPr>
                     </a:p>
                     <a:p>
                       <a:pPr>
@@ -6005,14 +6157,14 @@
           <p:nvPr>
             <p:extLst>
               <p:ext uri="{D42A27DB-BD31-4B8C-83A1-F6EECF244321}">
-                <p14:modId xmlns:p14="http://schemas.microsoft.com/office/powerpoint/2010/main" val="1836659199"/>
+                <p14:modId xmlns:p14="http://schemas.microsoft.com/office/powerpoint/2010/main" val="1734683702"/>
               </p:ext>
             </p:extLst>
           </p:nvPr>
         </p:nvGraphicFramePr>
         <p:xfrm>
           <a:off x="7420864" y="1937507"/>
-          <a:ext cx="2697480" cy="1130046"/>
+          <a:ext cx="2697480" cy="2054544"/>
         </p:xfrm>
         <a:graphic>
           <a:graphicData uri="http://schemas.openxmlformats.org/drawingml/2006/table">
@@ -6036,6 +6188,123 @@
                         </a:spcAft>
                       </a:pPr>
                       <a:r>
+                        <a:rPr lang="en-GB" sz="1400" dirty="0" smtClean="0">
+                          <a:effectLst/>
+                          <a:latin typeface="+mn-lt"/>
+                          <a:ea typeface="Calibri" panose="020F0502020204030204" pitchFamily="34" charset="0"/>
+                          <a:cs typeface="Times New Roman" panose="02020603050405020304" pitchFamily="18" charset="0"/>
+                        </a:rPr>
+                        <a:t>7.Testing</a:t>
+                      </a:r>
+                    </a:p>
+                    <a:p>
+                      <a:pPr>
+                        <a:lnSpc>
+                          <a:spcPct val="107000"/>
+                        </a:lnSpc>
+                        <a:spcAft>
+                          <a:spcPts val="0"/>
+                        </a:spcAft>
+                      </a:pPr>
+                      <a:r>
+                        <a:rPr lang="en-GB" sz="1400" dirty="0" smtClean="0">
+                          <a:effectLst/>
+                          <a:latin typeface="+mn-lt"/>
+                          <a:ea typeface="Calibri" panose="020F0502020204030204" pitchFamily="34" charset="0"/>
+                          <a:cs typeface="Times New Roman" panose="02020603050405020304" pitchFamily="18" charset="0"/>
+                        </a:rPr>
+                        <a:t>        7.1.Testing Database</a:t>
+                      </a:r>
+                    </a:p>
+                    <a:p>
+                      <a:pPr>
+                        <a:lnSpc>
+                          <a:spcPct val="107000"/>
+                        </a:lnSpc>
+                        <a:spcAft>
+                          <a:spcPts val="0"/>
+                        </a:spcAft>
+                      </a:pPr>
+                      <a:r>
+                        <a:rPr lang="en-GB" sz="1400" dirty="0" smtClean="0">
+                          <a:effectLst/>
+                          <a:latin typeface="+mn-lt"/>
+                          <a:ea typeface="Calibri" panose="020F0502020204030204" pitchFamily="34" charset="0"/>
+                          <a:cs typeface="Times New Roman" panose="02020603050405020304" pitchFamily="18" charset="0"/>
+                        </a:rPr>
+                        <a:t>        7.2.Testing Website</a:t>
+                      </a:r>
+                    </a:p>
+                  </a:txBody>
+                  <a:tcPr marL="68580" marR="68580" marT="0" marB="0">
+                    <a:lnL>
+                      <a:noFill/>
+                    </a:lnL>
+                    <a:lnR>
+                      <a:noFill/>
+                    </a:lnR>
+                    <a:lnT>
+                      <a:noFill/>
+                    </a:lnT>
+                    <a:lnB>
+                      <a:noFill/>
+                    </a:lnB>
+                  </a:tcPr>
+                </a:tc>
+              </a:tr>
+              <a:tr h="0">
+                <a:tc>
+                  <a:txBody>
+                    <a:bodyPr/>
+                    <a:lstStyle/>
+                    <a:p>
+                      <a:pPr>
+                        <a:lnSpc>
+                          <a:spcPct val="107000"/>
+                        </a:lnSpc>
+                        <a:spcAft>
+                          <a:spcPts val="0"/>
+                        </a:spcAft>
+                      </a:pPr>
+                      <a:endParaRPr lang="en-GB" sz="1400" dirty="0" smtClean="0">
+                        <a:effectLst/>
+                        <a:latin typeface="+mn-lt"/>
+                        <a:ea typeface="Calibri" panose="020F0502020204030204" pitchFamily="34" charset="0"/>
+                        <a:cs typeface="Times New Roman" panose="02020603050405020304" pitchFamily="18" charset="0"/>
+                      </a:endParaRPr>
+                    </a:p>
+                  </a:txBody>
+                  <a:tcPr marL="68580" marR="68580" marT="0" marB="0">
+                    <a:lnL>
+                      <a:noFill/>
+                    </a:lnL>
+                    <a:lnR>
+                      <a:noFill/>
+                    </a:lnR>
+                    <a:lnT>
+                      <a:noFill/>
+                    </a:lnT>
+                    <a:lnB>
+                      <a:noFill/>
+                    </a:lnB>
+                  </a:tcPr>
+                </a:tc>
+              </a:tr>
+              <a:tr h="0">
+                <a:tc>
+                  <a:txBody>
+                    <a:bodyPr/>
+                    <a:lstStyle/>
+                    <a:p>
+                      <a:pPr>
+                        <a:lnSpc>
+                          <a:spcPct val="107000"/>
+                        </a:lnSpc>
+                        <a:spcAft>
+                          <a:spcPts val="0"/>
+                        </a:spcAft>
+                      </a:pPr>
+                      <a:r>
                         <a:rPr lang="en-GB" sz="1400" dirty="0">
                           <a:effectLst/>
                           <a:latin typeface="+mn-lt"/>
@@ -6151,21 +6420,21 @@
           <p:nvPr>
             <p:extLst>
               <p:ext uri="{D42A27DB-BD31-4B8C-83A1-F6EECF244321}">
-                <p14:modId xmlns:p14="http://schemas.microsoft.com/office/powerpoint/2010/main" val="679597678"/>
+                <p14:modId xmlns:p14="http://schemas.microsoft.com/office/powerpoint/2010/main" val="3323197074"/>
               </p:ext>
             </p:extLst>
           </p:nvPr>
         </p:nvGraphicFramePr>
         <p:xfrm>
           <a:off x="4291734" y="1937507"/>
-          <a:ext cx="2697480" cy="3858070"/>
+          <a:ext cx="3129130" cy="3195956"/>
         </p:xfrm>
         <a:graphic>
           <a:graphicData uri="http://schemas.openxmlformats.org/drawingml/2006/table">
             <a:tbl>
               <a:tblPr firstRow="1" firstCol="1" bandRow="1"/>
               <a:tblGrid>
-                <a:gridCol w="2697480"/>
+                <a:gridCol w="3129130"/>
               </a:tblGrid>
               <a:tr h="0">
                 <a:tc>
@@ -6188,7 +6457,25 @@
                           <a:ea typeface="Calibri" panose="020F0502020204030204" pitchFamily="34" charset="0"/>
                           <a:cs typeface="Times New Roman" panose="02020603050405020304" pitchFamily="18" charset="0"/>
                         </a:rPr>
-                        <a:t>6.Software Development</a:t>
+                        <a:t>5</a:t>
+                      </a:r>
+                      <a:r>
+                        <a:rPr lang="en-GB" sz="1400" dirty="0" smtClean="0">
+                          <a:effectLst/>
+                          <a:latin typeface="+mn-lt"/>
+                          <a:ea typeface="Calibri" panose="020F0502020204030204" pitchFamily="34" charset="0"/>
+                          <a:cs typeface="Times New Roman" panose="02020603050405020304" pitchFamily="18" charset="0"/>
+                        </a:rPr>
+                        <a:t>.Software </a:t>
+                      </a:r>
+                      <a:r>
+                        <a:rPr lang="en-GB" sz="1400" dirty="0">
+                          <a:effectLst/>
+                          <a:latin typeface="+mn-lt"/>
+                          <a:ea typeface="Calibri" panose="020F0502020204030204" pitchFamily="34" charset="0"/>
+                          <a:cs typeface="Times New Roman" panose="02020603050405020304" pitchFamily="18" charset="0"/>
+                        </a:rPr>
+                        <a:t>Development</a:t>
                       </a:r>
                     </a:p>
                     <a:p>
@@ -6207,8 +6494,51 @@
                           <a:ea typeface="Calibri" panose="020F0502020204030204" pitchFamily="34" charset="0"/>
                           <a:cs typeface="Times New Roman" panose="02020603050405020304" pitchFamily="18" charset="0"/>
                         </a:rPr>
-                        <a:t>         6.1.Website Functionality</a:t>
-                      </a:r>
+                        <a:t>         6.1.Website </a:t>
+                      </a:r>
+                      <a:r>
+                        <a:rPr lang="en-GB" sz="1400" dirty="0" smtClean="0">
+                          <a:effectLst/>
+                          <a:latin typeface="+mn-lt"/>
+                          <a:ea typeface="Calibri" panose="020F0502020204030204" pitchFamily="34" charset="0"/>
+                          <a:cs typeface="Times New Roman" panose="02020603050405020304" pitchFamily="18" charset="0"/>
+                        </a:rPr>
+                        <a:t>Functionality</a:t>
+                      </a:r>
+                    </a:p>
+                    <a:p>
+                      <a:pPr marL="0" marR="0" indent="0" algn="l" defTabSz="914400" rtl="0" eaLnBrk="1" fontAlgn="auto" latinLnBrk="0" hangingPunct="1">
+                        <a:lnSpc>
+                          <a:spcPct val="107000"/>
+                        </a:lnSpc>
+                        <a:spcBef>
+                          <a:spcPts val="0"/>
+                        </a:spcBef>
+                        <a:spcAft>
+                          <a:spcPts val="0"/>
+                        </a:spcAft>
+                        <a:buClrTx/>
+                        <a:buSzTx/>
+                        <a:buFontTx/>
+                        <a:buNone/>
+                        <a:tabLst/>
+                        <a:defRPr/>
+                      </a:pPr>
+                      <a:r>
+                        <a:rPr lang="en-GB" sz="1400" dirty="0" smtClean="0">
+                          <a:effectLst/>
+                          <a:latin typeface="+mn-lt"/>
+                          <a:ea typeface="Calibri" panose="020F0502020204030204" pitchFamily="34" charset="0"/>
+                          <a:cs typeface="Times New Roman" panose="02020603050405020304" pitchFamily="18" charset="0"/>
+                        </a:rPr>
+                        <a:t>         6.2.Trolley/Cart</a:t>
+                      </a:r>
+                      <a:endParaRPr lang="en-GB" sz="1400" dirty="0">
+                        <a:effectLst/>
+                        <a:latin typeface="+mn-lt"/>
+                        <a:ea typeface="Calibri" panose="020F0502020204030204" pitchFamily="34" charset="0"/>
+                        <a:cs typeface="Times New Roman" panose="02020603050405020304" pitchFamily="18" charset="0"/>
+                      </a:endParaRPr>
                     </a:p>
                     <a:p>
                       <a:pPr>
@@ -6226,7 +6556,25 @@
                           <a:ea typeface="Calibri" panose="020F0502020204030204" pitchFamily="34" charset="0"/>
                           <a:cs typeface="Times New Roman" panose="02020603050405020304" pitchFamily="18" charset="0"/>
                         </a:rPr>
-                        <a:t>         6.2.Database Setup</a:t>
+                        <a:t>         </a:t>
+                      </a:r>
+                      <a:r>
+                        <a:rPr lang="en-GB" sz="1400" dirty="0" smtClean="0">
+                          <a:effectLst/>
+                          <a:latin typeface="+mn-lt"/>
+                          <a:ea typeface="Calibri" panose="020F0502020204030204" pitchFamily="34" charset="0"/>
+                          <a:cs typeface="Times New Roman" panose="02020603050405020304" pitchFamily="18" charset="0"/>
+                        </a:rPr>
+                        <a:t>6.3.Database </a:t>
+                      </a:r>
+                      <a:r>
+                        <a:rPr lang="en-GB" sz="1400" dirty="0">
+                          <a:effectLst/>
+                          <a:latin typeface="+mn-lt"/>
+                          <a:ea typeface="Calibri" panose="020F0502020204030204" pitchFamily="34" charset="0"/>
+                          <a:cs typeface="Times New Roman" panose="02020603050405020304" pitchFamily="18" charset="0"/>
+                        </a:rPr>
+                        <a:t>Setup</a:t>
                       </a:r>
                     </a:p>
                     <a:p>
@@ -6245,7 +6593,25 @@
                           <a:ea typeface="Calibri" panose="020F0502020204030204" pitchFamily="34" charset="0"/>
                           <a:cs typeface="Times New Roman" panose="02020603050405020304" pitchFamily="18" charset="0"/>
                         </a:rPr>
-                        <a:t>         6.3.Database Integration</a:t>
+                        <a:t>         </a:t>
+                      </a:r>
+                      <a:r>
+                        <a:rPr lang="en-GB" sz="1400" dirty="0" smtClean="0">
+                          <a:effectLst/>
+                          <a:latin typeface="+mn-lt"/>
+                          <a:ea typeface="Calibri" panose="020F0502020204030204" pitchFamily="34" charset="0"/>
+                          <a:cs typeface="Times New Roman" panose="02020603050405020304" pitchFamily="18" charset="0"/>
+                        </a:rPr>
+                        <a:t>6.4.Database </a:t>
+                      </a:r>
+                      <a:r>
+                        <a:rPr lang="en-GB" sz="1400" dirty="0">
+                          <a:effectLst/>
+                          <a:latin typeface="+mn-lt"/>
+                          <a:ea typeface="Calibri" panose="020F0502020204030204" pitchFamily="34" charset="0"/>
+                          <a:cs typeface="Times New Roman" panose="02020603050405020304" pitchFamily="18" charset="0"/>
+                        </a:rPr>
+                        <a:t>Integration</a:t>
                       </a:r>
                     </a:p>
                     <a:p>
@@ -6264,8 +6630,23 @@
                           <a:ea typeface="Calibri" panose="020F0502020204030204" pitchFamily="34" charset="0"/>
                           <a:cs typeface="Times New Roman" panose="02020603050405020304" pitchFamily="18" charset="0"/>
                         </a:rPr>
-                        <a:t>         6.4.Payments</a:t>
-                      </a:r>
+                        <a:t>         </a:t>
+                      </a:r>
+                      <a:r>
+                        <a:rPr lang="en-GB" sz="1400" dirty="0" smtClean="0">
+                          <a:effectLst/>
+                          <a:latin typeface="+mn-lt"/>
+                          <a:ea typeface="Calibri" panose="020F0502020204030204" pitchFamily="34" charset="0"/>
+                          <a:cs typeface="Times New Roman" panose="02020603050405020304" pitchFamily="18" charset="0"/>
+                        </a:rPr>
+                        <a:t>6.5.Payments</a:t>
+                      </a:r>
+                      <a:endParaRPr lang="en-GB" sz="1400" dirty="0">
+                        <a:effectLst/>
+                        <a:latin typeface="+mn-lt"/>
+                        <a:ea typeface="Calibri" panose="020F0502020204030204" pitchFamily="34" charset="0"/>
+                        <a:cs typeface="Times New Roman" panose="02020603050405020304" pitchFamily="18" charset="0"/>
+                      </a:endParaRPr>
                     </a:p>
                     <a:p>
                       <a:pPr>
@@ -6283,8 +6664,23 @@
                           <a:ea typeface="Calibri" panose="020F0502020204030204" pitchFamily="34" charset="0"/>
                           <a:cs typeface="Times New Roman" panose="02020603050405020304" pitchFamily="18" charset="0"/>
                         </a:rPr>
-                        <a:t>         6.5.Loyalty</a:t>
-                      </a:r>
+                        <a:t>         </a:t>
+                      </a:r>
+                      <a:r>
+                        <a:rPr lang="en-GB" sz="1400" dirty="0" smtClean="0">
+                          <a:effectLst/>
+                          <a:latin typeface="+mn-lt"/>
+                          <a:ea typeface="Calibri" panose="020F0502020204030204" pitchFamily="34" charset="0"/>
+                          <a:cs typeface="Times New Roman" panose="02020603050405020304" pitchFamily="18" charset="0"/>
+                        </a:rPr>
+                        <a:t>6.6.Loyalty</a:t>
+                      </a:r>
+                      <a:endParaRPr lang="en-GB" sz="1400" dirty="0">
+                        <a:effectLst/>
+                        <a:latin typeface="+mn-lt"/>
+                        <a:ea typeface="Calibri" panose="020F0502020204030204" pitchFamily="34" charset="0"/>
+                        <a:cs typeface="Times New Roman" panose="02020603050405020304" pitchFamily="18" charset="0"/>
+                      </a:endParaRPr>
                     </a:p>
                     <a:p>
                       <a:pPr>
@@ -6302,8 +6698,23 @@
                           <a:ea typeface="Calibri" panose="020F0502020204030204" pitchFamily="34" charset="0"/>
                           <a:cs typeface="Times New Roman" panose="02020603050405020304" pitchFamily="18" charset="0"/>
                         </a:rPr>
-                        <a:t>         6.6.Supplies</a:t>
-                      </a:r>
+                        <a:t>         </a:t>
+                      </a:r>
+                      <a:r>
+                        <a:rPr lang="en-GB" sz="1400" dirty="0" smtClean="0">
+                          <a:effectLst/>
+                          <a:latin typeface="+mn-lt"/>
+                          <a:ea typeface="Calibri" panose="020F0502020204030204" pitchFamily="34" charset="0"/>
+                          <a:cs typeface="Times New Roman" panose="02020603050405020304" pitchFamily="18" charset="0"/>
+                        </a:rPr>
+                        <a:t>6.7.Supplies</a:t>
+                      </a:r>
+                      <a:endParaRPr lang="en-GB" sz="1400" dirty="0">
+                        <a:effectLst/>
+                        <a:latin typeface="+mn-lt"/>
+                        <a:ea typeface="Calibri" panose="020F0502020204030204" pitchFamily="34" charset="0"/>
+                        <a:cs typeface="Times New Roman" panose="02020603050405020304" pitchFamily="18" charset="0"/>
+                      </a:endParaRPr>
                     </a:p>
                     <a:p>
                       <a:pPr>
@@ -6321,8 +6732,23 @@
                           <a:ea typeface="Calibri" panose="020F0502020204030204" pitchFamily="34" charset="0"/>
                           <a:cs typeface="Times New Roman" panose="02020603050405020304" pitchFamily="18" charset="0"/>
                         </a:rPr>
-                        <a:t>         6.7.Marketing</a:t>
-                      </a:r>
+                        <a:t>         </a:t>
+                      </a:r>
+                      <a:r>
+                        <a:rPr lang="en-GB" sz="1400" dirty="0" smtClean="0">
+                          <a:effectLst/>
+                          <a:latin typeface="+mn-lt"/>
+                          <a:ea typeface="Calibri" panose="020F0502020204030204" pitchFamily="34" charset="0"/>
+                          <a:cs typeface="Times New Roman" panose="02020603050405020304" pitchFamily="18" charset="0"/>
+                        </a:rPr>
+                        <a:t>6.8.Marketing</a:t>
+                      </a:r>
+                      <a:endParaRPr lang="en-GB" sz="1400" dirty="0">
+                        <a:effectLst/>
+                        <a:latin typeface="+mn-lt"/>
+                        <a:ea typeface="Calibri" panose="020F0502020204030204" pitchFamily="34" charset="0"/>
+                        <a:cs typeface="Times New Roman" panose="02020603050405020304" pitchFamily="18" charset="0"/>
+                      </a:endParaRPr>
                     </a:p>
                     <a:p>
                       <a:pPr>
@@ -6340,7 +6766,25 @@
                           <a:ea typeface="Calibri" panose="020F0502020204030204" pitchFamily="34" charset="0"/>
                           <a:cs typeface="Times New Roman" panose="02020603050405020304" pitchFamily="18" charset="0"/>
                         </a:rPr>
-                        <a:t>         6.8.Update website if required</a:t>
+                        <a:t>         </a:t>
+                      </a:r>
+                      <a:r>
+                        <a:rPr lang="en-GB" sz="1400" dirty="0" smtClean="0">
+                          <a:effectLst/>
+                          <a:latin typeface="+mn-lt"/>
+                          <a:ea typeface="Calibri" panose="020F0502020204030204" pitchFamily="34" charset="0"/>
+                          <a:cs typeface="Times New Roman" panose="02020603050405020304" pitchFamily="18" charset="0"/>
+                        </a:rPr>
+                        <a:t>6.9.Update </a:t>
+                      </a:r>
+                      <a:r>
+                        <a:rPr lang="en-GB" sz="1400" dirty="0">
+                          <a:effectLst/>
+                          <a:latin typeface="+mn-lt"/>
+                          <a:ea typeface="Calibri" panose="020F0502020204030204" pitchFamily="34" charset="0"/>
+                          <a:cs typeface="Times New Roman" panose="02020603050405020304" pitchFamily="18" charset="0"/>
+                        </a:rPr>
+                        <a:t>website if required</a:t>
                       </a:r>
                     </a:p>
                     <a:p>
@@ -6359,7 +6803,25 @@
                           <a:ea typeface="Calibri" panose="020F0502020204030204" pitchFamily="34" charset="0"/>
                           <a:cs typeface="Times New Roman" panose="02020603050405020304" pitchFamily="18" charset="0"/>
                         </a:rPr>
-                        <a:t>         6.9.Update database if required</a:t>
+                        <a:t>         </a:t>
+                      </a:r>
+                      <a:r>
+                        <a:rPr lang="en-GB" sz="1400" dirty="0" smtClean="0">
+                          <a:effectLst/>
+                          <a:latin typeface="+mn-lt"/>
+                          <a:ea typeface="Calibri" panose="020F0502020204030204" pitchFamily="34" charset="0"/>
+                          <a:cs typeface="Times New Roman" panose="02020603050405020304" pitchFamily="18" charset="0"/>
+                        </a:rPr>
+                        <a:t>6.10.Update </a:t>
+                      </a:r>
+                      <a:r>
+                        <a:rPr lang="en-GB" sz="1400" dirty="0">
+                          <a:effectLst/>
+                          <a:latin typeface="+mn-lt"/>
+                          <a:ea typeface="Calibri" panose="020F0502020204030204" pitchFamily="34" charset="0"/>
+                          <a:cs typeface="Times New Roman" panose="02020603050405020304" pitchFamily="18" charset="0"/>
+                        </a:rPr>
+                        <a:t>database if required</a:t>
                       </a:r>
                     </a:p>
                     <a:p>
@@ -6372,32 +6834,22 @@
                         </a:spcAft>
                       </a:pPr>
                       <a:r>
+                        <a:rPr lang="en-GB" sz="1400" dirty="0" smtClean="0">
+                          <a:effectLst/>
+                          <a:latin typeface="+mn-lt"/>
+                          <a:ea typeface="Calibri" panose="020F0502020204030204" pitchFamily="34" charset="0"/>
+                          <a:cs typeface="Times New Roman" panose="02020603050405020304" pitchFamily="18" charset="0"/>
+                        </a:rPr>
+                        <a:t>         6.11.Deal </a:t>
+                      </a:r>
+                      <a:r>
                         <a:rPr lang="en-GB" sz="1400" dirty="0">
                           <a:effectLst/>
                           <a:latin typeface="+mn-lt"/>
                           <a:ea typeface="Calibri" panose="020F0502020204030204" pitchFamily="34" charset="0"/>
                           <a:cs typeface="Times New Roman" panose="02020603050405020304" pitchFamily="18" charset="0"/>
                         </a:rPr>
-                        <a:t>         6.10.Trolley/Cart</a:t>
-                      </a:r>
-                    </a:p>
-                    <a:p>
-                      <a:pPr>
-                        <a:lnSpc>
-                          <a:spcPct val="107000"/>
-                        </a:lnSpc>
-                        <a:spcAft>
-                          <a:spcPts val="0"/>
-                        </a:spcAft>
-                      </a:pPr>
-                      <a:r>
-                        <a:rPr lang="en-GB" sz="1400" dirty="0">
-                          <a:effectLst/>
-                          <a:latin typeface="+mn-lt"/>
-                          <a:ea typeface="Calibri" panose="020F0502020204030204" pitchFamily="34" charset="0"/>
-                          <a:cs typeface="Times New Roman" panose="02020603050405020304" pitchFamily="18" charset="0"/>
-                        </a:rPr>
-                        <a:t>         6.11.Deal System   </a:t>
+                        <a:t>System   </a:t>
                       </a:r>
                     </a:p>
                   </a:txBody>
@@ -6455,52 +6907,85 @@
                           <a:spcPts val="0"/>
                         </a:spcAft>
                       </a:pPr>
-                      <a:r>
-                        <a:rPr lang="en-GB" sz="1400" dirty="0">
-                          <a:effectLst/>
-                          <a:latin typeface="+mn-lt"/>
-                          <a:ea typeface="Calibri" panose="020F0502020204030204" pitchFamily="34" charset="0"/>
-                          <a:cs typeface="Times New Roman" panose="02020603050405020304" pitchFamily="18" charset="0"/>
-                        </a:rPr>
-                        <a:t>7.Testing</a:t>
-                      </a:r>
+                      <a:endParaRPr lang="en-GB" sz="1400" dirty="0">
+                        <a:effectLst/>
+                        <a:latin typeface="+mn-lt"/>
+                        <a:ea typeface="Calibri" panose="020F0502020204030204" pitchFamily="34" charset="0"/>
+                        <a:cs typeface="Times New Roman" panose="02020603050405020304" pitchFamily="18" charset="0"/>
+                      </a:endParaRPr>
                     </a:p>
+                  </a:txBody>
+                  <a:tcPr marL="68580" marR="68580" marT="0" marB="0">
+                    <a:lnL w="12700" cap="flat" cmpd="sng" algn="ctr">
+                      <a:noFill/>
+                      <a:prstDash val="solid"/>
+                      <a:round/>
+                      <a:headEnd type="none" w="med" len="med"/>
+                      <a:tailEnd type="none" w="med" len="med"/>
+                    </a:lnL>
+                    <a:lnR w="12700" cap="flat" cmpd="sng" algn="ctr">
+                      <a:noFill/>
+                      <a:prstDash val="solid"/>
+                      <a:round/>
+                      <a:headEnd type="none" w="med" len="med"/>
+                      <a:tailEnd type="none" w="med" len="med"/>
+                    </a:lnR>
+                    <a:lnT w="12700" cap="flat" cmpd="sng" algn="ctr">
+                      <a:noFill/>
+                      <a:prstDash val="solid"/>
+                      <a:round/>
+                      <a:headEnd type="none" w="med" len="med"/>
+                      <a:tailEnd type="none" w="med" len="med"/>
+                    </a:lnT>
+                    <a:lnB w="12700" cap="flat" cmpd="sng" algn="ctr">
+                      <a:noFill/>
+                      <a:prstDash val="solid"/>
+                      <a:round/>
+                      <a:headEnd type="none" w="med" len="med"/>
+                      <a:tailEnd type="none" w="med" len="med"/>
+                    </a:lnB>
+                    <a:lnTlToBr w="12700" cmpd="sng">
+                      <a:noFill/>
+                      <a:prstDash val="solid"/>
+                    </a:lnTlToBr>
+                    <a:lnBlToTr w="12700" cmpd="sng">
+                      <a:noFill/>
+                      <a:prstDash val="solid"/>
+                    </a:lnBlToTr>
+                  </a:tcPr>
+                </a:tc>
+              </a:tr>
+              <a:tr h="0">
+                <a:tc>
+                  <a:txBody>
+                    <a:bodyPr/>
+                    <a:lstStyle/>
                     <a:p>
-                      <a:pPr>
+                      <a:pPr marL="0" marR="0" indent="0" algn="l" defTabSz="914400" rtl="0" eaLnBrk="1" fontAlgn="auto" latinLnBrk="0" hangingPunct="1">
                         <a:lnSpc>
                           <a:spcPct val="107000"/>
                         </a:lnSpc>
+                        <a:spcBef>
+                          <a:spcPts val="0"/>
+                        </a:spcBef>
                         <a:spcAft>
                           <a:spcPts val="0"/>
                         </a:spcAft>
+                        <a:buClrTx/>
+                        <a:buSzTx/>
+                        <a:buFontTx/>
+                        <a:buNone/>
+                        <a:tabLst/>
+                        <a:defRPr/>
                       </a:pPr>
                       <a:r>
-                        <a:rPr lang="en-GB" sz="1400" dirty="0">
-                          <a:effectLst/>
-                          <a:latin typeface="+mn-lt"/>
-                          <a:ea typeface="Calibri" panose="020F0502020204030204" pitchFamily="34" charset="0"/>
-                          <a:cs typeface="Times New Roman" panose="02020603050405020304" pitchFamily="18" charset="0"/>
-                        </a:rPr>
-                        <a:t>        7.1.Testing Database</a:t>
-                      </a:r>
-                    </a:p>
-                    <a:p>
-                      <a:pPr>
-                        <a:lnSpc>
-                          <a:spcPct val="107000"/>
-                        </a:lnSpc>
-                        <a:spcAft>
-                          <a:spcPts val="0"/>
-                        </a:spcAft>
-                      </a:pPr>
-                      <a:r>
-                        <a:rPr lang="en-GB" sz="1400" dirty="0">
-                          <a:effectLst/>
-                          <a:latin typeface="+mn-lt"/>
-                          <a:ea typeface="Calibri" panose="020F0502020204030204" pitchFamily="34" charset="0"/>
-                          <a:cs typeface="Times New Roman" panose="02020603050405020304" pitchFamily="18" charset="0"/>
-                        </a:rPr>
-                        <a:t>        7.2.Testing Website</a:t>
+                        <a:rPr lang="en-GB" sz="1400" dirty="0" smtClean="0">
+                          <a:effectLst/>
+                          <a:latin typeface="+mn-lt"/>
+                          <a:ea typeface="Calibri" panose="020F0502020204030204" pitchFamily="34" charset="0"/>
+                          <a:cs typeface="Times New Roman" panose="02020603050405020304" pitchFamily="18" charset="0"/>
+                        </a:rPr>
+                        <a:t>6.Quality Assurance</a:t>
                       </a:r>
                     </a:p>
                   </a:txBody>
@@ -6601,26 +7086,283 @@
           </a:p>
         </p:txBody>
       </p:sp>
-      <p:sp>
-        <p:nvSpPr>
-          <p:cNvPr id="3" name="Content Placeholder 2"/>
-          <p:cNvSpPr>
-            <a:spLocks noGrp="1"/>
-          </p:cNvSpPr>
+      <p:pic>
+        <p:nvPicPr>
+          <p:cNvPr id="4" name="Content Placeholder 3"/>
+          <p:cNvPicPr>
+            <a:picLocks noGrp="1" noChangeAspect="1"/>
+          </p:cNvPicPr>
           <p:nvPr>
             <p:ph idx="1"/>
           </p:nvPr>
-        </p:nvSpPr>
-        <p:spPr/>
-        <p:txBody>
-          <a:bodyPr/>
-          <a:lstStyle/>
+        </p:nvPicPr>
+        <p:blipFill>
+          <a:blip r:embed="rId2"/>
+          <a:stretch>
+            <a:fillRect/>
+          </a:stretch>
+        </p:blipFill>
+        <p:spPr>
+          <a:xfrm>
+            <a:off x="431509" y="2084832"/>
+            <a:ext cx="11171278" cy="2590199"/>
+          </a:xfrm>
+          <a:prstGeom prst="rect">
+            <a:avLst/>
+          </a:prstGeom>
+        </p:spPr>
+      </p:pic>
+      <p:sp>
+        <p:nvSpPr>
+          <p:cNvPr id="6" name="Content Placeholder 2"/>
+          <p:cNvSpPr txBox="1">
+            <a:spLocks/>
+          </p:cNvSpPr>
+          <p:nvPr/>
+        </p:nvSpPr>
+        <p:spPr>
+          <a:xfrm>
+            <a:off x="1024127" y="4700789"/>
+            <a:ext cx="9720073" cy="1634329"/>
+          </a:xfrm>
+          <a:prstGeom prst="rect">
+            <a:avLst/>
+          </a:prstGeom>
+        </p:spPr>
+        <p:txBody>
+          <a:bodyPr vert="horz" lIns="45720" tIns="45720" rIns="45720" bIns="45720" rtlCol="0">
+            <a:normAutofit/>
+          </a:bodyPr>
+          <a:lstStyle>
+            <a:lvl1pPr marL="91440" indent="-91440" algn="l" defTabSz="914400" rtl="0" eaLnBrk="1" latinLnBrk="0" hangingPunct="1">
+              <a:lnSpc>
+                <a:spcPct val="90000"/>
+              </a:lnSpc>
+              <a:spcBef>
+                <a:spcPts val="1200"/>
+              </a:spcBef>
+              <a:spcAft>
+                <a:spcPts val="200"/>
+              </a:spcAft>
+              <a:buClr>
+                <a:schemeClr val="accent2"/>
+              </a:buClr>
+              <a:buSzPct val="100000"/>
+              <a:buFont typeface="Tw Cen MT" panose="020B0602020104020603" pitchFamily="34" charset="0"/>
+              <a:buChar char=" "/>
+              <a:defRPr sz="2200" kern="1200">
+                <a:solidFill>
+                  <a:schemeClr val="tx1"/>
+                </a:solidFill>
+                <a:latin typeface="+mn-lt"/>
+                <a:ea typeface="+mn-ea"/>
+                <a:cs typeface="+mn-cs"/>
+              </a:defRPr>
+            </a:lvl1pPr>
+            <a:lvl2pPr marL="265176" indent="-137160" algn="l" defTabSz="914400" rtl="0" eaLnBrk="1" latinLnBrk="0" hangingPunct="1">
+              <a:lnSpc>
+                <a:spcPct val="90000"/>
+              </a:lnSpc>
+              <a:spcBef>
+                <a:spcPts val="200"/>
+              </a:spcBef>
+              <a:spcAft>
+                <a:spcPts val="400"/>
+              </a:spcAft>
+              <a:buClr>
+                <a:schemeClr val="accent2"/>
+              </a:buClr>
+              <a:buFont typeface="Wingdings 3" pitchFamily="18" charset="2"/>
+              <a:buChar char=""/>
+              <a:defRPr sz="1800" kern="1200">
+                <a:solidFill>
+                  <a:schemeClr val="tx1"/>
+                </a:solidFill>
+                <a:latin typeface="+mn-lt"/>
+                <a:ea typeface="+mn-ea"/>
+                <a:cs typeface="+mn-cs"/>
+              </a:defRPr>
+            </a:lvl2pPr>
+            <a:lvl3pPr marL="448056" indent="-137160" algn="l" defTabSz="914400" rtl="0" eaLnBrk="1" latinLnBrk="0" hangingPunct="1">
+              <a:lnSpc>
+                <a:spcPct val="90000"/>
+              </a:lnSpc>
+              <a:spcBef>
+                <a:spcPts val="200"/>
+              </a:spcBef>
+              <a:spcAft>
+                <a:spcPts val="400"/>
+              </a:spcAft>
+              <a:buClr>
+                <a:schemeClr val="accent2"/>
+              </a:buClr>
+              <a:buFont typeface="Wingdings 3" pitchFamily="18" charset="2"/>
+              <a:buChar char=""/>
+              <a:defRPr sz="1400" kern="1200">
+                <a:solidFill>
+                  <a:schemeClr val="tx1"/>
+                </a:solidFill>
+                <a:latin typeface="+mn-lt"/>
+                <a:ea typeface="+mn-ea"/>
+                <a:cs typeface="+mn-cs"/>
+              </a:defRPr>
+            </a:lvl3pPr>
+            <a:lvl4pPr marL="594360" indent="-137160" algn="l" defTabSz="914400" rtl="0" eaLnBrk="1" latinLnBrk="0" hangingPunct="1">
+              <a:lnSpc>
+                <a:spcPct val="90000"/>
+              </a:lnSpc>
+              <a:spcBef>
+                <a:spcPts val="200"/>
+              </a:spcBef>
+              <a:spcAft>
+                <a:spcPts val="400"/>
+              </a:spcAft>
+              <a:buClr>
+                <a:schemeClr val="accent2"/>
+              </a:buClr>
+              <a:buFont typeface="Wingdings 3" pitchFamily="18" charset="2"/>
+              <a:buChar char=""/>
+              <a:defRPr sz="1400" kern="1200">
+                <a:solidFill>
+                  <a:schemeClr val="tx1"/>
+                </a:solidFill>
+                <a:latin typeface="+mn-lt"/>
+                <a:ea typeface="+mn-ea"/>
+                <a:cs typeface="+mn-cs"/>
+              </a:defRPr>
+            </a:lvl4pPr>
+            <a:lvl5pPr marL="777240" indent="-137160" algn="l" defTabSz="914400" rtl="0" eaLnBrk="1" latinLnBrk="0" hangingPunct="1">
+              <a:lnSpc>
+                <a:spcPct val="90000"/>
+              </a:lnSpc>
+              <a:spcBef>
+                <a:spcPts val="200"/>
+              </a:spcBef>
+              <a:spcAft>
+                <a:spcPts val="400"/>
+              </a:spcAft>
+              <a:buClr>
+                <a:schemeClr val="accent2"/>
+              </a:buClr>
+              <a:buFont typeface="Wingdings 3" pitchFamily="18" charset="2"/>
+              <a:buChar char=""/>
+              <a:defRPr sz="1400" kern="1200">
+                <a:solidFill>
+                  <a:schemeClr val="tx1"/>
+                </a:solidFill>
+                <a:latin typeface="+mn-lt"/>
+                <a:ea typeface="+mn-ea"/>
+                <a:cs typeface="+mn-cs"/>
+              </a:defRPr>
+            </a:lvl5pPr>
+            <a:lvl6pPr marL="914400" indent="-137160" algn="l" defTabSz="914400" rtl="0" eaLnBrk="1" latinLnBrk="0" hangingPunct="1">
+              <a:lnSpc>
+                <a:spcPct val="90000"/>
+              </a:lnSpc>
+              <a:spcBef>
+                <a:spcPts val="200"/>
+              </a:spcBef>
+              <a:spcAft>
+                <a:spcPts val="400"/>
+              </a:spcAft>
+              <a:buClr>
+                <a:schemeClr val="accent2"/>
+              </a:buClr>
+              <a:buFont typeface="Wingdings 3" pitchFamily="18" charset="2"/>
+              <a:buChar char=""/>
+              <a:defRPr sz="1400" kern="1200">
+                <a:solidFill>
+                  <a:schemeClr val="tx1"/>
+                </a:solidFill>
+                <a:latin typeface="+mn-lt"/>
+                <a:ea typeface="+mn-ea"/>
+                <a:cs typeface="+mn-cs"/>
+              </a:defRPr>
+            </a:lvl6pPr>
+            <a:lvl7pPr marL="1060704" indent="-137160" algn="l" defTabSz="914400" rtl="0" eaLnBrk="1" latinLnBrk="0" hangingPunct="1">
+              <a:lnSpc>
+                <a:spcPct val="90000"/>
+              </a:lnSpc>
+              <a:spcBef>
+                <a:spcPts val="200"/>
+              </a:spcBef>
+              <a:spcAft>
+                <a:spcPts val="400"/>
+              </a:spcAft>
+              <a:buClr>
+                <a:schemeClr val="accent2"/>
+              </a:buClr>
+              <a:buFont typeface="Wingdings 3" pitchFamily="18" charset="2"/>
+              <a:buChar char=""/>
+              <a:defRPr sz="1400" kern="1200">
+                <a:solidFill>
+                  <a:schemeClr val="tx1"/>
+                </a:solidFill>
+                <a:latin typeface="+mn-lt"/>
+                <a:ea typeface="+mn-ea"/>
+                <a:cs typeface="+mn-cs"/>
+              </a:defRPr>
+            </a:lvl7pPr>
+            <a:lvl8pPr marL="1216152" indent="-137160" algn="l" defTabSz="914400" rtl="0" eaLnBrk="1" latinLnBrk="0" hangingPunct="1">
+              <a:lnSpc>
+                <a:spcPct val="90000"/>
+              </a:lnSpc>
+              <a:spcBef>
+                <a:spcPts val="200"/>
+              </a:spcBef>
+              <a:spcAft>
+                <a:spcPts val="400"/>
+              </a:spcAft>
+              <a:buClr>
+                <a:schemeClr val="accent2"/>
+              </a:buClr>
+              <a:buFont typeface="Wingdings 3" pitchFamily="18" charset="2"/>
+              <a:buChar char=""/>
+              <a:defRPr sz="1400" kern="1200">
+                <a:solidFill>
+                  <a:schemeClr val="tx1"/>
+                </a:solidFill>
+                <a:latin typeface="+mn-lt"/>
+                <a:ea typeface="+mn-ea"/>
+                <a:cs typeface="+mn-cs"/>
+              </a:defRPr>
+            </a:lvl8pPr>
+            <a:lvl9pPr marL="1362456" indent="-137160" algn="l" defTabSz="914400" rtl="0" eaLnBrk="1" latinLnBrk="0" hangingPunct="1">
+              <a:lnSpc>
+                <a:spcPct val="90000"/>
+              </a:lnSpc>
+              <a:spcBef>
+                <a:spcPts val="200"/>
+              </a:spcBef>
+              <a:spcAft>
+                <a:spcPts val="400"/>
+              </a:spcAft>
+              <a:buClr>
+                <a:schemeClr val="accent2"/>
+              </a:buClr>
+              <a:buFont typeface="Wingdings 3" pitchFamily="18" charset="2"/>
+              <a:buChar char=""/>
+              <a:defRPr sz="1400" kern="1200">
+                <a:solidFill>
+                  <a:schemeClr val="tx1"/>
+                </a:solidFill>
+                <a:latin typeface="+mn-lt"/>
+                <a:ea typeface="+mn-ea"/>
+                <a:cs typeface="+mn-cs"/>
+              </a:defRPr>
+            </a:lvl9pPr>
+          </a:lstStyle>
           <a:p>
             <a:r>
               <a:rPr lang="en-GB" dirty="0" smtClean="0"/>
-              <a:t>PUT HERE</a:t>
-            </a:r>
-            <a:endParaRPr lang="en-GB" dirty="0"/>
+              <a:t>Progress is marked by the black bar</a:t>
+            </a:r>
+          </a:p>
+          <a:p>
+            <a:r>
+              <a:rPr lang="en-GB" dirty="0" smtClean="0"/>
+              <a:t>Red line indicates “Today”. (Date taken: 28/02/2016)</a:t>
+            </a:r>
           </a:p>
         </p:txBody>
       </p:sp>
@@ -6634,6 +7376,13 @@
   <p:clrMapOvr>
     <a:masterClrMapping/>
   </p:clrMapOvr>
+  <p:timing>
+    <p:tnLst>
+      <p:par>
+        <p:cTn id="1" dur="indefinite" restart="never" nodeType="tmRoot"/>
+      </p:par>
+    </p:tnLst>
+  </p:timing>
 </p:sld>
 </file>
 
@@ -6708,28 +7457,34 @@
             <a:pPr lvl="1"/>
             <a:r>
               <a:rPr lang="en-GB" dirty="0" smtClean="0"/>
-              <a:t>A webpage has been </a:t>
-            </a:r>
+              <a:t>A webpage has been created</a:t>
+            </a:r>
+          </a:p>
+          <a:p>
+            <a:pPr lvl="1"/>
             <a:r>
               <a:rPr lang="en-GB" dirty="0" smtClean="0"/>
-              <a:t>created</a:t>
+              <a:t>Home page occupied using </a:t>
+            </a:r>
+            <a:r>
+              <a:rPr lang="en-GB" dirty="0" smtClean="0"/>
+              <a:t>PHP</a:t>
+            </a:r>
+          </a:p>
+          <a:p>
+            <a:pPr lvl="1"/>
+            <a:r>
+              <a:rPr lang="en-GB" dirty="0" smtClean="0"/>
+              <a:t>Researched on trolley implementation</a:t>
+            </a:r>
+          </a:p>
+          <a:p>
+            <a:pPr lvl="1"/>
+            <a:r>
+              <a:rPr lang="en-GB" dirty="0" smtClean="0"/>
+              <a:t>Basic code for deals</a:t>
             </a:r>
             <a:endParaRPr lang="en-GB" dirty="0" smtClean="0"/>
-          </a:p>
-          <a:p>
-            <a:pPr lvl="1"/>
-            <a:r>
-              <a:rPr lang="en-GB" dirty="0" smtClean="0"/>
-              <a:t>Home page occupied using PHP</a:t>
-            </a:r>
-          </a:p>
-          <a:p>
-            <a:pPr lvl="1"/>
-            <a:r>
-              <a:rPr lang="en-GB" dirty="0" smtClean="0"/>
-              <a:t>A simple trolley</a:t>
-            </a:r>
-            <a:endParaRPr lang="en-GB" dirty="0"/>
           </a:p>
         </p:txBody>
       </p:sp>
@@ -6743,6 +7498,13 @@
   <p:clrMapOvr>
     <a:masterClrMapping/>
   </p:clrMapOvr>
+  <p:timing>
+    <p:tnLst>
+      <p:par>
+        <p:cTn id="1" dur="indefinite" restart="never" nodeType="tmRoot"/>
+      </p:par>
+    </p:tnLst>
+  </p:timing>
 </p:sld>
 </file>
 
@@ -6819,6 +7581,13 @@
   <p:clrMapOvr>
     <a:masterClrMapping/>
   </p:clrMapOvr>
+  <p:timing>
+    <p:tnLst>
+      <p:par>
+        <p:cTn id="1" dur="indefinite" restart="never" nodeType="tmRoot"/>
+      </p:par>
+    </p:tnLst>
+  </p:timing>
 </p:sld>
 </file>
 

</xml_diff>

<commit_message>
Hamza: Added more content to the slides
</commit_message>
<xml_diff>
--- a/Group_Docs/Team_Presentation_Group2.pptx
+++ b/Group_Docs/Team_Presentation_Group2.pptx
@@ -3648,15 +3648,24 @@
             <a:pPr lvl="1"/>
             <a:r>
               <a:rPr lang="en-GB" dirty="0" smtClean="0"/>
-              <a:t>Populated areas of website with database data</a:t>
+              <a:t>Populated </a:t>
+            </a:r>
+            <a:r>
+              <a:rPr lang="en-GB" dirty="0" smtClean="0"/>
+              <a:t>area </a:t>
+            </a:r>
+            <a:r>
+              <a:rPr lang="en-GB" dirty="0" smtClean="0"/>
+              <a:t>of website with database data</a:t>
             </a:r>
           </a:p>
           <a:p>
             <a:pPr lvl="1"/>
             <a:r>
               <a:rPr lang="en-GB" dirty="0" smtClean="0"/>
-              <a:t>Helped implement trolley</a:t>
-            </a:r>
+              <a:t>Investigated how to implement a trolley</a:t>
+            </a:r>
+            <a:endParaRPr lang="en-GB" dirty="0" smtClean="0"/>
           </a:p>
           <a:p>
             <a:r>
@@ -3675,8 +3684,23 @@
             <a:pPr lvl="1"/>
             <a:r>
               <a:rPr lang="en-GB" dirty="0" smtClean="0"/>
-              <a:t>Helped implement trolley</a:t>
-            </a:r>
+              <a:t>Investigated how to implement a trolley</a:t>
+            </a:r>
+          </a:p>
+          <a:p>
+            <a:pPr lvl="1"/>
+            <a:r>
+              <a:rPr lang="en-GB" dirty="0" smtClean="0"/>
+              <a:t>Investigated how to deals for products</a:t>
+            </a:r>
+          </a:p>
+          <a:p>
+            <a:pPr lvl="1"/>
+            <a:endParaRPr lang="en-GB" dirty="0" smtClean="0"/>
+          </a:p>
+          <a:p>
+            <a:pPr lvl="1"/>
+            <a:endParaRPr lang="en-GB" dirty="0" smtClean="0"/>
           </a:p>
         </p:txBody>
       </p:sp>
@@ -3762,15 +3786,20 @@
             <a:pPr lvl="1"/>
             <a:r>
               <a:rPr lang="en-GB" dirty="0" smtClean="0"/>
-              <a:t>Helped name website</a:t>
+              <a:t>Helped implement </a:t>
+            </a:r>
+            <a:r>
+              <a:rPr lang="en-GB" dirty="0" smtClean="0"/>
+              <a:t>CSS</a:t>
             </a:r>
           </a:p>
           <a:p>
             <a:pPr lvl="1"/>
             <a:r>
               <a:rPr lang="en-GB" dirty="0" smtClean="0"/>
-              <a:t>Helped implement CSS</a:t>
-            </a:r>
+              <a:t>Researched how to implement deals for products</a:t>
+            </a:r>
+            <a:endParaRPr lang="en-GB" dirty="0" smtClean="0"/>
           </a:p>
           <a:p>
             <a:r>
@@ -3783,8 +3812,20 @@
             <a:pPr lvl="1"/>
             <a:r>
               <a:rPr lang="en-GB" dirty="0" smtClean="0"/>
-              <a:t>Helped implement CSS</a:t>
-            </a:r>
+              <a:t>Helped implement </a:t>
+            </a:r>
+            <a:r>
+              <a:rPr lang="en-GB" dirty="0" smtClean="0"/>
+              <a:t>CSS</a:t>
+            </a:r>
+          </a:p>
+          <a:p>
+            <a:pPr lvl="1"/>
+            <a:r>
+              <a:rPr lang="en-GB" dirty="0" smtClean="0"/>
+              <a:t>Researched implementation for a trolley</a:t>
+            </a:r>
+            <a:endParaRPr lang="en-GB" dirty="0" smtClean="0"/>
           </a:p>
         </p:txBody>
       </p:sp>
@@ -7464,18 +7505,18 @@
             <a:pPr lvl="1"/>
             <a:r>
               <a:rPr lang="en-GB" dirty="0" smtClean="0"/>
-              <a:t>Home page occupied using </a:t>
-            </a:r>
+              <a:t>Home page occupied using PHP</a:t>
+            </a:r>
+          </a:p>
+          <a:p>
+            <a:pPr lvl="1"/>
             <a:r>
               <a:rPr lang="en-GB" dirty="0" smtClean="0"/>
-              <a:t>PHP</a:t>
-            </a:r>
-          </a:p>
-          <a:p>
-            <a:pPr lvl="1"/>
+              <a:t>Researched trolley </a:t>
+            </a:r>
             <a:r>
               <a:rPr lang="en-GB" dirty="0" smtClean="0"/>
-              <a:t>Researched on trolley implementation</a:t>
+              <a:t>implementation</a:t>
             </a:r>
           </a:p>
           <a:p>
@@ -7484,7 +7525,6 @@
               <a:rPr lang="en-GB" dirty="0" smtClean="0"/>
               <a:t>Basic code for deals</a:t>
             </a:r>
-            <a:endParaRPr lang="en-GB" dirty="0" smtClean="0"/>
           </a:p>
         </p:txBody>
       </p:sp>

</xml_diff>

<commit_message>
Hamza: Added network diagram.
</commit_message>
<xml_diff>
--- a/Group_Docs/Team_Presentation_Group2.pptx
+++ b/Group_Docs/Team_Presentation_Group2.pptx
@@ -4,6 +4,9 @@
   <p:sldMasterIdLst>
     <p:sldMasterId id="2147483809" r:id="rId1"/>
   </p:sldMasterIdLst>
+  <p:notesMasterIdLst>
+    <p:notesMasterId r:id="rId15"/>
+  </p:notesMasterIdLst>
   <p:sldIdLst>
     <p:sldId id="256" r:id="rId2"/>
     <p:sldId id="257" r:id="rId3"/>
@@ -12,11 +15,12 @@
     <p:sldId id="261" r:id="rId6"/>
     <p:sldId id="262" r:id="rId7"/>
     <p:sldId id="263" r:id="rId8"/>
-    <p:sldId id="264" r:id="rId9"/>
-    <p:sldId id="265" r:id="rId10"/>
-    <p:sldId id="266" r:id="rId11"/>
-    <p:sldId id="267" r:id="rId12"/>
-    <p:sldId id="268" r:id="rId13"/>
+    <p:sldId id="269" r:id="rId9"/>
+    <p:sldId id="264" r:id="rId10"/>
+    <p:sldId id="265" r:id="rId11"/>
+    <p:sldId id="266" r:id="rId12"/>
+    <p:sldId id="267" r:id="rId13"/>
+    <p:sldId id="268" r:id="rId14"/>
   </p:sldIdLst>
   <p:sldSz cx="12192000" cy="6858000"/>
   <p:notesSz cx="6858000" cy="9144000"/>
@@ -123,6 +127,440 @@
 </p:presentation>
 </file>
 
+<file path=ppt/notesMasters/notesMaster1.xml><?xml version="1.0" encoding="utf-8"?>
+<p:notesMaster xmlns:a="http://schemas.openxmlformats.org/drawingml/2006/main" xmlns:r="http://schemas.openxmlformats.org/officeDocument/2006/relationships" xmlns:p="http://schemas.openxmlformats.org/presentationml/2006/main">
+  <p:cSld>
+    <p:bg>
+      <p:bgRef idx="1001">
+        <a:schemeClr val="bg1"/>
+      </p:bgRef>
+    </p:bg>
+    <p:spTree>
+      <p:nvGrpSpPr>
+        <p:cNvPr id="1" name=""/>
+        <p:cNvGrpSpPr/>
+        <p:nvPr/>
+      </p:nvGrpSpPr>
+      <p:grpSpPr>
+        <a:xfrm>
+          <a:off x="0" y="0"/>
+          <a:ext cx="0" cy="0"/>
+          <a:chOff x="0" y="0"/>
+          <a:chExt cx="0" cy="0"/>
+        </a:xfrm>
+      </p:grpSpPr>
+      <p:sp>
+        <p:nvSpPr>
+          <p:cNvPr id="2" name="Header Placeholder 1"/>
+          <p:cNvSpPr>
+            <a:spLocks noGrp="1"/>
+          </p:cNvSpPr>
+          <p:nvPr>
+            <p:ph type="hdr" sz="quarter"/>
+          </p:nvPr>
+        </p:nvSpPr>
+        <p:spPr>
+          <a:xfrm>
+            <a:off x="0" y="0"/>
+            <a:ext cx="2971800" cy="458788"/>
+          </a:xfrm>
+          <a:prstGeom prst="rect">
+            <a:avLst/>
+          </a:prstGeom>
+        </p:spPr>
+        <p:txBody>
+          <a:bodyPr vert="horz" lIns="91440" tIns="45720" rIns="91440" bIns="45720" rtlCol="0"/>
+          <a:lstStyle>
+            <a:lvl1pPr algn="l">
+              <a:defRPr sz="1200"/>
+            </a:lvl1pPr>
+          </a:lstStyle>
+          <a:p>
+            <a:endParaRPr lang="en-GB"/>
+          </a:p>
+        </p:txBody>
+      </p:sp>
+      <p:sp>
+        <p:nvSpPr>
+          <p:cNvPr id="3" name="Date Placeholder 2"/>
+          <p:cNvSpPr>
+            <a:spLocks noGrp="1"/>
+          </p:cNvSpPr>
+          <p:nvPr>
+            <p:ph type="dt" idx="1"/>
+          </p:nvPr>
+        </p:nvSpPr>
+        <p:spPr>
+          <a:xfrm>
+            <a:off x="3884613" y="0"/>
+            <a:ext cx="2971800" cy="458788"/>
+          </a:xfrm>
+          <a:prstGeom prst="rect">
+            <a:avLst/>
+          </a:prstGeom>
+        </p:spPr>
+        <p:txBody>
+          <a:bodyPr vert="horz" lIns="91440" tIns="45720" rIns="91440" bIns="45720" rtlCol="0"/>
+          <a:lstStyle>
+            <a:lvl1pPr algn="r">
+              <a:defRPr sz="1200"/>
+            </a:lvl1pPr>
+          </a:lstStyle>
+          <a:p>
+            <a:fld id="{578A592F-C6D9-4AE2-BF75-F47B59262895}" type="datetimeFigureOut">
+              <a:rPr lang="en-GB" smtClean="0"/>
+              <a:t>20/03/2016</a:t>
+            </a:fld>
+            <a:endParaRPr lang="en-GB"/>
+          </a:p>
+        </p:txBody>
+      </p:sp>
+      <p:sp>
+        <p:nvSpPr>
+          <p:cNvPr id="4" name="Slide Image Placeholder 3"/>
+          <p:cNvSpPr>
+            <a:spLocks noGrp="1" noRot="1" noChangeAspect="1"/>
+          </p:cNvSpPr>
+          <p:nvPr>
+            <p:ph type="sldImg" idx="2"/>
+          </p:nvPr>
+        </p:nvSpPr>
+        <p:spPr>
+          <a:xfrm>
+            <a:off x="685800" y="1143000"/>
+            <a:ext cx="5486400" cy="3086100"/>
+          </a:xfrm>
+          <a:prstGeom prst="rect">
+            <a:avLst/>
+          </a:prstGeom>
+          <a:noFill/>
+          <a:ln w="12700">
+            <a:solidFill>
+              <a:prstClr val="black"/>
+            </a:solidFill>
+          </a:ln>
+        </p:spPr>
+        <p:txBody>
+          <a:bodyPr vert="horz" lIns="91440" tIns="45720" rIns="91440" bIns="45720" rtlCol="0" anchor="ctr"/>
+          <a:lstStyle/>
+          <a:p>
+            <a:endParaRPr lang="en-GB"/>
+          </a:p>
+        </p:txBody>
+      </p:sp>
+      <p:sp>
+        <p:nvSpPr>
+          <p:cNvPr id="5" name="Notes Placeholder 4"/>
+          <p:cNvSpPr>
+            <a:spLocks noGrp="1"/>
+          </p:cNvSpPr>
+          <p:nvPr>
+            <p:ph type="body" sz="quarter" idx="3"/>
+          </p:nvPr>
+        </p:nvSpPr>
+        <p:spPr>
+          <a:xfrm>
+            <a:off x="685800" y="4400550"/>
+            <a:ext cx="5486400" cy="3600450"/>
+          </a:xfrm>
+          <a:prstGeom prst="rect">
+            <a:avLst/>
+          </a:prstGeom>
+        </p:spPr>
+        <p:txBody>
+          <a:bodyPr vert="horz" lIns="91440" tIns="45720" rIns="91440" bIns="45720" rtlCol="0"/>
+          <a:lstStyle/>
+          <a:p>
+            <a:pPr lvl="0"/>
+            <a:r>
+              <a:rPr lang="en-US" smtClean="0"/>
+              <a:t>Click to edit Master text styles</a:t>
+            </a:r>
+          </a:p>
+          <a:p>
+            <a:pPr lvl="1"/>
+            <a:r>
+              <a:rPr lang="en-US" smtClean="0"/>
+              <a:t>Second level</a:t>
+            </a:r>
+          </a:p>
+          <a:p>
+            <a:pPr lvl="2"/>
+            <a:r>
+              <a:rPr lang="en-US" smtClean="0"/>
+              <a:t>Third level</a:t>
+            </a:r>
+          </a:p>
+          <a:p>
+            <a:pPr lvl="3"/>
+            <a:r>
+              <a:rPr lang="en-US" smtClean="0"/>
+              <a:t>Fourth level</a:t>
+            </a:r>
+          </a:p>
+          <a:p>
+            <a:pPr lvl="4"/>
+            <a:r>
+              <a:rPr lang="en-US" smtClean="0"/>
+              <a:t>Fifth level</a:t>
+            </a:r>
+            <a:endParaRPr lang="en-GB"/>
+          </a:p>
+        </p:txBody>
+      </p:sp>
+      <p:sp>
+        <p:nvSpPr>
+          <p:cNvPr id="6" name="Footer Placeholder 5"/>
+          <p:cNvSpPr>
+            <a:spLocks noGrp="1"/>
+          </p:cNvSpPr>
+          <p:nvPr>
+            <p:ph type="ftr" sz="quarter" idx="4"/>
+          </p:nvPr>
+        </p:nvSpPr>
+        <p:spPr>
+          <a:xfrm>
+            <a:off x="0" y="8685213"/>
+            <a:ext cx="2971800" cy="458787"/>
+          </a:xfrm>
+          <a:prstGeom prst="rect">
+            <a:avLst/>
+          </a:prstGeom>
+        </p:spPr>
+        <p:txBody>
+          <a:bodyPr vert="horz" lIns="91440" tIns="45720" rIns="91440" bIns="45720" rtlCol="0" anchor="b"/>
+          <a:lstStyle>
+            <a:lvl1pPr algn="l">
+              <a:defRPr sz="1200"/>
+            </a:lvl1pPr>
+          </a:lstStyle>
+          <a:p>
+            <a:endParaRPr lang="en-GB"/>
+          </a:p>
+        </p:txBody>
+      </p:sp>
+      <p:sp>
+        <p:nvSpPr>
+          <p:cNvPr id="7" name="Slide Number Placeholder 6"/>
+          <p:cNvSpPr>
+            <a:spLocks noGrp="1"/>
+          </p:cNvSpPr>
+          <p:nvPr>
+            <p:ph type="sldNum" sz="quarter" idx="5"/>
+          </p:nvPr>
+        </p:nvSpPr>
+        <p:spPr>
+          <a:xfrm>
+            <a:off x="3884613" y="8685213"/>
+            <a:ext cx="2971800" cy="458787"/>
+          </a:xfrm>
+          <a:prstGeom prst="rect">
+            <a:avLst/>
+          </a:prstGeom>
+        </p:spPr>
+        <p:txBody>
+          <a:bodyPr vert="horz" lIns="91440" tIns="45720" rIns="91440" bIns="45720" rtlCol="0" anchor="b"/>
+          <a:lstStyle>
+            <a:lvl1pPr algn="r">
+              <a:defRPr sz="1200"/>
+            </a:lvl1pPr>
+          </a:lstStyle>
+          <a:p>
+            <a:fld id="{6A9F359A-1EB1-4B96-B153-03BB157EEF14}" type="slidenum">
+              <a:rPr lang="en-GB" smtClean="0"/>
+              <a:t>‹#›</a:t>
+            </a:fld>
+            <a:endParaRPr lang="en-GB"/>
+          </a:p>
+        </p:txBody>
+      </p:sp>
+    </p:spTree>
+    <p:extLst>
+      <p:ext uri="{BB962C8B-B14F-4D97-AF65-F5344CB8AC3E}">
+        <p14:creationId xmlns:p14="http://schemas.microsoft.com/office/powerpoint/2010/main" val="3487807839"/>
+      </p:ext>
+    </p:extLst>
+  </p:cSld>
+  <p:clrMap bg1="lt1" tx1="dk1" bg2="lt2" tx2="dk2" accent1="accent1" accent2="accent2" accent3="accent3" accent4="accent4" accent5="accent5" accent6="accent6" hlink="hlink" folHlink="folHlink"/>
+  <p:notesStyle>
+    <a:lvl1pPr marL="0" algn="l" defTabSz="914400" rtl="0" eaLnBrk="1" latinLnBrk="0" hangingPunct="1">
+      <a:defRPr sz="1200" kern="1200">
+        <a:solidFill>
+          <a:schemeClr val="tx1"/>
+        </a:solidFill>
+        <a:latin typeface="+mn-lt"/>
+        <a:ea typeface="+mn-ea"/>
+        <a:cs typeface="+mn-cs"/>
+      </a:defRPr>
+    </a:lvl1pPr>
+    <a:lvl2pPr marL="457200" algn="l" defTabSz="914400" rtl="0" eaLnBrk="1" latinLnBrk="0" hangingPunct="1">
+      <a:defRPr sz="1200" kern="1200">
+        <a:solidFill>
+          <a:schemeClr val="tx1"/>
+        </a:solidFill>
+        <a:latin typeface="+mn-lt"/>
+        <a:ea typeface="+mn-ea"/>
+        <a:cs typeface="+mn-cs"/>
+      </a:defRPr>
+    </a:lvl2pPr>
+    <a:lvl3pPr marL="914400" algn="l" defTabSz="914400" rtl="0" eaLnBrk="1" latinLnBrk="0" hangingPunct="1">
+      <a:defRPr sz="1200" kern="1200">
+        <a:solidFill>
+          <a:schemeClr val="tx1"/>
+        </a:solidFill>
+        <a:latin typeface="+mn-lt"/>
+        <a:ea typeface="+mn-ea"/>
+        <a:cs typeface="+mn-cs"/>
+      </a:defRPr>
+    </a:lvl3pPr>
+    <a:lvl4pPr marL="1371600" algn="l" defTabSz="914400" rtl="0" eaLnBrk="1" latinLnBrk="0" hangingPunct="1">
+      <a:defRPr sz="1200" kern="1200">
+        <a:solidFill>
+          <a:schemeClr val="tx1"/>
+        </a:solidFill>
+        <a:latin typeface="+mn-lt"/>
+        <a:ea typeface="+mn-ea"/>
+        <a:cs typeface="+mn-cs"/>
+      </a:defRPr>
+    </a:lvl4pPr>
+    <a:lvl5pPr marL="1828800" algn="l" defTabSz="914400" rtl="0" eaLnBrk="1" latinLnBrk="0" hangingPunct="1">
+      <a:defRPr sz="1200" kern="1200">
+        <a:solidFill>
+          <a:schemeClr val="tx1"/>
+        </a:solidFill>
+        <a:latin typeface="+mn-lt"/>
+        <a:ea typeface="+mn-ea"/>
+        <a:cs typeface="+mn-cs"/>
+      </a:defRPr>
+    </a:lvl5pPr>
+    <a:lvl6pPr marL="2286000" algn="l" defTabSz="914400" rtl="0" eaLnBrk="1" latinLnBrk="0" hangingPunct="1">
+      <a:defRPr sz="1200" kern="1200">
+        <a:solidFill>
+          <a:schemeClr val="tx1"/>
+        </a:solidFill>
+        <a:latin typeface="+mn-lt"/>
+        <a:ea typeface="+mn-ea"/>
+        <a:cs typeface="+mn-cs"/>
+      </a:defRPr>
+    </a:lvl6pPr>
+    <a:lvl7pPr marL="2743200" algn="l" defTabSz="914400" rtl="0" eaLnBrk="1" latinLnBrk="0" hangingPunct="1">
+      <a:defRPr sz="1200" kern="1200">
+        <a:solidFill>
+          <a:schemeClr val="tx1"/>
+        </a:solidFill>
+        <a:latin typeface="+mn-lt"/>
+        <a:ea typeface="+mn-ea"/>
+        <a:cs typeface="+mn-cs"/>
+      </a:defRPr>
+    </a:lvl7pPr>
+    <a:lvl8pPr marL="3200400" algn="l" defTabSz="914400" rtl="0" eaLnBrk="1" latinLnBrk="0" hangingPunct="1">
+      <a:defRPr sz="1200" kern="1200">
+        <a:solidFill>
+          <a:schemeClr val="tx1"/>
+        </a:solidFill>
+        <a:latin typeface="+mn-lt"/>
+        <a:ea typeface="+mn-ea"/>
+        <a:cs typeface="+mn-cs"/>
+      </a:defRPr>
+    </a:lvl8pPr>
+    <a:lvl9pPr marL="3657600" algn="l" defTabSz="914400" rtl="0" eaLnBrk="1" latinLnBrk="0" hangingPunct="1">
+      <a:defRPr sz="1200" kern="1200">
+        <a:solidFill>
+          <a:schemeClr val="tx1"/>
+        </a:solidFill>
+        <a:latin typeface="+mn-lt"/>
+        <a:ea typeface="+mn-ea"/>
+        <a:cs typeface="+mn-cs"/>
+      </a:defRPr>
+    </a:lvl9pPr>
+  </p:notesStyle>
+</p:notesMaster>
+</file>
+
+<file path=ppt/notesSlides/notesSlide1.xml><?xml version="1.0" encoding="utf-8"?>
+<p:notes xmlns:a="http://schemas.openxmlformats.org/drawingml/2006/main" xmlns:r="http://schemas.openxmlformats.org/officeDocument/2006/relationships" xmlns:p="http://schemas.openxmlformats.org/presentationml/2006/main">
+  <p:cSld>
+    <p:spTree>
+      <p:nvGrpSpPr>
+        <p:cNvPr id="1" name=""/>
+        <p:cNvGrpSpPr/>
+        <p:nvPr/>
+      </p:nvGrpSpPr>
+      <p:grpSpPr>
+        <a:xfrm>
+          <a:off x="0" y="0"/>
+          <a:ext cx="0" cy="0"/>
+          <a:chOff x="0" y="0"/>
+          <a:chExt cx="0" cy="0"/>
+        </a:xfrm>
+      </p:grpSpPr>
+      <p:sp>
+        <p:nvSpPr>
+          <p:cNvPr id="2" name="Slide Image Placeholder 1"/>
+          <p:cNvSpPr>
+            <a:spLocks noGrp="1" noRot="1" noChangeAspect="1"/>
+          </p:cNvSpPr>
+          <p:nvPr>
+            <p:ph type="sldImg"/>
+          </p:nvPr>
+        </p:nvSpPr>
+        <p:spPr/>
+      </p:sp>
+      <p:sp>
+        <p:nvSpPr>
+          <p:cNvPr id="3" name="Notes Placeholder 2"/>
+          <p:cNvSpPr>
+            <a:spLocks noGrp="1"/>
+          </p:cNvSpPr>
+          <p:nvPr>
+            <p:ph type="body" idx="1"/>
+          </p:nvPr>
+        </p:nvSpPr>
+        <p:spPr/>
+        <p:txBody>
+          <a:bodyPr/>
+          <a:lstStyle/>
+          <a:p>
+            <a:endParaRPr lang="en-GB" dirty="0"/>
+          </a:p>
+        </p:txBody>
+      </p:sp>
+      <p:sp>
+        <p:nvSpPr>
+          <p:cNvPr id="4" name="Slide Number Placeholder 3"/>
+          <p:cNvSpPr>
+            <a:spLocks noGrp="1"/>
+          </p:cNvSpPr>
+          <p:nvPr>
+            <p:ph type="sldNum" sz="quarter" idx="10"/>
+          </p:nvPr>
+        </p:nvSpPr>
+        <p:spPr/>
+        <p:txBody>
+          <a:bodyPr/>
+          <a:lstStyle/>
+          <a:p>
+            <a:fld id="{6A9F359A-1EB1-4B96-B153-03BB157EEF14}" type="slidenum">
+              <a:rPr lang="en-GB" smtClean="0"/>
+              <a:t>1</a:t>
+            </a:fld>
+            <a:endParaRPr lang="en-GB"/>
+          </a:p>
+        </p:txBody>
+      </p:sp>
+    </p:spTree>
+    <p:extLst>
+      <p:ext uri="{BB962C8B-B14F-4D97-AF65-F5344CB8AC3E}">
+        <p14:creationId xmlns:p14="http://schemas.microsoft.com/office/powerpoint/2010/main" val="4180607107"/>
+      </p:ext>
+    </p:extLst>
+  </p:cSld>
+  <p:clrMapOvr>
+    <a:masterClrMapping/>
+  </p:clrMapOvr>
+</p:notes>
+</file>
+
 <file path=ppt/slideLayouts/slideLayout1.xml><?xml version="1.0" encoding="utf-8"?>
 <p:sldLayout xmlns:a="http://schemas.openxmlformats.org/drawingml/2006/main" xmlns:r="http://schemas.openxmlformats.org/officeDocument/2006/relationships" xmlns:p="http://schemas.openxmlformats.org/presentationml/2006/main" showMasterSp="0" type="title" preserve="1">
   <p:cSld name="Title Slide">
@@ -275,7 +713,7 @@
           <a:p>
             <a:fld id="{67BDCB85-630C-4FC8-A0A8-B4A448B7EB6C}" type="datetimeFigureOut">
               <a:rPr lang="en-GB" smtClean="0"/>
-              <a:t>28/02/2016</a:t>
+              <a:t>20/03/2016</a:t>
             </a:fld>
             <a:endParaRPr lang="en-GB"/>
           </a:p>
@@ -518,7 +956,7 @@
           <a:p>
             <a:fld id="{67BDCB85-630C-4FC8-A0A8-B4A448B7EB6C}" type="datetimeFigureOut">
               <a:rPr lang="en-GB" smtClean="0"/>
-              <a:t>28/02/2016</a:t>
+              <a:t>20/03/2016</a:t>
             </a:fld>
             <a:endParaRPr lang="en-GB"/>
           </a:p>
@@ -698,7 +1136,7 @@
           <a:p>
             <a:fld id="{67BDCB85-630C-4FC8-A0A8-B4A448B7EB6C}" type="datetimeFigureOut">
               <a:rPr lang="en-GB" smtClean="0"/>
-              <a:t>28/02/2016</a:t>
+              <a:t>20/03/2016</a:t>
             </a:fld>
             <a:endParaRPr lang="en-GB"/>
           </a:p>
@@ -903,7 +1341,7 @@
           <a:p>
             <a:fld id="{67BDCB85-630C-4FC8-A0A8-B4A448B7EB6C}" type="datetimeFigureOut">
               <a:rPr lang="en-GB" smtClean="0"/>
-              <a:t>28/02/2016</a:t>
+              <a:t>20/03/2016</a:t>
             </a:fld>
             <a:endParaRPr lang="en-GB"/>
           </a:p>
@@ -1160,7 +1598,7 @@
           <a:p>
             <a:fld id="{67BDCB85-630C-4FC8-A0A8-B4A448B7EB6C}" type="datetimeFigureOut">
               <a:rPr lang="en-GB" smtClean="0"/>
-              <a:t>28/02/2016</a:t>
+              <a:t>20/03/2016</a:t>
             </a:fld>
             <a:endParaRPr lang="en-GB"/>
           </a:p>
@@ -1507,7 +1945,7 @@
           <a:p>
             <a:fld id="{67BDCB85-630C-4FC8-A0A8-B4A448B7EB6C}" type="datetimeFigureOut">
               <a:rPr lang="en-GB" smtClean="0"/>
-              <a:t>28/02/2016</a:t>
+              <a:t>20/03/2016</a:t>
             </a:fld>
             <a:endParaRPr lang="en-GB"/>
           </a:p>
@@ -1909,7 +2347,7 @@
           <a:p>
             <a:fld id="{67BDCB85-630C-4FC8-A0A8-B4A448B7EB6C}" type="datetimeFigureOut">
               <a:rPr lang="en-GB" smtClean="0"/>
-              <a:t>28/02/2016</a:t>
+              <a:t>20/03/2016</a:t>
             </a:fld>
             <a:endParaRPr lang="en-GB"/>
           </a:p>
@@ -2027,7 +2465,7 @@
           <a:p>
             <a:fld id="{67BDCB85-630C-4FC8-A0A8-B4A448B7EB6C}" type="datetimeFigureOut">
               <a:rPr lang="en-GB" smtClean="0"/>
-              <a:t>28/02/2016</a:t>
+              <a:t>20/03/2016</a:t>
             </a:fld>
             <a:endParaRPr lang="en-GB"/>
           </a:p>
@@ -2122,7 +2560,7 @@
           <a:p>
             <a:fld id="{67BDCB85-630C-4FC8-A0A8-B4A448B7EB6C}" type="datetimeFigureOut">
               <a:rPr lang="en-GB" smtClean="0"/>
-              <a:t>28/02/2016</a:t>
+              <a:t>20/03/2016</a:t>
             </a:fld>
             <a:endParaRPr lang="en-GB"/>
           </a:p>
@@ -2412,7 +2850,7 @@
           <a:p>
             <a:fld id="{67BDCB85-630C-4FC8-A0A8-B4A448B7EB6C}" type="datetimeFigureOut">
               <a:rPr lang="en-GB" smtClean="0"/>
-              <a:t>28/02/2016</a:t>
+              <a:t>20/03/2016</a:t>
             </a:fld>
             <a:endParaRPr lang="en-GB"/>
           </a:p>
@@ -2692,7 +3130,7 @@
           <a:p>
             <a:fld id="{67BDCB85-630C-4FC8-A0A8-B4A448B7EB6C}" type="datetimeFigureOut">
               <a:rPr lang="en-GB" smtClean="0"/>
-              <a:t>28/02/2016</a:t>
+              <a:t>20/03/2016</a:t>
             </a:fld>
             <a:endParaRPr lang="en-GB"/>
           </a:p>
@@ -2942,7 +3380,7 @@
           <a:p>
             <a:fld id="{67BDCB85-630C-4FC8-A0A8-B4A448B7EB6C}" type="datetimeFigureOut">
               <a:rPr lang="en-GB" smtClean="0"/>
-              <a:t>28/02/2016</a:t>
+              <a:t>20/03/2016</a:t>
             </a:fld>
             <a:endParaRPr lang="en-GB"/>
           </a:p>
@@ -3589,15 +4027,7 @@
           <a:p>
             <a:r>
               <a:rPr lang="en-GB" dirty="0" smtClean="0"/>
-              <a:t>Individual Contribution To Core (</a:t>
-            </a:r>
-            <a:r>
-              <a:rPr lang="en-GB" dirty="0" err="1" smtClean="0"/>
-              <a:t>i</a:t>
-            </a:r>
-            <a:r>
-              <a:rPr lang="en-GB" dirty="0" smtClean="0"/>
-              <a:t>)</a:t>
+              <a:t>Demo</a:t>
             </a:r>
             <a:endParaRPr lang="en-GB" dirty="0"/>
           </a:p>
@@ -3620,100 +4050,29 @@
           <a:p>
             <a:r>
               <a:rPr lang="en-GB" dirty="0" smtClean="0"/>
-              <a:t>Group as whole</a:t>
-            </a:r>
-          </a:p>
-          <a:p>
-            <a:pPr lvl="1"/>
-            <a:r>
-              <a:rPr lang="en-GB" dirty="0" smtClean="0"/>
-              <a:t>Helped design the website layout</a:t>
+              <a:t>We will now show you our progress so far</a:t>
             </a:r>
             <a:endParaRPr lang="en-GB" dirty="0"/>
-          </a:p>
-          <a:p>
-            <a:r>
-              <a:rPr lang="en-GB" dirty="0" smtClean="0"/>
-              <a:t>Hamza </a:t>
-            </a:r>
-          </a:p>
-          <a:p>
-            <a:pPr lvl="1"/>
-            <a:r>
-              <a:rPr lang="en-GB" dirty="0" smtClean="0"/>
-              <a:t>Set up product database</a:t>
-            </a:r>
-          </a:p>
-          <a:p>
-            <a:pPr lvl="1"/>
-            <a:r>
-              <a:rPr lang="en-GB" dirty="0" smtClean="0"/>
-              <a:t>Populated </a:t>
-            </a:r>
-            <a:r>
-              <a:rPr lang="en-GB" dirty="0" smtClean="0"/>
-              <a:t>area </a:t>
-            </a:r>
-            <a:r>
-              <a:rPr lang="en-GB" dirty="0" smtClean="0"/>
-              <a:t>of website with database data</a:t>
-            </a:r>
-          </a:p>
-          <a:p>
-            <a:pPr lvl="1"/>
-            <a:r>
-              <a:rPr lang="en-GB" dirty="0" smtClean="0"/>
-              <a:t>Investigated how to implement a trolley</a:t>
-            </a:r>
-            <a:endParaRPr lang="en-GB" dirty="0" smtClean="0"/>
-          </a:p>
-          <a:p>
-            <a:r>
-              <a:rPr lang="en-GB" dirty="0" smtClean="0"/>
-              <a:t>Joe</a:t>
-            </a:r>
-          </a:p>
-          <a:p>
-            <a:pPr lvl="1"/>
-            <a:r>
-              <a:rPr lang="en-GB" dirty="0" smtClean="0"/>
-              <a:t>Developed website</a:t>
-            </a:r>
-          </a:p>
-          <a:p>
-            <a:pPr lvl="1"/>
-            <a:r>
-              <a:rPr lang="en-GB" dirty="0" smtClean="0"/>
-              <a:t>Investigated how to implement a trolley</a:t>
-            </a:r>
-          </a:p>
-          <a:p>
-            <a:pPr lvl="1"/>
-            <a:r>
-              <a:rPr lang="en-GB" dirty="0" smtClean="0"/>
-              <a:t>Investigated how to deals for products</a:t>
-            </a:r>
-          </a:p>
-          <a:p>
-            <a:pPr lvl="1"/>
-            <a:endParaRPr lang="en-GB" dirty="0" smtClean="0"/>
-          </a:p>
-          <a:p>
-            <a:pPr lvl="1"/>
-            <a:endParaRPr lang="en-GB" dirty="0" smtClean="0"/>
           </a:p>
         </p:txBody>
       </p:sp>
     </p:spTree>
     <p:extLst>
       <p:ext uri="{BB962C8B-B14F-4D97-AF65-F5344CB8AC3E}">
-        <p14:creationId xmlns:p14="http://schemas.microsoft.com/office/powerpoint/2010/main" val="3348547855"/>
+        <p14:creationId xmlns:p14="http://schemas.microsoft.com/office/powerpoint/2010/main" val="1344941087"/>
       </p:ext>
     </p:extLst>
   </p:cSld>
   <p:clrMapOvr>
     <a:masterClrMapping/>
   </p:clrMapOvr>
+  <p:timing>
+    <p:tnLst>
+      <p:par>
+        <p:cTn id="1" dur="indefinite" restart="never" nodeType="tmRoot"/>
+      </p:par>
+    </p:tnLst>
+  </p:timing>
 </p:sld>
 </file>
 
@@ -3750,6 +4109,159 @@
           <a:lstStyle/>
           <a:p>
             <a:r>
+              <a:rPr lang="en-GB" dirty="0" smtClean="0"/>
+              <a:t>Individual Contribution To Core (</a:t>
+            </a:r>
+            <a:r>
+              <a:rPr lang="en-GB" dirty="0" err="1" smtClean="0"/>
+              <a:t>i</a:t>
+            </a:r>
+            <a:r>
+              <a:rPr lang="en-GB" dirty="0" smtClean="0"/>
+              <a:t>)</a:t>
+            </a:r>
+            <a:endParaRPr lang="en-GB" dirty="0"/>
+          </a:p>
+        </p:txBody>
+      </p:sp>
+      <p:sp>
+        <p:nvSpPr>
+          <p:cNvPr id="3" name="Content Placeholder 2"/>
+          <p:cNvSpPr>
+            <a:spLocks noGrp="1"/>
+          </p:cNvSpPr>
+          <p:nvPr>
+            <p:ph idx="1"/>
+          </p:nvPr>
+        </p:nvSpPr>
+        <p:spPr/>
+        <p:txBody>
+          <a:bodyPr/>
+          <a:lstStyle/>
+          <a:p>
+            <a:r>
+              <a:rPr lang="en-GB" dirty="0" smtClean="0"/>
+              <a:t>Group as whole</a:t>
+            </a:r>
+          </a:p>
+          <a:p>
+            <a:pPr lvl="1"/>
+            <a:r>
+              <a:rPr lang="en-GB" dirty="0" smtClean="0"/>
+              <a:t>Helped design the website layout</a:t>
+            </a:r>
+            <a:endParaRPr lang="en-GB" dirty="0"/>
+          </a:p>
+          <a:p>
+            <a:r>
+              <a:rPr lang="en-GB" dirty="0" smtClean="0"/>
+              <a:t>Hamza </a:t>
+            </a:r>
+          </a:p>
+          <a:p>
+            <a:pPr lvl="1"/>
+            <a:r>
+              <a:rPr lang="en-GB" dirty="0" smtClean="0"/>
+              <a:t>Set up product database</a:t>
+            </a:r>
+          </a:p>
+          <a:p>
+            <a:pPr lvl="1"/>
+            <a:r>
+              <a:rPr lang="en-GB" dirty="0" smtClean="0"/>
+              <a:t>Populated area of website with database data</a:t>
+            </a:r>
+          </a:p>
+          <a:p>
+            <a:pPr lvl="1"/>
+            <a:r>
+              <a:rPr lang="en-GB" dirty="0" smtClean="0"/>
+              <a:t>Started implementing a trolley</a:t>
+            </a:r>
+          </a:p>
+          <a:p>
+            <a:r>
+              <a:rPr lang="en-GB" dirty="0" smtClean="0"/>
+              <a:t>Joe</a:t>
+            </a:r>
+          </a:p>
+          <a:p>
+            <a:pPr lvl="1"/>
+            <a:r>
+              <a:rPr lang="en-GB" dirty="0" smtClean="0"/>
+              <a:t>Developed website</a:t>
+            </a:r>
+          </a:p>
+          <a:p>
+            <a:pPr lvl="1"/>
+            <a:r>
+              <a:rPr lang="en-GB" dirty="0" smtClean="0"/>
+              <a:t>Started implementing a trolley</a:t>
+            </a:r>
+          </a:p>
+          <a:p>
+            <a:pPr lvl="1"/>
+            <a:r>
+              <a:rPr lang="en-GB" dirty="0" smtClean="0"/>
+              <a:t>Investigated how to implement deals for products</a:t>
+            </a:r>
+          </a:p>
+          <a:p>
+            <a:pPr lvl="1"/>
+            <a:endParaRPr lang="en-GB" dirty="0" smtClean="0"/>
+          </a:p>
+          <a:p>
+            <a:pPr lvl="1"/>
+            <a:endParaRPr lang="en-GB" dirty="0" smtClean="0"/>
+          </a:p>
+        </p:txBody>
+      </p:sp>
+    </p:spTree>
+    <p:extLst>
+      <p:ext uri="{BB962C8B-B14F-4D97-AF65-F5344CB8AC3E}">
+        <p14:creationId xmlns:p14="http://schemas.microsoft.com/office/powerpoint/2010/main" val="3348547855"/>
+      </p:ext>
+    </p:extLst>
+  </p:cSld>
+  <p:clrMapOvr>
+    <a:masterClrMapping/>
+  </p:clrMapOvr>
+</p:sld>
+</file>
+
+<file path=ppt/slides/slide12.xml><?xml version="1.0" encoding="utf-8"?>
+<p:sld xmlns:a="http://schemas.openxmlformats.org/drawingml/2006/main" xmlns:r="http://schemas.openxmlformats.org/officeDocument/2006/relationships" xmlns:p="http://schemas.openxmlformats.org/presentationml/2006/main">
+  <p:cSld>
+    <p:spTree>
+      <p:nvGrpSpPr>
+        <p:cNvPr id="1" name=""/>
+        <p:cNvGrpSpPr/>
+        <p:nvPr/>
+      </p:nvGrpSpPr>
+      <p:grpSpPr>
+        <a:xfrm>
+          <a:off x="0" y="0"/>
+          <a:ext cx="0" cy="0"/>
+          <a:chOff x="0" y="0"/>
+          <a:chExt cx="0" cy="0"/>
+        </a:xfrm>
+      </p:grpSpPr>
+      <p:sp>
+        <p:nvSpPr>
+          <p:cNvPr id="2" name="Title 1"/>
+          <p:cNvSpPr>
+            <a:spLocks noGrp="1"/>
+          </p:cNvSpPr>
+          <p:nvPr>
+            <p:ph type="title"/>
+          </p:nvPr>
+        </p:nvSpPr>
+        <p:spPr/>
+        <p:txBody>
+          <a:bodyPr/>
+          <a:lstStyle/>
+          <a:p>
+            <a:r>
               <a:rPr lang="en-GB" dirty="0"/>
               <a:t>Individual Contribution To Core </a:t>
             </a:r>
@@ -3786,20 +4298,15 @@
             <a:pPr lvl="1"/>
             <a:r>
               <a:rPr lang="en-GB" dirty="0" smtClean="0"/>
-              <a:t>Helped implement </a:t>
-            </a:r>
+              <a:t>Helped implement CSS (In progress)</a:t>
+            </a:r>
+          </a:p>
+          <a:p>
+            <a:pPr lvl="1"/>
             <a:r>
               <a:rPr lang="en-GB" dirty="0" smtClean="0"/>
-              <a:t>CSS</a:t>
-            </a:r>
-          </a:p>
-          <a:p>
-            <a:pPr lvl="1"/>
-            <a:r>
-              <a:rPr lang="en-GB" dirty="0" smtClean="0"/>
-              <a:t>Researched how to implement deals for products</a:t>
-            </a:r>
-            <a:endParaRPr lang="en-GB" dirty="0" smtClean="0"/>
+              <a:t>Wrote pseudo code on how to implement deals for products</a:t>
+            </a:r>
           </a:p>
           <a:p>
             <a:r>
@@ -3812,20 +4319,19 @@
             <a:pPr lvl="1"/>
             <a:r>
               <a:rPr lang="en-GB" dirty="0" smtClean="0"/>
-              <a:t>Helped implement </a:t>
+              <a:t>Helped implement CSS (in progress)</a:t>
+            </a:r>
+          </a:p>
+          <a:p>
+            <a:pPr lvl="1"/>
+            <a:r>
+              <a:rPr lang="en-GB" smtClean="0"/>
+              <a:t>Research for </a:t>
             </a:r>
             <a:r>
               <a:rPr lang="en-GB" dirty="0" smtClean="0"/>
-              <a:t>CSS</a:t>
-            </a:r>
-          </a:p>
-          <a:p>
-            <a:pPr lvl="1"/>
-            <a:r>
-              <a:rPr lang="en-GB" dirty="0" smtClean="0"/>
-              <a:t>Researched implementation for a trolley</a:t>
-            </a:r>
-            <a:endParaRPr lang="en-GB" dirty="0" smtClean="0"/>
+              <a:t>implementing a trolley payment</a:t>
+            </a:r>
           </a:p>
         </p:txBody>
       </p:sp>
@@ -3842,7 +4348,7 @@
 </p:sld>
 </file>
 
-<file path=ppt/slides/slide12.xml><?xml version="1.0" encoding="utf-8"?>
+<file path=ppt/slides/slide13.xml><?xml version="1.0" encoding="utf-8"?>
 <p:sld xmlns:a="http://schemas.openxmlformats.org/drawingml/2006/main" xmlns:r="http://schemas.openxmlformats.org/officeDocument/2006/relationships" xmlns:p="http://schemas.openxmlformats.org/presentationml/2006/main">
   <p:cSld>
     <p:spTree>
@@ -4016,6 +4522,14 @@
               <a:rPr lang="en-GB" dirty="0" smtClean="0"/>
               <a:t> Link: </a:t>
             </a:r>
+            <a:r>
+              <a:rPr lang="en-GB" dirty="0"/>
+              <a:t>https://HamzaB93@bitbucket.org/HamzaB93/csci5_-</a:t>
+            </a:r>
+            <a:r>
+              <a:rPr lang="en-GB" dirty="0" smtClean="0"/>
+              <a:t>team_project.gitq</a:t>
+            </a:r>
             <a:endParaRPr lang="en-GB" dirty="0"/>
           </a:p>
         </p:txBody>
@@ -4108,7 +4622,7 @@
           <a:p>
             <a:r>
               <a:rPr lang="en-GB" dirty="0" smtClean="0"/>
-              <a:t>A website for a supermarket</a:t>
+              <a:t>A website for a supermarket called Vista</a:t>
             </a:r>
           </a:p>
           <a:p>
@@ -4134,29 +4648,39 @@
             <a:pPr lvl="1"/>
             <a:r>
               <a:rPr lang="en-GB" dirty="0" smtClean="0"/>
-              <a:t>Supply management </a:t>
+              <a:t>Supply management: Hamza</a:t>
             </a:r>
           </a:p>
           <a:p>
             <a:pPr lvl="1"/>
             <a:r>
               <a:rPr lang="en-GB" dirty="0" smtClean="0"/>
-              <a:t>Loyalty scheme </a:t>
+              <a:t>Loyalty scheme: Joe</a:t>
             </a:r>
           </a:p>
           <a:p>
             <a:pPr lvl="1"/>
             <a:r>
               <a:rPr lang="en-GB" dirty="0" smtClean="0"/>
-              <a:t>Advertising and marketing</a:t>
-            </a:r>
+              <a:t>Advertising and marketing: </a:t>
+            </a:r>
+            <a:r>
+              <a:rPr lang="en-GB" dirty="0" err="1" smtClean="0"/>
+              <a:t>Amrit</a:t>
+            </a:r>
+            <a:endParaRPr lang="en-GB" dirty="0" smtClean="0"/>
           </a:p>
           <a:p>
             <a:pPr lvl="1"/>
             <a:r>
               <a:rPr lang="en-GB" dirty="0" smtClean="0"/>
-              <a:t>Payment system</a:t>
-            </a:r>
+              <a:t>Payment system: </a:t>
+            </a:r>
+            <a:r>
+              <a:rPr lang="en-GB" dirty="0" err="1" smtClean="0"/>
+              <a:t>Tashan</a:t>
+            </a:r>
+            <a:endParaRPr lang="en-GB" dirty="0" smtClean="0"/>
           </a:p>
         </p:txBody>
       </p:sp>
@@ -4207,15 +4731,7 @@
           <a:p>
             <a:r>
               <a:rPr lang="en-GB" dirty="0" smtClean="0"/>
-              <a:t>Our Roles (</a:t>
-            </a:r>
-            <a:r>
-              <a:rPr lang="en-GB" dirty="0" err="1" smtClean="0"/>
-              <a:t>i</a:t>
-            </a:r>
-            <a:r>
-              <a:rPr lang="en-GB" dirty="0" smtClean="0"/>
-              <a:t>)</a:t>
+              <a:t>Our Roles</a:t>
             </a:r>
             <a:endParaRPr lang="en-GB" dirty="0"/>
           </a:p>
@@ -4264,30 +4780,27 @@
             <a:pPr lvl="1"/>
             <a:r>
               <a:rPr lang="en-GB" dirty="0"/>
-              <a:t>Element integration: Hamza and Joe</a:t>
-            </a:r>
+              <a:t>Element integration: Hamza and </a:t>
+            </a:r>
+            <a:r>
+              <a:rPr lang="en-GB" dirty="0" smtClean="0"/>
+              <a:t>Joe</a:t>
+            </a:r>
+            <a:endParaRPr lang="en-GB" dirty="0"/>
           </a:p>
           <a:p>
             <a:pPr lvl="1"/>
             <a:r>
               <a:rPr lang="en-GB" dirty="0"/>
-              <a:t>User manual: </a:t>
-            </a:r>
-            <a:r>
-              <a:rPr lang="en-GB" dirty="0" err="1"/>
+              <a:t>User </a:t>
+            </a:r>
+            <a:r>
+              <a:rPr lang="en-GB" dirty="0" smtClean="0"/>
+              <a:t>documentation/ manual: </a:t>
+            </a:r>
+            <a:r>
+              <a:rPr lang="en-GB" dirty="0" err="1" smtClean="0"/>
               <a:t>Amrit</a:t>
-            </a:r>
-            <a:endParaRPr lang="en-GB" dirty="0"/>
-          </a:p>
-          <a:p>
-            <a:pPr lvl="1"/>
-            <a:r>
-              <a:rPr lang="en-GB" dirty="0"/>
-              <a:t>User documentation: </a:t>
-            </a:r>
-            <a:r>
-              <a:rPr lang="en-GB" dirty="0" err="1"/>
-              <a:t>Tashan</a:t>
             </a:r>
             <a:endParaRPr lang="en-GB" dirty="0"/>
           </a:p>
@@ -4298,8 +4811,20 @@
               <a:t>Technical doc: Hamza and </a:t>
             </a:r>
             <a:r>
-              <a:rPr lang="en-GB" dirty="0" err="1"/>
-              <a:t>amrit</a:t>
+              <a:rPr lang="en-GB" dirty="0" err="1" smtClean="0"/>
+              <a:t>Amrit</a:t>
+            </a:r>
+            <a:endParaRPr lang="en-GB" dirty="0" smtClean="0"/>
+          </a:p>
+          <a:p>
+            <a:pPr lvl="1"/>
+            <a:r>
+              <a:rPr lang="en-GB" dirty="0" smtClean="0"/>
+              <a:t>Tester: </a:t>
+            </a:r>
+            <a:r>
+              <a:rPr lang="en-GB" dirty="0" err="1" smtClean="0"/>
+              <a:t>Tashan</a:t>
             </a:r>
             <a:endParaRPr lang="en-GB" dirty="0"/>
           </a:p>
@@ -5580,7 +6105,7 @@
         </p:nvGraphicFramePr>
         <p:xfrm>
           <a:off x="786684" y="1924429"/>
-          <a:ext cx="3073400" cy="2967675"/>
+          <a:ext cx="3073400" cy="2956309"/>
         </p:xfrm>
         <a:graphic>
           <a:graphicData uri="http://schemas.openxmlformats.org/drawingml/2006/table">
@@ -6198,14 +6723,14 @@
           <p:nvPr>
             <p:extLst>
               <p:ext uri="{D42A27DB-BD31-4B8C-83A1-F6EECF244321}">
-                <p14:modId xmlns:p14="http://schemas.microsoft.com/office/powerpoint/2010/main" val="1734683702"/>
+                <p14:modId xmlns:p14="http://schemas.microsoft.com/office/powerpoint/2010/main" val="574436567"/>
               </p:ext>
             </p:extLst>
           </p:nvPr>
         </p:nvGraphicFramePr>
         <p:xfrm>
           <a:off x="7420864" y="1937507"/>
-          <a:ext cx="2697480" cy="2054544"/>
+          <a:ext cx="2697480" cy="1826261"/>
         </p:xfrm>
         <a:graphic>
           <a:graphicData uri="http://schemas.openxmlformats.org/drawingml/2006/table">
@@ -6403,24 +6928,23 @@
                         </a:spcAft>
                       </a:pPr>
                       <a:r>
-                        <a:rPr lang="en-GB" sz="1400" dirty="0">
+                        <a:rPr lang="en-GB" sz="1400" baseline="0" dirty="0" smtClean="0">
                           <a:effectLst/>
                           <a:latin typeface="+mn-lt"/>
                           <a:ea typeface="Calibri" panose="020F0502020204030204" pitchFamily="34" charset="0"/>
                           <a:cs typeface="Times New Roman" panose="02020603050405020304" pitchFamily="18" charset="0"/>
                         </a:rPr>
-                        <a:t>                         8.2.1.User Guides</a:t>
+                        <a:t>                  </a:t>
                       </a:r>
-                    </a:p>
-                    <a:p>
-                      <a:pPr>
-                        <a:lnSpc>
-                          <a:spcPct val="107000"/>
-                        </a:lnSpc>
-                        <a:spcAft>
-                          <a:spcPts val="0"/>
-                        </a:spcAft>
-                      </a:pPr>
+                      <a:r>
+                        <a:rPr lang="en-GB" sz="1400" dirty="0" smtClean="0">
+                          <a:effectLst/>
+                          <a:latin typeface="+mn-lt"/>
+                          <a:ea typeface="Calibri" panose="020F0502020204030204" pitchFamily="34" charset="0"/>
+                          <a:cs typeface="Times New Roman" panose="02020603050405020304" pitchFamily="18" charset="0"/>
+                        </a:rPr>
+                        <a:t>8.2.1.User </a:t>
+                      </a:r>
                       <a:r>
                         <a:rPr lang="en-GB" sz="1400" dirty="0">
                           <a:effectLst/>
@@ -6428,7 +6952,7 @@
                           <a:ea typeface="Calibri" panose="020F0502020204030204" pitchFamily="34" charset="0"/>
                           <a:cs typeface="Times New Roman" panose="02020603050405020304" pitchFamily="18" charset="0"/>
                         </a:rPr>
-                        <a:t>                         8.2.2.User Manual</a:t>
+                        <a:t>Manual</a:t>
                       </a:r>
                     </a:p>
                   </a:txBody>
@@ -6468,7 +6992,7 @@
         </p:nvGraphicFramePr>
         <p:xfrm>
           <a:off x="4291734" y="1937507"/>
-          <a:ext cx="3129130" cy="3195956"/>
+          <a:ext cx="3129130" cy="3184590"/>
         </p:xfrm>
         <a:graphic>
           <a:graphicData uri="http://schemas.openxmlformats.org/drawingml/2006/table">
@@ -7461,90 +7985,48 @@
           <a:p>
             <a:r>
               <a:rPr lang="en-GB" dirty="0" smtClean="0"/>
-              <a:t>Current Progress On Development</a:t>
+              <a:t>Risk Assessment</a:t>
             </a:r>
             <a:endParaRPr lang="en-GB" dirty="0"/>
           </a:p>
         </p:txBody>
       </p:sp>
-      <p:sp>
-        <p:nvSpPr>
-          <p:cNvPr id="3" name="Content Placeholder 2"/>
-          <p:cNvSpPr>
-            <a:spLocks noGrp="1"/>
-          </p:cNvSpPr>
+      <p:pic>
+        <p:nvPicPr>
+          <p:cNvPr id="4" name="Content Placeholder 3"/>
+          <p:cNvPicPr>
+            <a:picLocks noGrp="1" noChangeAspect="1"/>
+          </p:cNvPicPr>
           <p:nvPr>
             <p:ph idx="1"/>
           </p:nvPr>
-        </p:nvSpPr>
-        <p:spPr/>
-        <p:txBody>
-          <a:bodyPr/>
-          <a:lstStyle/>
-          <a:p>
-            <a:r>
-              <a:rPr lang="en-GB" dirty="0" smtClean="0"/>
-              <a:t>The core</a:t>
-            </a:r>
-          </a:p>
-          <a:p>
-            <a:pPr lvl="1"/>
-            <a:r>
-              <a:rPr lang="en-GB" dirty="0" smtClean="0"/>
-              <a:t>A simple database has been set up</a:t>
-            </a:r>
-          </a:p>
-          <a:p>
-            <a:pPr lvl="1"/>
-            <a:r>
-              <a:rPr lang="en-GB" dirty="0" smtClean="0"/>
-              <a:t>A webpage has been created</a:t>
-            </a:r>
-          </a:p>
-          <a:p>
-            <a:pPr lvl="1"/>
-            <a:r>
-              <a:rPr lang="en-GB" dirty="0" smtClean="0"/>
-              <a:t>Home page occupied using PHP</a:t>
-            </a:r>
-          </a:p>
-          <a:p>
-            <a:pPr lvl="1"/>
-            <a:r>
-              <a:rPr lang="en-GB" dirty="0" smtClean="0"/>
-              <a:t>Researched trolley </a:t>
-            </a:r>
-            <a:r>
-              <a:rPr lang="en-GB" dirty="0" smtClean="0"/>
-              <a:t>implementation</a:t>
-            </a:r>
-          </a:p>
-          <a:p>
-            <a:pPr lvl="1"/>
-            <a:r>
-              <a:rPr lang="en-GB" dirty="0" smtClean="0"/>
-              <a:t>Basic code for deals</a:t>
-            </a:r>
-          </a:p>
-        </p:txBody>
-      </p:sp>
+        </p:nvPicPr>
+        <p:blipFill>
+          <a:blip r:embed="rId2"/>
+          <a:stretch>
+            <a:fillRect/>
+          </a:stretch>
+        </p:blipFill>
+        <p:spPr>
+          <a:xfrm>
+            <a:off x="752439" y="2084832"/>
+            <a:ext cx="6876659" cy="4243754"/>
+          </a:xfrm>
+          <a:prstGeom prst="rect">
+            <a:avLst/>
+          </a:prstGeom>
+        </p:spPr>
+      </p:pic>
     </p:spTree>
     <p:extLst>
       <p:ext uri="{BB962C8B-B14F-4D97-AF65-F5344CB8AC3E}">
-        <p14:creationId xmlns:p14="http://schemas.microsoft.com/office/powerpoint/2010/main" val="2056144069"/>
+        <p14:creationId xmlns:p14="http://schemas.microsoft.com/office/powerpoint/2010/main" val="1229803346"/>
       </p:ext>
     </p:extLst>
   </p:cSld>
   <p:clrMapOvr>
     <a:masterClrMapping/>
   </p:clrMapOvr>
-  <p:timing>
-    <p:tnLst>
-      <p:par>
-        <p:cTn id="1" dur="indefinite" restart="never" nodeType="tmRoot"/>
-      </p:par>
-    </p:tnLst>
-  </p:timing>
 </p:sld>
 </file>
 
@@ -7582,7 +8064,7 @@
           <a:p>
             <a:r>
               <a:rPr lang="en-GB" dirty="0" smtClean="0"/>
-              <a:t>Demo</a:t>
+              <a:t>Current Progress On Development</a:t>
             </a:r>
             <a:endParaRPr lang="en-GB" dirty="0"/>
           </a:p>
@@ -7605,16 +8087,50 @@
           <a:p>
             <a:r>
               <a:rPr lang="en-GB" dirty="0" smtClean="0"/>
-              <a:t>We will now provide a demo of our website</a:t>
-            </a:r>
-            <a:endParaRPr lang="en-GB" dirty="0"/>
+              <a:t>The core</a:t>
+            </a:r>
+          </a:p>
+          <a:p>
+            <a:pPr lvl="1"/>
+            <a:r>
+              <a:rPr lang="en-GB" dirty="0" smtClean="0"/>
+              <a:t>A simple database has been set up</a:t>
+            </a:r>
+          </a:p>
+          <a:p>
+            <a:pPr lvl="1"/>
+            <a:r>
+              <a:rPr lang="en-GB" dirty="0" smtClean="0"/>
+              <a:t>A webpage has been created</a:t>
+            </a:r>
+          </a:p>
+          <a:p>
+            <a:pPr lvl="1"/>
+            <a:r>
+              <a:rPr lang="en-GB" dirty="0" smtClean="0"/>
+              <a:t>Home page occupied using PHP</a:t>
+            </a:r>
+          </a:p>
+          <a:p>
+            <a:pPr lvl="1"/>
+            <a:r>
+              <a:rPr lang="en-GB" dirty="0" smtClean="0"/>
+              <a:t>Started trolley implementation</a:t>
+            </a:r>
+          </a:p>
+          <a:p>
+            <a:pPr lvl="1"/>
+            <a:r>
+              <a:rPr lang="en-GB" dirty="0" smtClean="0"/>
+              <a:t>Pseudo code for deals</a:t>
+            </a:r>
           </a:p>
         </p:txBody>
       </p:sp>
     </p:spTree>
     <p:extLst>
       <p:ext uri="{BB962C8B-B14F-4D97-AF65-F5344CB8AC3E}">
-        <p14:creationId xmlns:p14="http://schemas.microsoft.com/office/powerpoint/2010/main" val="1344941087"/>
+        <p14:creationId xmlns:p14="http://schemas.microsoft.com/office/powerpoint/2010/main" val="2056144069"/>
       </p:ext>
     </p:extLst>
   </p:cSld>
@@ -7897,4 +8413,265 @@
     </a:ext>
   </a:extLst>
 </a:theme>
+</file>
+
+<file path=ppt/theme/theme2.xml><?xml version="1.0" encoding="utf-8"?>
+<a:theme xmlns:a="http://schemas.openxmlformats.org/drawingml/2006/main" name="Office Theme">
+  <a:themeElements>
+    <a:clrScheme name="Office">
+      <a:dk1>
+        <a:sysClr val="windowText" lastClr="000000"/>
+      </a:dk1>
+      <a:lt1>
+        <a:sysClr val="window" lastClr="FFFFFF"/>
+      </a:lt1>
+      <a:dk2>
+        <a:srgbClr val="44546A"/>
+      </a:dk2>
+      <a:lt2>
+        <a:srgbClr val="E7E6E6"/>
+      </a:lt2>
+      <a:accent1>
+        <a:srgbClr val="5B9BD5"/>
+      </a:accent1>
+      <a:accent2>
+        <a:srgbClr val="ED7D31"/>
+      </a:accent2>
+      <a:accent3>
+        <a:srgbClr val="A5A5A5"/>
+      </a:accent3>
+      <a:accent4>
+        <a:srgbClr val="FFC000"/>
+      </a:accent4>
+      <a:accent5>
+        <a:srgbClr val="4472C4"/>
+      </a:accent5>
+      <a:accent6>
+        <a:srgbClr val="70AD47"/>
+      </a:accent6>
+      <a:hlink>
+        <a:srgbClr val="0563C1"/>
+      </a:hlink>
+      <a:folHlink>
+        <a:srgbClr val="954F72"/>
+      </a:folHlink>
+    </a:clrScheme>
+    <a:fontScheme name="Office">
+      <a:majorFont>
+        <a:latin typeface="Calibri Light" panose="020F0302020204030204"/>
+        <a:ea typeface=""/>
+        <a:cs typeface=""/>
+        <a:font script="Jpan" typeface="ＭＳ Ｐゴシック"/>
+        <a:font script="Hang" typeface="맑은 고딕"/>
+        <a:font script="Hans" typeface="宋体"/>
+        <a:font script="Hant" typeface="新細明體"/>
+        <a:font script="Arab" typeface="Times New Roman"/>
+        <a:font script="Hebr" typeface="Times New Roman"/>
+        <a:font script="Thai" typeface="Angsana New"/>
+        <a:font script="Ethi" typeface="Nyala"/>
+        <a:font script="Beng" typeface="Vrinda"/>
+        <a:font script="Gujr" typeface="Shruti"/>
+        <a:font script="Khmr" typeface="MoolBoran"/>
+        <a:font script="Knda" typeface="Tunga"/>
+        <a:font script="Guru" typeface="Raavi"/>
+        <a:font script="Cans" typeface="Euphemia"/>
+        <a:font script="Cher" typeface="Plantagenet Cherokee"/>
+        <a:font script="Yiii" typeface="Microsoft Yi Baiti"/>
+        <a:font script="Tibt" typeface="Microsoft Himalaya"/>
+        <a:font script="Thaa" typeface="MV Boli"/>
+        <a:font script="Deva" typeface="Mangal"/>
+        <a:font script="Telu" typeface="Gautami"/>
+        <a:font script="Taml" typeface="Latha"/>
+        <a:font script="Syrc" typeface="Estrangelo Edessa"/>
+        <a:font script="Orya" typeface="Kalinga"/>
+        <a:font script="Mlym" typeface="Kartika"/>
+        <a:font script="Laoo" typeface="DokChampa"/>
+        <a:font script="Sinh" typeface="Iskoola Pota"/>
+        <a:font script="Mong" typeface="Mongolian Baiti"/>
+        <a:font script="Viet" typeface="Times New Roman"/>
+        <a:font script="Uigh" typeface="Microsoft Uighur"/>
+        <a:font script="Geor" typeface="Sylfaen"/>
+      </a:majorFont>
+      <a:minorFont>
+        <a:latin typeface="Calibri" panose="020F0502020204030204"/>
+        <a:ea typeface=""/>
+        <a:cs typeface=""/>
+        <a:font script="Jpan" typeface="ＭＳ Ｐゴシック"/>
+        <a:font script="Hang" typeface="맑은 고딕"/>
+        <a:font script="Hans" typeface="宋体"/>
+        <a:font script="Hant" typeface="新細明體"/>
+        <a:font script="Arab" typeface="Arial"/>
+        <a:font script="Hebr" typeface="Arial"/>
+        <a:font script="Thai" typeface="Cordia New"/>
+        <a:font script="Ethi" typeface="Nyala"/>
+        <a:font script="Beng" typeface="Vrinda"/>
+        <a:font script="Gujr" typeface="Shruti"/>
+        <a:font script="Khmr" typeface="DaunPenh"/>
+        <a:font script="Knda" typeface="Tunga"/>
+        <a:font script="Guru" typeface="Raavi"/>
+        <a:font script="Cans" typeface="Euphemia"/>
+        <a:font script="Cher" typeface="Plantagenet Cherokee"/>
+        <a:font script="Yiii" typeface="Microsoft Yi Baiti"/>
+        <a:font script="Tibt" typeface="Microsoft Himalaya"/>
+        <a:font script="Thaa" typeface="MV Boli"/>
+        <a:font script="Deva" typeface="Mangal"/>
+        <a:font script="Telu" typeface="Gautami"/>
+        <a:font script="Taml" typeface="Latha"/>
+        <a:font script="Syrc" typeface="Estrangelo Edessa"/>
+        <a:font script="Orya" typeface="Kalinga"/>
+        <a:font script="Mlym" typeface="Kartika"/>
+        <a:font script="Laoo" typeface="DokChampa"/>
+        <a:font script="Sinh" typeface="Iskoola Pota"/>
+        <a:font script="Mong" typeface="Mongolian Baiti"/>
+        <a:font script="Viet" typeface="Arial"/>
+        <a:font script="Uigh" typeface="Microsoft Uighur"/>
+        <a:font script="Geor" typeface="Sylfaen"/>
+      </a:minorFont>
+    </a:fontScheme>
+    <a:fmtScheme name="Office">
+      <a:fillStyleLst>
+        <a:solidFill>
+          <a:schemeClr val="phClr"/>
+        </a:solidFill>
+        <a:gradFill rotWithShape="1">
+          <a:gsLst>
+            <a:gs pos="0">
+              <a:schemeClr val="phClr">
+                <a:lumMod val="110000"/>
+                <a:satMod val="105000"/>
+                <a:tint val="67000"/>
+              </a:schemeClr>
+            </a:gs>
+            <a:gs pos="50000">
+              <a:schemeClr val="phClr">
+                <a:lumMod val="105000"/>
+                <a:satMod val="103000"/>
+                <a:tint val="73000"/>
+              </a:schemeClr>
+            </a:gs>
+            <a:gs pos="100000">
+              <a:schemeClr val="phClr">
+                <a:lumMod val="105000"/>
+                <a:satMod val="109000"/>
+                <a:tint val="81000"/>
+              </a:schemeClr>
+            </a:gs>
+          </a:gsLst>
+          <a:lin ang="5400000" scaled="0"/>
+        </a:gradFill>
+        <a:gradFill rotWithShape="1">
+          <a:gsLst>
+            <a:gs pos="0">
+              <a:schemeClr val="phClr">
+                <a:satMod val="103000"/>
+                <a:lumMod val="102000"/>
+                <a:tint val="94000"/>
+              </a:schemeClr>
+            </a:gs>
+            <a:gs pos="50000">
+              <a:schemeClr val="phClr">
+                <a:satMod val="110000"/>
+                <a:lumMod val="100000"/>
+                <a:shade val="100000"/>
+              </a:schemeClr>
+            </a:gs>
+            <a:gs pos="100000">
+              <a:schemeClr val="phClr">
+                <a:lumMod val="99000"/>
+                <a:satMod val="120000"/>
+                <a:shade val="78000"/>
+              </a:schemeClr>
+            </a:gs>
+          </a:gsLst>
+          <a:lin ang="5400000" scaled="0"/>
+        </a:gradFill>
+      </a:fillStyleLst>
+      <a:lnStyleLst>
+        <a:ln w="6350" cap="flat" cmpd="sng" algn="ctr">
+          <a:solidFill>
+            <a:schemeClr val="phClr"/>
+          </a:solidFill>
+          <a:prstDash val="solid"/>
+          <a:miter lim="800000"/>
+        </a:ln>
+        <a:ln w="12700" cap="flat" cmpd="sng" algn="ctr">
+          <a:solidFill>
+            <a:schemeClr val="phClr"/>
+          </a:solidFill>
+          <a:prstDash val="solid"/>
+          <a:miter lim="800000"/>
+        </a:ln>
+        <a:ln w="19050" cap="flat" cmpd="sng" algn="ctr">
+          <a:solidFill>
+            <a:schemeClr val="phClr"/>
+          </a:solidFill>
+          <a:prstDash val="solid"/>
+          <a:miter lim="800000"/>
+        </a:ln>
+      </a:lnStyleLst>
+      <a:effectStyleLst>
+        <a:effectStyle>
+          <a:effectLst/>
+        </a:effectStyle>
+        <a:effectStyle>
+          <a:effectLst/>
+        </a:effectStyle>
+        <a:effectStyle>
+          <a:effectLst>
+            <a:outerShdw blurRad="57150" dist="19050" dir="5400000" algn="ctr" rotWithShape="0">
+              <a:srgbClr val="000000">
+                <a:alpha val="63000"/>
+              </a:srgbClr>
+            </a:outerShdw>
+          </a:effectLst>
+        </a:effectStyle>
+      </a:effectStyleLst>
+      <a:bgFillStyleLst>
+        <a:solidFill>
+          <a:schemeClr val="phClr"/>
+        </a:solidFill>
+        <a:solidFill>
+          <a:schemeClr val="phClr">
+            <a:tint val="95000"/>
+            <a:satMod val="170000"/>
+          </a:schemeClr>
+        </a:solidFill>
+        <a:gradFill rotWithShape="1">
+          <a:gsLst>
+            <a:gs pos="0">
+              <a:schemeClr val="phClr">
+                <a:tint val="93000"/>
+                <a:satMod val="150000"/>
+                <a:shade val="98000"/>
+                <a:lumMod val="102000"/>
+              </a:schemeClr>
+            </a:gs>
+            <a:gs pos="50000">
+              <a:schemeClr val="phClr">
+                <a:tint val="98000"/>
+                <a:satMod val="130000"/>
+                <a:shade val="90000"/>
+                <a:lumMod val="103000"/>
+              </a:schemeClr>
+            </a:gs>
+            <a:gs pos="100000">
+              <a:schemeClr val="phClr">
+                <a:shade val="63000"/>
+                <a:satMod val="120000"/>
+              </a:schemeClr>
+            </a:gs>
+          </a:gsLst>
+          <a:lin ang="5400000" scaled="0"/>
+        </a:gradFill>
+      </a:bgFillStyleLst>
+    </a:fmtScheme>
+  </a:themeElements>
+  <a:objectDefaults/>
+  <a:extraClrSchemeLst/>
+  <a:extLst>
+    <a:ext uri="{05A4C25C-085E-4340-85A3-A5531E510DB2}">
+      <thm15:themeFamily xmlns:thm15="http://schemas.microsoft.com/office/thememl/2012/main" name="Office Theme" id="{62F939B6-93AF-4DB8-9C6B-D6C7DFDC589F}" vid="{4A3C46E8-61CC-4603-A589-7422A47A8E4A}"/>
+    </a:ext>
+  </a:extLst>
+</a:theme>
 </file>
</xml_diff>